<commit_message>
revisions to configure (mission resources)
</commit_message>
<xml_diff>
--- a/docs/codebase_description.pptx
+++ b/docs/codebase_description.pptx
@@ -12,6 +12,10 @@
     <p:sldId id="262" r:id="rId6"/>
     <p:sldId id="259" r:id="rId7"/>
     <p:sldId id="260" r:id="rId8"/>
+    <p:sldId id="263" r:id="rId9"/>
+    <p:sldId id="264" r:id="rId10"/>
+    <p:sldId id="265" r:id="rId11"/>
+    <p:sldId id="266" r:id="rId12"/>
   </p:sldIdLst>
   <p:sldSz cx="12192000" cy="6858000"/>
   <p:notesSz cx="6858000" cy="9144000"/>
@@ -265,7 +269,7 @@
           <a:p>
             <a:fld id="{F6612307-B608-4FD9-90D8-D494C0A10B27}" type="datetimeFigureOut">
               <a:rPr lang="en-US" smtClean="0"/>
-              <a:t>9/18/2021</a:t>
+              <a:t>9/20/2021</a:t>
             </a:fld>
             <a:endParaRPr lang="en-US"/>
           </a:p>
@@ -463,7 +467,7 @@
           <a:p>
             <a:fld id="{F6612307-B608-4FD9-90D8-D494C0A10B27}" type="datetimeFigureOut">
               <a:rPr lang="en-US" smtClean="0"/>
-              <a:t>9/18/2021</a:t>
+              <a:t>9/20/2021</a:t>
             </a:fld>
             <a:endParaRPr lang="en-US"/>
           </a:p>
@@ -671,7 +675,7 @@
           <a:p>
             <a:fld id="{F6612307-B608-4FD9-90D8-D494C0A10B27}" type="datetimeFigureOut">
               <a:rPr lang="en-US" smtClean="0"/>
-              <a:t>9/18/2021</a:t>
+              <a:t>9/20/2021</a:t>
             </a:fld>
             <a:endParaRPr lang="en-US"/>
           </a:p>
@@ -869,7 +873,7 @@
           <a:p>
             <a:fld id="{F6612307-B608-4FD9-90D8-D494C0A10B27}" type="datetimeFigureOut">
               <a:rPr lang="en-US" smtClean="0"/>
-              <a:t>9/18/2021</a:t>
+              <a:t>9/20/2021</a:t>
             </a:fld>
             <a:endParaRPr lang="en-US"/>
           </a:p>
@@ -1144,7 +1148,7 @@
           <a:p>
             <a:fld id="{F6612307-B608-4FD9-90D8-D494C0A10B27}" type="datetimeFigureOut">
               <a:rPr lang="en-US" smtClean="0"/>
-              <a:t>9/18/2021</a:t>
+              <a:t>9/20/2021</a:t>
             </a:fld>
             <a:endParaRPr lang="en-US"/>
           </a:p>
@@ -1409,7 +1413,7 @@
           <a:p>
             <a:fld id="{F6612307-B608-4FD9-90D8-D494C0A10B27}" type="datetimeFigureOut">
               <a:rPr lang="en-US" smtClean="0"/>
-              <a:t>9/18/2021</a:t>
+              <a:t>9/20/2021</a:t>
             </a:fld>
             <a:endParaRPr lang="en-US"/>
           </a:p>
@@ -1821,7 +1825,7 @@
           <a:p>
             <a:fld id="{F6612307-B608-4FD9-90D8-D494C0A10B27}" type="datetimeFigureOut">
               <a:rPr lang="en-US" smtClean="0"/>
-              <a:t>9/18/2021</a:t>
+              <a:t>9/20/2021</a:t>
             </a:fld>
             <a:endParaRPr lang="en-US"/>
           </a:p>
@@ -1962,7 +1966,7 @@
           <a:p>
             <a:fld id="{F6612307-B608-4FD9-90D8-D494C0A10B27}" type="datetimeFigureOut">
               <a:rPr lang="en-US" smtClean="0"/>
-              <a:t>9/18/2021</a:t>
+              <a:t>9/20/2021</a:t>
             </a:fld>
             <a:endParaRPr lang="en-US"/>
           </a:p>
@@ -2075,7 +2079,7 @@
           <a:p>
             <a:fld id="{F6612307-B608-4FD9-90D8-D494C0A10B27}" type="datetimeFigureOut">
               <a:rPr lang="en-US" smtClean="0"/>
-              <a:t>9/18/2021</a:t>
+              <a:t>9/20/2021</a:t>
             </a:fld>
             <a:endParaRPr lang="en-US"/>
           </a:p>
@@ -2386,7 +2390,7 @@
           <a:p>
             <a:fld id="{F6612307-B608-4FD9-90D8-D494C0A10B27}" type="datetimeFigureOut">
               <a:rPr lang="en-US" smtClean="0"/>
-              <a:t>9/18/2021</a:t>
+              <a:t>9/20/2021</a:t>
             </a:fld>
             <a:endParaRPr lang="en-US"/>
           </a:p>
@@ -2674,7 +2678,7 @@
           <a:p>
             <a:fld id="{F6612307-B608-4FD9-90D8-D494C0A10B27}" type="datetimeFigureOut">
               <a:rPr lang="en-US" smtClean="0"/>
-              <a:t>9/18/2021</a:t>
+              <a:t>9/20/2021</a:t>
             </a:fld>
             <a:endParaRPr lang="en-US"/>
           </a:p>
@@ -2915,7 +2919,7 @@
           <a:p>
             <a:fld id="{F6612307-B608-4FD9-90D8-D494C0A10B27}" type="datetimeFigureOut">
               <a:rPr lang="en-US" smtClean="0"/>
-              <a:t>9/18/2021</a:t>
+              <a:t>9/20/2021</a:t>
             </a:fld>
             <a:endParaRPr lang="en-US"/>
           </a:p>
@@ -3353,7 +3357,7 @@
           <a:bodyPr/>
           <a:lstStyle/>
           <a:p>
-            <a:endParaRPr lang="en-US"/>
+            <a:endParaRPr lang="en-US" dirty="0"/>
           </a:p>
         </p:txBody>
       </p:sp>
@@ -3378,7 +3382,7 @@
           <a:bodyPr/>
           <a:lstStyle/>
           <a:p>
-            <a:endParaRPr lang="en-US"/>
+            <a:endParaRPr lang="en-US" dirty="0"/>
           </a:p>
         </p:txBody>
       </p:sp>
@@ -3386,6 +3390,1489 @@
     <p:extLst>
       <p:ext uri="{BB962C8B-B14F-4D97-AF65-F5344CB8AC3E}">
         <p14:creationId xmlns:p14="http://schemas.microsoft.com/office/powerpoint/2010/main" val="325207951"/>
+      </p:ext>
+    </p:extLst>
+  </p:cSld>
+  <p:clrMapOvr>
+    <a:masterClrMapping/>
+  </p:clrMapOvr>
+</p:sld>
+</file>
+
+<file path=ppt/slides/slide10.xml><?xml version="1.0" encoding="utf-8"?>
+<p:sld xmlns:a="http://schemas.openxmlformats.org/drawingml/2006/main" xmlns:r="http://schemas.openxmlformats.org/officeDocument/2006/relationships" xmlns:p="http://schemas.openxmlformats.org/presentationml/2006/main">
+  <p:cSld>
+    <p:spTree>
+      <p:nvGrpSpPr>
+        <p:cNvPr id="1" name=""/>
+        <p:cNvGrpSpPr/>
+        <p:nvPr/>
+      </p:nvGrpSpPr>
+      <p:grpSpPr>
+        <a:xfrm>
+          <a:off x="0" y="0"/>
+          <a:ext cx="0" cy="0"/>
+          <a:chOff x="0" y="0"/>
+          <a:chExt cx="0" cy="0"/>
+        </a:xfrm>
+      </p:grpSpPr>
+      <p:sp>
+        <p:nvSpPr>
+          <p:cNvPr id="2" name="Title 1">
+            <a:extLst>
+              <a:ext uri="{FF2B5EF4-FFF2-40B4-BE49-F238E27FC236}">
+                <a16:creationId xmlns:a16="http://schemas.microsoft.com/office/drawing/2014/main" id="{E20219A9-ED48-4EB4-9E6E-5DC82134B943}"/>
+              </a:ext>
+            </a:extLst>
+          </p:cNvPr>
+          <p:cNvSpPr>
+            <a:spLocks noGrp="1"/>
+          </p:cNvSpPr>
+          <p:nvPr>
+            <p:ph type="title"/>
+          </p:nvPr>
+        </p:nvSpPr>
+        <p:spPr/>
+        <p:txBody>
+          <a:bodyPr/>
+          <a:lstStyle/>
+          <a:p>
+            <a:r>
+              <a:rPr lang="en-US" dirty="0"/>
+              <a:t>General notes on coding style</a:t>
+            </a:r>
+          </a:p>
+        </p:txBody>
+      </p:sp>
+      <p:sp>
+        <p:nvSpPr>
+          <p:cNvPr id="4" name="Content Placeholder 2">
+            <a:extLst>
+              <a:ext uri="{FF2B5EF4-FFF2-40B4-BE49-F238E27FC236}">
+                <a16:creationId xmlns:a16="http://schemas.microsoft.com/office/drawing/2014/main" id="{FDA69C96-D191-484C-84EC-1DCA82353DBA}"/>
+              </a:ext>
+            </a:extLst>
+          </p:cNvPr>
+          <p:cNvSpPr>
+            <a:spLocks noGrp="1"/>
+          </p:cNvSpPr>
+          <p:nvPr>
+            <p:ph idx="1"/>
+          </p:nvPr>
+        </p:nvSpPr>
+        <p:spPr>
+          <a:xfrm>
+            <a:off x="838200" y="1825624"/>
+            <a:ext cx="6099175" cy="4956916"/>
+          </a:xfrm>
+        </p:spPr>
+        <p:txBody>
+          <a:bodyPr>
+            <a:normAutofit/>
+          </a:bodyPr>
+          <a:lstStyle/>
+          <a:p>
+            <a:r>
+              <a:rPr lang="en-US" sz="1800" dirty="0"/>
+              <a:t>Typically, the grid function is used to lay out widgets within a frame. The rows and columns are configured with weights and widgets are laid out in the cells.</a:t>
+            </a:r>
+          </a:p>
+          <a:p>
+            <a:r>
+              <a:rPr lang="en-US" sz="1800" dirty="0"/>
+              <a:t>Example: In the </a:t>
+            </a:r>
+            <a:r>
+              <a:rPr lang="en-US" sz="1800" dirty="0" err="1">
+                <a:latin typeface="Courier New" panose="02070309020205020404" pitchFamily="49" charset="0"/>
+                <a:cs typeface="Courier New" panose="02070309020205020404" pitchFamily="49" charset="0"/>
+              </a:rPr>
+              <a:t>cfsatellite</a:t>
+            </a:r>
+            <a:r>
+              <a:rPr lang="en-US" sz="1800" dirty="0"/>
+              <a:t> module, the below snippet corresponds to the rows and cols illustrated in the figure (on the right). The labels and entry widgets are placed within each cell.</a:t>
+            </a:r>
+          </a:p>
+          <a:p>
+            <a:pPr marL="0" indent="0">
+              <a:buNone/>
+            </a:pPr>
+            <a:endParaRPr lang="en-US" sz="1800" dirty="0">
+              <a:cs typeface="Courier New" panose="02070309020205020404" pitchFamily="49" charset="0"/>
+            </a:endParaRPr>
+          </a:p>
+        </p:txBody>
+      </p:sp>
+      <p:sp>
+        <p:nvSpPr>
+          <p:cNvPr id="6" name="TextBox 5">
+            <a:extLst>
+              <a:ext uri="{FF2B5EF4-FFF2-40B4-BE49-F238E27FC236}">
+                <a16:creationId xmlns:a16="http://schemas.microsoft.com/office/drawing/2014/main" id="{87C48532-72B3-4A55-984A-F003E1CC3EE5}"/>
+              </a:ext>
+            </a:extLst>
+          </p:cNvPr>
+          <p:cNvSpPr txBox="1"/>
+          <p:nvPr/>
+        </p:nvSpPr>
+        <p:spPr>
+          <a:xfrm>
+            <a:off x="2014498" y="3877988"/>
+            <a:ext cx="5217852" cy="1938992"/>
+          </a:xfrm>
+          <a:prstGeom prst="rect">
+            <a:avLst/>
+          </a:prstGeom>
+          <a:noFill/>
+        </p:spPr>
+        <p:txBody>
+          <a:bodyPr wrap="square">
+            <a:spAutoFit/>
+          </a:bodyPr>
+          <a:lstStyle/>
+          <a:p>
+            <a:pPr marL="0" indent="0">
+              <a:buNone/>
+            </a:pPr>
+            <a:r>
+              <a:rPr lang="en-US" sz="1200" dirty="0" err="1">
+                <a:latin typeface="Courier New" panose="02070309020205020404" pitchFamily="49" charset="0"/>
+                <a:cs typeface="Courier New" panose="02070309020205020404" pitchFamily="49" charset="0"/>
+              </a:rPr>
+              <a:t>sat_kep_specs_frame.columnconfigure</a:t>
+            </a:r>
+            <a:r>
+              <a:rPr lang="en-US" sz="1200" dirty="0">
+                <a:latin typeface="Courier New" panose="02070309020205020404" pitchFamily="49" charset="0"/>
+                <a:cs typeface="Courier New" panose="02070309020205020404" pitchFamily="49" charset="0"/>
+              </a:rPr>
+              <a:t>(0,weight=1)</a:t>
+            </a:r>
+          </a:p>
+          <a:p>
+            <a:pPr marL="0" indent="0">
+              <a:buNone/>
+            </a:pPr>
+            <a:r>
+              <a:rPr lang="en-US" sz="1200" dirty="0" err="1">
+                <a:latin typeface="Courier New" panose="02070309020205020404" pitchFamily="49" charset="0"/>
+                <a:cs typeface="Courier New" panose="02070309020205020404" pitchFamily="49" charset="0"/>
+              </a:rPr>
+              <a:t>sat_kep_specs_frame.columnconfigure</a:t>
+            </a:r>
+            <a:r>
+              <a:rPr lang="en-US" sz="1200" dirty="0">
+                <a:latin typeface="Courier New" panose="02070309020205020404" pitchFamily="49" charset="0"/>
+                <a:cs typeface="Courier New" panose="02070309020205020404" pitchFamily="49" charset="0"/>
+              </a:rPr>
+              <a:t>(1,weight=1)</a:t>
+            </a:r>
+          </a:p>
+          <a:p>
+            <a:pPr marL="0" indent="0">
+              <a:buNone/>
+            </a:pPr>
+            <a:r>
+              <a:rPr lang="en-US" sz="1200" dirty="0" err="1">
+                <a:latin typeface="Courier New" panose="02070309020205020404" pitchFamily="49" charset="0"/>
+                <a:cs typeface="Courier New" panose="02070309020205020404" pitchFamily="49" charset="0"/>
+              </a:rPr>
+              <a:t>sat_kep_specs_frame.rowconfigure</a:t>
+            </a:r>
+            <a:r>
+              <a:rPr lang="en-US" sz="1200" dirty="0">
+                <a:latin typeface="Courier New" panose="02070309020205020404" pitchFamily="49" charset="0"/>
+                <a:cs typeface="Courier New" panose="02070309020205020404" pitchFamily="49" charset="0"/>
+              </a:rPr>
+              <a:t>(0,weight=1)</a:t>
+            </a:r>
+          </a:p>
+          <a:p>
+            <a:pPr marL="0" indent="0">
+              <a:buNone/>
+            </a:pPr>
+            <a:r>
+              <a:rPr lang="en-US" sz="1200" dirty="0" err="1">
+                <a:latin typeface="Courier New" panose="02070309020205020404" pitchFamily="49" charset="0"/>
+                <a:cs typeface="Courier New" panose="02070309020205020404" pitchFamily="49" charset="0"/>
+              </a:rPr>
+              <a:t>sat_kep_specs_frame.rowconfigure</a:t>
+            </a:r>
+            <a:r>
+              <a:rPr lang="en-US" sz="1200" dirty="0">
+                <a:latin typeface="Courier New" panose="02070309020205020404" pitchFamily="49" charset="0"/>
+                <a:cs typeface="Courier New" panose="02070309020205020404" pitchFamily="49" charset="0"/>
+              </a:rPr>
+              <a:t>(1,weight=1)</a:t>
+            </a:r>
+          </a:p>
+          <a:p>
+            <a:pPr marL="0" indent="0">
+              <a:buNone/>
+            </a:pPr>
+            <a:r>
+              <a:rPr lang="en-US" sz="1200" dirty="0" err="1">
+                <a:latin typeface="Courier New" panose="02070309020205020404" pitchFamily="49" charset="0"/>
+                <a:cs typeface="Courier New" panose="02070309020205020404" pitchFamily="49" charset="0"/>
+              </a:rPr>
+              <a:t>sat_kep_specs_frame.rowconfigure</a:t>
+            </a:r>
+            <a:r>
+              <a:rPr lang="en-US" sz="1200" dirty="0">
+                <a:latin typeface="Courier New" panose="02070309020205020404" pitchFamily="49" charset="0"/>
+                <a:cs typeface="Courier New" panose="02070309020205020404" pitchFamily="49" charset="0"/>
+              </a:rPr>
+              <a:t>(2,weight=1)</a:t>
+            </a:r>
+          </a:p>
+          <a:p>
+            <a:pPr marL="0" indent="0">
+              <a:buNone/>
+            </a:pPr>
+            <a:r>
+              <a:rPr lang="en-US" sz="1200" dirty="0" err="1">
+                <a:latin typeface="Courier New" panose="02070309020205020404" pitchFamily="49" charset="0"/>
+                <a:cs typeface="Courier New" panose="02070309020205020404" pitchFamily="49" charset="0"/>
+              </a:rPr>
+              <a:t>sat_kep_specs_frame.rowconfigure</a:t>
+            </a:r>
+            <a:r>
+              <a:rPr lang="en-US" sz="1200" dirty="0">
+                <a:latin typeface="Courier New" panose="02070309020205020404" pitchFamily="49" charset="0"/>
+                <a:cs typeface="Courier New" panose="02070309020205020404" pitchFamily="49" charset="0"/>
+              </a:rPr>
+              <a:t>(3,weight=1)</a:t>
+            </a:r>
+          </a:p>
+          <a:p>
+            <a:pPr marL="0" indent="0">
+              <a:buNone/>
+            </a:pPr>
+            <a:r>
+              <a:rPr lang="en-US" sz="1200" dirty="0" err="1">
+                <a:latin typeface="Courier New" panose="02070309020205020404" pitchFamily="49" charset="0"/>
+                <a:cs typeface="Courier New" panose="02070309020205020404" pitchFamily="49" charset="0"/>
+              </a:rPr>
+              <a:t>sat_kep_specs_frame.rowconfigure</a:t>
+            </a:r>
+            <a:r>
+              <a:rPr lang="en-US" sz="1200" dirty="0">
+                <a:latin typeface="Courier New" panose="02070309020205020404" pitchFamily="49" charset="0"/>
+                <a:cs typeface="Courier New" panose="02070309020205020404" pitchFamily="49" charset="0"/>
+              </a:rPr>
+              <a:t>(4,weight=1)</a:t>
+            </a:r>
+          </a:p>
+          <a:p>
+            <a:pPr marL="0" indent="0">
+              <a:buNone/>
+            </a:pPr>
+            <a:r>
+              <a:rPr lang="en-US" sz="1200" dirty="0" err="1">
+                <a:latin typeface="Courier New" panose="02070309020205020404" pitchFamily="49" charset="0"/>
+                <a:cs typeface="Courier New" panose="02070309020205020404" pitchFamily="49" charset="0"/>
+              </a:rPr>
+              <a:t>sat_kep_specs_frame.rowconfigure</a:t>
+            </a:r>
+            <a:r>
+              <a:rPr lang="en-US" sz="1200" dirty="0">
+                <a:latin typeface="Courier New" panose="02070309020205020404" pitchFamily="49" charset="0"/>
+                <a:cs typeface="Courier New" panose="02070309020205020404" pitchFamily="49" charset="0"/>
+              </a:rPr>
+              <a:t>(5,weight=1) </a:t>
+            </a:r>
+          </a:p>
+          <a:p>
+            <a:pPr marL="0" indent="0">
+              <a:buNone/>
+            </a:pPr>
+            <a:r>
+              <a:rPr lang="en-US" sz="1200" dirty="0" err="1">
+                <a:latin typeface="Courier New" panose="02070309020205020404" pitchFamily="49" charset="0"/>
+                <a:cs typeface="Courier New" panose="02070309020205020404" pitchFamily="49" charset="0"/>
+              </a:rPr>
+              <a:t>sat_kep_specs_frame.rowconfigure</a:t>
+            </a:r>
+            <a:r>
+              <a:rPr lang="en-US" sz="1200" dirty="0">
+                <a:latin typeface="Courier New" panose="02070309020205020404" pitchFamily="49" charset="0"/>
+                <a:cs typeface="Courier New" panose="02070309020205020404" pitchFamily="49" charset="0"/>
+              </a:rPr>
+              <a:t>(6,weight=1)</a:t>
+            </a:r>
+          </a:p>
+          <a:p>
+            <a:pPr marL="0" indent="0">
+              <a:buNone/>
+            </a:pPr>
+            <a:r>
+              <a:rPr lang="en-US" sz="1200" dirty="0" err="1">
+                <a:latin typeface="Courier New" panose="02070309020205020404" pitchFamily="49" charset="0"/>
+                <a:cs typeface="Courier New" panose="02070309020205020404" pitchFamily="49" charset="0"/>
+              </a:rPr>
+              <a:t>sat_kep_specs_frame.rowconfigure</a:t>
+            </a:r>
+            <a:r>
+              <a:rPr lang="en-US" sz="1200" dirty="0">
+                <a:latin typeface="Courier New" panose="02070309020205020404" pitchFamily="49" charset="0"/>
+                <a:cs typeface="Courier New" panose="02070309020205020404" pitchFamily="49" charset="0"/>
+              </a:rPr>
+              <a:t>(7,weight=1)</a:t>
+            </a:r>
+          </a:p>
+        </p:txBody>
+      </p:sp>
+      <p:pic>
+        <p:nvPicPr>
+          <p:cNvPr id="7" name="Picture 6">
+            <a:extLst>
+              <a:ext uri="{FF2B5EF4-FFF2-40B4-BE49-F238E27FC236}">
+                <a16:creationId xmlns:a16="http://schemas.microsoft.com/office/drawing/2014/main" id="{7B246220-75E6-40A7-9D85-AEE47D59AB2C}"/>
+              </a:ext>
+            </a:extLst>
+          </p:cNvPr>
+          <p:cNvPicPr>
+            <a:picLocks noChangeAspect="1"/>
+          </p:cNvPicPr>
+          <p:nvPr/>
+        </p:nvPicPr>
+        <p:blipFill>
+          <a:blip r:embed="rId2"/>
+          <a:stretch>
+            <a:fillRect/>
+          </a:stretch>
+        </p:blipFill>
+        <p:spPr>
+          <a:xfrm>
+            <a:off x="8408647" y="1667458"/>
+            <a:ext cx="3000375" cy="3238500"/>
+          </a:xfrm>
+          <a:prstGeom prst="rect">
+            <a:avLst/>
+          </a:prstGeom>
+        </p:spPr>
+      </p:pic>
+      <p:sp>
+        <p:nvSpPr>
+          <p:cNvPr id="13" name="Rectangle 12">
+            <a:extLst>
+              <a:ext uri="{FF2B5EF4-FFF2-40B4-BE49-F238E27FC236}">
+                <a16:creationId xmlns:a16="http://schemas.microsoft.com/office/drawing/2014/main" id="{A42D7F33-40DB-4769-BD44-9D26169DB64B}"/>
+              </a:ext>
+            </a:extLst>
+          </p:cNvPr>
+          <p:cNvSpPr/>
+          <p:nvPr/>
+        </p:nvSpPr>
+        <p:spPr>
+          <a:xfrm>
+            <a:off x="8408648" y="2095130"/>
+            <a:ext cx="3000375" cy="2441357"/>
+          </a:xfrm>
+          <a:prstGeom prst="rect">
+            <a:avLst/>
+          </a:prstGeom>
+          <a:noFill/>
+          <a:ln w="38100">
+            <a:solidFill>
+              <a:schemeClr val="accent5">
+                <a:lumMod val="75000"/>
+              </a:schemeClr>
+            </a:solidFill>
+          </a:ln>
+        </p:spPr>
+        <p:style>
+          <a:lnRef idx="2">
+            <a:schemeClr val="accent1">
+              <a:shade val="50000"/>
+            </a:schemeClr>
+          </a:lnRef>
+          <a:fillRef idx="1">
+            <a:schemeClr val="accent1"/>
+          </a:fillRef>
+          <a:effectRef idx="0">
+            <a:schemeClr val="accent1"/>
+          </a:effectRef>
+          <a:fontRef idx="minor">
+            <a:schemeClr val="lt1"/>
+          </a:fontRef>
+        </p:style>
+        <p:txBody>
+          <a:bodyPr rtlCol="0" anchor="ctr"/>
+          <a:lstStyle/>
+          <a:p>
+            <a:pPr algn="ctr"/>
+            <a:endParaRPr lang="en-US"/>
+          </a:p>
+        </p:txBody>
+      </p:sp>
+      <p:cxnSp>
+        <p:nvCxnSpPr>
+          <p:cNvPr id="15" name="Straight Connector 14">
+            <a:extLst>
+              <a:ext uri="{FF2B5EF4-FFF2-40B4-BE49-F238E27FC236}">
+                <a16:creationId xmlns:a16="http://schemas.microsoft.com/office/drawing/2014/main" id="{333BE505-9665-4D9F-8624-3B39F0025BE4}"/>
+              </a:ext>
+            </a:extLst>
+          </p:cNvPr>
+          <p:cNvCxnSpPr>
+            <a:cxnSpLocks/>
+            <a:endCxn id="13" idx="2"/>
+          </p:cNvCxnSpPr>
+          <p:nvPr/>
+        </p:nvCxnSpPr>
+        <p:spPr>
+          <a:xfrm flipH="1">
+            <a:off x="9908836" y="2095130"/>
+            <a:ext cx="34154" cy="2441357"/>
+          </a:xfrm>
+          <a:prstGeom prst="line">
+            <a:avLst/>
+          </a:prstGeom>
+          <a:ln w="28575"/>
+        </p:spPr>
+        <p:style>
+          <a:lnRef idx="1">
+            <a:schemeClr val="accent1"/>
+          </a:lnRef>
+          <a:fillRef idx="0">
+            <a:schemeClr val="accent1"/>
+          </a:fillRef>
+          <a:effectRef idx="0">
+            <a:schemeClr val="accent1"/>
+          </a:effectRef>
+          <a:fontRef idx="minor">
+            <a:schemeClr val="tx1"/>
+          </a:fontRef>
+        </p:style>
+      </p:cxnSp>
+      <p:cxnSp>
+        <p:nvCxnSpPr>
+          <p:cNvPr id="16" name="Straight Connector 15">
+            <a:extLst>
+              <a:ext uri="{FF2B5EF4-FFF2-40B4-BE49-F238E27FC236}">
+                <a16:creationId xmlns:a16="http://schemas.microsoft.com/office/drawing/2014/main" id="{02731401-0F9E-417B-9DE0-DB08F4098357}"/>
+              </a:ext>
+            </a:extLst>
+          </p:cNvPr>
+          <p:cNvCxnSpPr>
+            <a:cxnSpLocks/>
+          </p:cNvCxnSpPr>
+          <p:nvPr/>
+        </p:nvCxnSpPr>
+        <p:spPr>
+          <a:xfrm>
+            <a:off x="8408648" y="2467992"/>
+            <a:ext cx="3000375" cy="0"/>
+          </a:xfrm>
+          <a:prstGeom prst="line">
+            <a:avLst/>
+          </a:prstGeom>
+          <a:ln w="28575"/>
+        </p:spPr>
+        <p:style>
+          <a:lnRef idx="1">
+            <a:schemeClr val="accent1"/>
+          </a:lnRef>
+          <a:fillRef idx="0">
+            <a:schemeClr val="accent1"/>
+          </a:fillRef>
+          <a:effectRef idx="0">
+            <a:schemeClr val="accent1"/>
+          </a:effectRef>
+          <a:fontRef idx="minor">
+            <a:schemeClr val="tx1"/>
+          </a:fontRef>
+        </p:style>
+      </p:cxnSp>
+      <p:cxnSp>
+        <p:nvCxnSpPr>
+          <p:cNvPr id="19" name="Straight Connector 18">
+            <a:extLst>
+              <a:ext uri="{FF2B5EF4-FFF2-40B4-BE49-F238E27FC236}">
+                <a16:creationId xmlns:a16="http://schemas.microsoft.com/office/drawing/2014/main" id="{0A623180-A8BD-4BDB-BE6F-61A065A74745}"/>
+              </a:ext>
+            </a:extLst>
+          </p:cNvPr>
+          <p:cNvCxnSpPr>
+            <a:cxnSpLocks/>
+          </p:cNvCxnSpPr>
+          <p:nvPr/>
+        </p:nvCxnSpPr>
+        <p:spPr>
+          <a:xfrm>
+            <a:off x="8408648" y="2811854"/>
+            <a:ext cx="3000375" cy="0"/>
+          </a:xfrm>
+          <a:prstGeom prst="line">
+            <a:avLst/>
+          </a:prstGeom>
+          <a:ln w="28575"/>
+        </p:spPr>
+        <p:style>
+          <a:lnRef idx="1">
+            <a:schemeClr val="accent1"/>
+          </a:lnRef>
+          <a:fillRef idx="0">
+            <a:schemeClr val="accent1"/>
+          </a:fillRef>
+          <a:effectRef idx="0">
+            <a:schemeClr val="accent1"/>
+          </a:effectRef>
+          <a:fontRef idx="minor">
+            <a:schemeClr val="tx1"/>
+          </a:fontRef>
+        </p:style>
+      </p:cxnSp>
+      <p:cxnSp>
+        <p:nvCxnSpPr>
+          <p:cNvPr id="20" name="Straight Connector 19">
+            <a:extLst>
+              <a:ext uri="{FF2B5EF4-FFF2-40B4-BE49-F238E27FC236}">
+                <a16:creationId xmlns:a16="http://schemas.microsoft.com/office/drawing/2014/main" id="{838816B3-5DC8-4746-A25C-143B3DC4772E}"/>
+              </a:ext>
+            </a:extLst>
+          </p:cNvPr>
+          <p:cNvCxnSpPr>
+            <a:cxnSpLocks/>
+          </p:cNvCxnSpPr>
+          <p:nvPr/>
+        </p:nvCxnSpPr>
+        <p:spPr>
+          <a:xfrm>
+            <a:off x="8442802" y="3169328"/>
+            <a:ext cx="3000375" cy="0"/>
+          </a:xfrm>
+          <a:prstGeom prst="line">
+            <a:avLst/>
+          </a:prstGeom>
+          <a:ln w="28575"/>
+        </p:spPr>
+        <p:style>
+          <a:lnRef idx="1">
+            <a:schemeClr val="accent1"/>
+          </a:lnRef>
+          <a:fillRef idx="0">
+            <a:schemeClr val="accent1"/>
+          </a:fillRef>
+          <a:effectRef idx="0">
+            <a:schemeClr val="accent1"/>
+          </a:effectRef>
+          <a:fontRef idx="minor">
+            <a:schemeClr val="tx1"/>
+          </a:fontRef>
+        </p:style>
+      </p:cxnSp>
+      <p:cxnSp>
+        <p:nvCxnSpPr>
+          <p:cNvPr id="21" name="Straight Connector 20">
+            <a:extLst>
+              <a:ext uri="{FF2B5EF4-FFF2-40B4-BE49-F238E27FC236}">
+                <a16:creationId xmlns:a16="http://schemas.microsoft.com/office/drawing/2014/main" id="{FC3028A4-F2CE-47E9-85C9-2D83AB3B597F}"/>
+              </a:ext>
+            </a:extLst>
+          </p:cNvPr>
+          <p:cNvCxnSpPr>
+            <a:cxnSpLocks/>
+          </p:cNvCxnSpPr>
+          <p:nvPr/>
+        </p:nvCxnSpPr>
+        <p:spPr>
+          <a:xfrm>
+            <a:off x="8442802" y="3429000"/>
+            <a:ext cx="3000375" cy="0"/>
+          </a:xfrm>
+          <a:prstGeom prst="line">
+            <a:avLst/>
+          </a:prstGeom>
+          <a:ln w="28575"/>
+        </p:spPr>
+        <p:style>
+          <a:lnRef idx="1">
+            <a:schemeClr val="accent1"/>
+          </a:lnRef>
+          <a:fillRef idx="0">
+            <a:schemeClr val="accent1"/>
+          </a:fillRef>
+          <a:effectRef idx="0">
+            <a:schemeClr val="accent1"/>
+          </a:effectRef>
+          <a:fontRef idx="minor">
+            <a:schemeClr val="tx1"/>
+          </a:fontRef>
+        </p:style>
+      </p:cxnSp>
+      <p:cxnSp>
+        <p:nvCxnSpPr>
+          <p:cNvPr id="22" name="Straight Connector 21">
+            <a:extLst>
+              <a:ext uri="{FF2B5EF4-FFF2-40B4-BE49-F238E27FC236}">
+                <a16:creationId xmlns:a16="http://schemas.microsoft.com/office/drawing/2014/main" id="{C39C3098-9928-4E6F-B4AE-B9E5EE13030E}"/>
+              </a:ext>
+            </a:extLst>
+          </p:cNvPr>
+          <p:cNvCxnSpPr>
+            <a:cxnSpLocks/>
+          </p:cNvCxnSpPr>
+          <p:nvPr/>
+        </p:nvCxnSpPr>
+        <p:spPr>
+          <a:xfrm>
+            <a:off x="8442802" y="3732567"/>
+            <a:ext cx="3000375" cy="0"/>
+          </a:xfrm>
+          <a:prstGeom prst="line">
+            <a:avLst/>
+          </a:prstGeom>
+          <a:ln w="28575"/>
+        </p:spPr>
+        <p:style>
+          <a:lnRef idx="1">
+            <a:schemeClr val="accent1"/>
+          </a:lnRef>
+          <a:fillRef idx="0">
+            <a:schemeClr val="accent1"/>
+          </a:fillRef>
+          <a:effectRef idx="0">
+            <a:schemeClr val="accent1"/>
+          </a:effectRef>
+          <a:fontRef idx="minor">
+            <a:schemeClr val="tx1"/>
+          </a:fontRef>
+        </p:style>
+      </p:cxnSp>
+      <p:cxnSp>
+        <p:nvCxnSpPr>
+          <p:cNvPr id="23" name="Straight Connector 22">
+            <a:extLst>
+              <a:ext uri="{FF2B5EF4-FFF2-40B4-BE49-F238E27FC236}">
+                <a16:creationId xmlns:a16="http://schemas.microsoft.com/office/drawing/2014/main" id="{71FA9B90-7948-44F7-B846-FC10B48FA5C7}"/>
+              </a:ext>
+            </a:extLst>
+          </p:cNvPr>
+          <p:cNvCxnSpPr>
+            <a:cxnSpLocks/>
+          </p:cNvCxnSpPr>
+          <p:nvPr/>
+        </p:nvCxnSpPr>
+        <p:spPr>
+          <a:xfrm>
+            <a:off x="8408648" y="4085158"/>
+            <a:ext cx="3000375" cy="0"/>
+          </a:xfrm>
+          <a:prstGeom prst="line">
+            <a:avLst/>
+          </a:prstGeom>
+          <a:ln w="28575"/>
+        </p:spPr>
+        <p:style>
+          <a:lnRef idx="1">
+            <a:schemeClr val="accent1"/>
+          </a:lnRef>
+          <a:fillRef idx="0">
+            <a:schemeClr val="accent1"/>
+          </a:fillRef>
+          <a:effectRef idx="0">
+            <a:schemeClr val="accent1"/>
+          </a:effectRef>
+          <a:fontRef idx="minor">
+            <a:schemeClr val="tx1"/>
+          </a:fontRef>
+        </p:style>
+      </p:cxnSp>
+      <p:cxnSp>
+        <p:nvCxnSpPr>
+          <p:cNvPr id="25" name="Straight Connector 24">
+            <a:extLst>
+              <a:ext uri="{FF2B5EF4-FFF2-40B4-BE49-F238E27FC236}">
+                <a16:creationId xmlns:a16="http://schemas.microsoft.com/office/drawing/2014/main" id="{4B4B6E20-9B7C-4914-8765-B7496DF621CC}"/>
+              </a:ext>
+            </a:extLst>
+          </p:cNvPr>
+          <p:cNvCxnSpPr>
+            <a:cxnSpLocks/>
+          </p:cNvCxnSpPr>
+          <p:nvPr/>
+        </p:nvCxnSpPr>
+        <p:spPr>
+          <a:xfrm>
+            <a:off x="8408648" y="4333782"/>
+            <a:ext cx="3000375" cy="0"/>
+          </a:xfrm>
+          <a:prstGeom prst="line">
+            <a:avLst/>
+          </a:prstGeom>
+          <a:ln w="28575"/>
+        </p:spPr>
+        <p:style>
+          <a:lnRef idx="1">
+            <a:schemeClr val="accent1"/>
+          </a:lnRef>
+          <a:fillRef idx="0">
+            <a:schemeClr val="accent1"/>
+          </a:fillRef>
+          <a:effectRef idx="0">
+            <a:schemeClr val="accent1"/>
+          </a:effectRef>
+          <a:fontRef idx="minor">
+            <a:schemeClr val="tx1"/>
+          </a:fontRef>
+        </p:style>
+      </p:cxnSp>
+    </p:spTree>
+    <p:extLst>
+      <p:ext uri="{BB962C8B-B14F-4D97-AF65-F5344CB8AC3E}">
+        <p14:creationId xmlns:p14="http://schemas.microsoft.com/office/powerpoint/2010/main" val="2044870542"/>
+      </p:ext>
+    </p:extLst>
+  </p:cSld>
+  <p:clrMapOvr>
+    <a:masterClrMapping/>
+  </p:clrMapOvr>
+</p:sld>
+</file>
+
+<file path=ppt/slides/slide11.xml><?xml version="1.0" encoding="utf-8"?>
+<p:sld xmlns:a="http://schemas.openxmlformats.org/drawingml/2006/main" xmlns:r="http://schemas.openxmlformats.org/officeDocument/2006/relationships" xmlns:p="http://schemas.openxmlformats.org/presentationml/2006/main">
+  <p:cSld>
+    <p:spTree>
+      <p:nvGrpSpPr>
+        <p:cNvPr id="1" name=""/>
+        <p:cNvGrpSpPr/>
+        <p:nvPr/>
+      </p:nvGrpSpPr>
+      <p:grpSpPr>
+        <a:xfrm>
+          <a:off x="0" y="0"/>
+          <a:ext cx="0" cy="0"/>
+          <a:chOff x="0" y="0"/>
+          <a:chExt cx="0" cy="0"/>
+        </a:xfrm>
+      </p:grpSpPr>
+      <p:sp>
+        <p:nvSpPr>
+          <p:cNvPr id="2" name="Title 1">
+            <a:extLst>
+              <a:ext uri="{FF2B5EF4-FFF2-40B4-BE49-F238E27FC236}">
+                <a16:creationId xmlns:a16="http://schemas.microsoft.com/office/drawing/2014/main" id="{E20219A9-ED48-4EB4-9E6E-5DC82134B943}"/>
+              </a:ext>
+            </a:extLst>
+          </p:cNvPr>
+          <p:cNvSpPr>
+            <a:spLocks noGrp="1"/>
+          </p:cNvSpPr>
+          <p:nvPr>
+            <p:ph type="title"/>
+          </p:nvPr>
+        </p:nvSpPr>
+        <p:spPr/>
+        <p:txBody>
+          <a:bodyPr/>
+          <a:lstStyle/>
+          <a:p>
+            <a:r>
+              <a:rPr lang="en-US" dirty="0"/>
+              <a:t>General notes on coding style</a:t>
+            </a:r>
+          </a:p>
+        </p:txBody>
+      </p:sp>
+      <p:sp>
+        <p:nvSpPr>
+          <p:cNvPr id="4" name="Content Placeholder 2">
+            <a:extLst>
+              <a:ext uri="{FF2B5EF4-FFF2-40B4-BE49-F238E27FC236}">
+                <a16:creationId xmlns:a16="http://schemas.microsoft.com/office/drawing/2014/main" id="{FDA69C96-D191-484C-84EC-1DCA82353DBA}"/>
+              </a:ext>
+            </a:extLst>
+          </p:cNvPr>
+          <p:cNvSpPr>
+            <a:spLocks noGrp="1"/>
+          </p:cNvSpPr>
+          <p:nvPr>
+            <p:ph idx="1"/>
+          </p:nvPr>
+        </p:nvSpPr>
+        <p:spPr>
+          <a:xfrm>
+            <a:off x="838201" y="1825624"/>
+            <a:ext cx="5461000" cy="3366136"/>
+          </a:xfrm>
+        </p:spPr>
+        <p:txBody>
+          <a:bodyPr>
+            <a:normAutofit/>
+          </a:bodyPr>
+          <a:lstStyle/>
+          <a:p>
+            <a:r>
+              <a:rPr lang="en-US" sz="1800" dirty="0"/>
+              <a:t>In many cases stacks of frames (on top of each other, of the same size) are used. The frame at the top of the stack is visible to the user.</a:t>
+            </a:r>
+          </a:p>
+          <a:p>
+            <a:r>
+              <a:rPr lang="en-US" sz="1800" dirty="0"/>
+              <a:t>Example in the alongside snippet from the </a:t>
+            </a:r>
+            <a:r>
+              <a:rPr lang="en-US" sz="1800" dirty="0" err="1">
+                <a:latin typeface="Courier New" panose="02070309020205020404" pitchFamily="49" charset="0"/>
+                <a:cs typeface="Courier New" panose="02070309020205020404" pitchFamily="49" charset="0"/>
+              </a:rPr>
+              <a:t>mainapplication</a:t>
+            </a:r>
+            <a:r>
+              <a:rPr lang="en-US" sz="1800" dirty="0"/>
+              <a:t> module, the </a:t>
+            </a:r>
+            <a:r>
+              <a:rPr lang="en-US" sz="1800" dirty="0" err="1">
+                <a:latin typeface="Courier New" panose="02070309020205020404" pitchFamily="49" charset="0"/>
+                <a:cs typeface="Courier New" panose="02070309020205020404" pitchFamily="49" charset="0"/>
+              </a:rPr>
+              <a:t>WelcomeFrame</a:t>
+            </a:r>
+            <a:r>
+              <a:rPr lang="en-US" sz="1800" dirty="0">
+                <a:latin typeface="Courier New" panose="02070309020205020404" pitchFamily="49" charset="0"/>
+                <a:cs typeface="Courier New" panose="02070309020205020404" pitchFamily="49" charset="0"/>
+              </a:rPr>
+              <a:t>, </a:t>
+            </a:r>
+            <a:r>
+              <a:rPr lang="en-US" sz="1800" dirty="0" err="1">
+                <a:latin typeface="Courier New" panose="02070309020205020404" pitchFamily="49" charset="0"/>
+                <a:cs typeface="Courier New" panose="02070309020205020404" pitchFamily="49" charset="0"/>
+              </a:rPr>
+              <a:t>ConfigureFrame</a:t>
+            </a:r>
+            <a:r>
+              <a:rPr lang="en-US" sz="1800" dirty="0">
+                <a:latin typeface="Courier New" panose="02070309020205020404" pitchFamily="49" charset="0"/>
+                <a:cs typeface="Courier New" panose="02070309020205020404" pitchFamily="49" charset="0"/>
+              </a:rPr>
+              <a:t>, </a:t>
+            </a:r>
+            <a:r>
+              <a:rPr lang="en-US" sz="1800" dirty="0" err="1">
+                <a:latin typeface="Courier New" panose="02070309020205020404" pitchFamily="49" charset="0"/>
+                <a:cs typeface="Courier New" panose="02070309020205020404" pitchFamily="49" charset="0"/>
+              </a:rPr>
+              <a:t>ExecuteFrame</a:t>
+            </a:r>
+            <a:r>
+              <a:rPr lang="en-US" sz="1800" dirty="0">
+                <a:latin typeface="Courier New" panose="02070309020205020404" pitchFamily="49" charset="0"/>
+                <a:cs typeface="Courier New" panose="02070309020205020404" pitchFamily="49" charset="0"/>
+              </a:rPr>
+              <a:t>, </a:t>
+            </a:r>
+            <a:r>
+              <a:rPr lang="en-US" sz="1800" dirty="0" err="1">
+                <a:latin typeface="Courier New" panose="02070309020205020404" pitchFamily="49" charset="0"/>
+                <a:cs typeface="Courier New" panose="02070309020205020404" pitchFamily="49" charset="0"/>
+              </a:rPr>
+              <a:t>VisualizeFrame</a:t>
+            </a:r>
+            <a:r>
+              <a:rPr lang="en-US" sz="1800" dirty="0">
+                <a:latin typeface="Courier New" panose="02070309020205020404" pitchFamily="49" charset="0"/>
+                <a:cs typeface="Courier New" panose="02070309020205020404" pitchFamily="49" charset="0"/>
+              </a:rPr>
+              <a:t> </a:t>
+            </a:r>
+            <a:r>
+              <a:rPr lang="en-US" sz="1800" dirty="0"/>
+              <a:t>and </a:t>
+            </a:r>
+            <a:r>
+              <a:rPr lang="en-US" sz="1800" dirty="0" err="1">
+                <a:latin typeface="Courier New" panose="02070309020205020404" pitchFamily="49" charset="0"/>
+                <a:cs typeface="Courier New" panose="02070309020205020404" pitchFamily="49" charset="0"/>
+              </a:rPr>
+              <a:t>OperationsFrame</a:t>
+            </a:r>
+            <a:r>
+              <a:rPr lang="en-US" sz="1800" dirty="0"/>
+              <a:t> are stacked on top of each other. The </a:t>
+            </a:r>
+            <a:r>
+              <a:rPr lang="en-US" sz="1800" dirty="0" err="1">
+                <a:latin typeface="Courier New" panose="02070309020205020404" pitchFamily="49" charset="0"/>
+                <a:cs typeface="Courier New" panose="02070309020205020404" pitchFamily="49" charset="0"/>
+              </a:rPr>
+              <a:t>show_frame</a:t>
+            </a:r>
+            <a:r>
+              <a:rPr lang="en-US" sz="1800" dirty="0">
+                <a:latin typeface="Courier New" panose="02070309020205020404" pitchFamily="49" charset="0"/>
+                <a:cs typeface="Courier New" panose="02070309020205020404" pitchFamily="49" charset="0"/>
+              </a:rPr>
+              <a:t>(.) </a:t>
+            </a:r>
+            <a:r>
+              <a:rPr lang="en-US" sz="1800" dirty="0"/>
+              <a:t>function is used to push a required frame to the top of the stack.</a:t>
+            </a:r>
+          </a:p>
+          <a:p>
+            <a:pPr marL="0" indent="0">
+              <a:buNone/>
+            </a:pPr>
+            <a:endParaRPr lang="en-US" sz="1800" dirty="0">
+              <a:cs typeface="Courier New" panose="02070309020205020404" pitchFamily="49" charset="0"/>
+            </a:endParaRPr>
+          </a:p>
+        </p:txBody>
+      </p:sp>
+      <p:sp>
+        <p:nvSpPr>
+          <p:cNvPr id="6" name="TextBox 5">
+            <a:extLst>
+              <a:ext uri="{FF2B5EF4-FFF2-40B4-BE49-F238E27FC236}">
+                <a16:creationId xmlns:a16="http://schemas.microsoft.com/office/drawing/2014/main" id="{87C48532-72B3-4A55-984A-F003E1CC3EE5}"/>
+              </a:ext>
+            </a:extLst>
+          </p:cNvPr>
+          <p:cNvSpPr txBox="1"/>
+          <p:nvPr/>
+        </p:nvSpPr>
+        <p:spPr>
+          <a:xfrm>
+            <a:off x="6590346" y="1770283"/>
+            <a:ext cx="5693094" cy="3970318"/>
+          </a:xfrm>
+          <a:prstGeom prst="rect">
+            <a:avLst/>
+          </a:prstGeom>
+          <a:noFill/>
+        </p:spPr>
+        <p:txBody>
+          <a:bodyPr wrap="square">
+            <a:spAutoFit/>
+          </a:bodyPr>
+          <a:lstStyle/>
+          <a:p>
+            <a:pPr marL="0" indent="0">
+              <a:buNone/>
+            </a:pPr>
+            <a:r>
+              <a:rPr lang="en-US" sz="1200" dirty="0" err="1">
+                <a:latin typeface="Courier New" panose="02070309020205020404" pitchFamily="49" charset="0"/>
+                <a:cs typeface="Courier New" panose="02070309020205020404" pitchFamily="49" charset="0"/>
+              </a:rPr>
+              <a:t>self.frames</a:t>
+            </a:r>
+            <a:r>
+              <a:rPr lang="en-US" sz="1200" dirty="0">
+                <a:latin typeface="Courier New" panose="02070309020205020404" pitchFamily="49" charset="0"/>
+                <a:cs typeface="Courier New" panose="02070309020205020404" pitchFamily="49" charset="0"/>
+              </a:rPr>
+              <a:t> = {}</a:t>
+            </a:r>
+          </a:p>
+          <a:p>
+            <a:pPr marL="0" indent="0">
+              <a:buNone/>
+            </a:pPr>
+            <a:r>
+              <a:rPr lang="en-US" sz="1200" dirty="0">
+                <a:latin typeface="Courier New" panose="02070309020205020404" pitchFamily="49" charset="0"/>
+                <a:cs typeface="Courier New" panose="02070309020205020404" pitchFamily="49" charset="0"/>
+              </a:rPr>
+              <a:t># put all of the pages in the same location;</a:t>
+            </a:r>
+          </a:p>
+          <a:p>
+            <a:pPr marL="0" indent="0">
+              <a:buNone/>
+            </a:pPr>
+            <a:r>
+              <a:rPr lang="en-US" sz="1200" dirty="0">
+                <a:latin typeface="Courier New" panose="02070309020205020404" pitchFamily="49" charset="0"/>
+                <a:cs typeface="Courier New" panose="02070309020205020404" pitchFamily="49" charset="0"/>
+              </a:rPr>
+              <a:t># the one on the top of the stacking order</a:t>
+            </a:r>
+          </a:p>
+          <a:p>
+            <a:pPr marL="0" indent="0">
+              <a:buNone/>
+            </a:pPr>
+            <a:r>
+              <a:rPr lang="en-US" sz="1200" dirty="0">
+                <a:latin typeface="Courier New" panose="02070309020205020404" pitchFamily="49" charset="0"/>
+                <a:cs typeface="Courier New" panose="02070309020205020404" pitchFamily="49" charset="0"/>
+              </a:rPr>
+              <a:t># will be the one that is visible.</a:t>
+            </a:r>
+          </a:p>
+          <a:p>
+            <a:pPr marL="0" indent="0">
+              <a:buNone/>
+            </a:pPr>
+            <a:r>
+              <a:rPr lang="en-US" sz="1200" dirty="0">
+                <a:latin typeface="Courier New" panose="02070309020205020404" pitchFamily="49" charset="0"/>
+                <a:cs typeface="Courier New" panose="02070309020205020404" pitchFamily="49" charset="0"/>
+              </a:rPr>
+              <a:t>for F in (</a:t>
+            </a:r>
+            <a:r>
+              <a:rPr lang="en-US" sz="1200" dirty="0" err="1">
+                <a:highlight>
+                  <a:srgbClr val="FFFF00"/>
+                </a:highlight>
+                <a:latin typeface="Courier New" panose="02070309020205020404" pitchFamily="49" charset="0"/>
+                <a:cs typeface="Courier New" panose="02070309020205020404" pitchFamily="49" charset="0"/>
+              </a:rPr>
+              <a:t>WelcomeFrame</a:t>
+            </a:r>
+            <a:r>
+              <a:rPr lang="en-US" sz="1200" dirty="0">
+                <a:highlight>
+                  <a:srgbClr val="FFFF00"/>
+                </a:highlight>
+                <a:latin typeface="Courier New" panose="02070309020205020404" pitchFamily="49" charset="0"/>
+                <a:cs typeface="Courier New" panose="02070309020205020404" pitchFamily="49" charset="0"/>
+              </a:rPr>
+              <a:t>, </a:t>
+            </a:r>
+            <a:r>
+              <a:rPr lang="en-US" sz="1200" dirty="0" err="1">
+                <a:highlight>
+                  <a:srgbClr val="FFFF00"/>
+                </a:highlight>
+                <a:latin typeface="Courier New" panose="02070309020205020404" pitchFamily="49" charset="0"/>
+                <a:cs typeface="Courier New" panose="02070309020205020404" pitchFamily="49" charset="0"/>
+              </a:rPr>
+              <a:t>ConfigureFrame</a:t>
+            </a:r>
+            <a:r>
+              <a:rPr lang="en-US" sz="1200" dirty="0">
+                <a:highlight>
+                  <a:srgbClr val="FFFF00"/>
+                </a:highlight>
+                <a:latin typeface="Courier New" panose="02070309020205020404" pitchFamily="49" charset="0"/>
+                <a:cs typeface="Courier New" panose="02070309020205020404" pitchFamily="49" charset="0"/>
+              </a:rPr>
+              <a:t>, </a:t>
+            </a:r>
+            <a:r>
+              <a:rPr lang="en-US" sz="1200" dirty="0" err="1">
+                <a:highlight>
+                  <a:srgbClr val="FFFF00"/>
+                </a:highlight>
+                <a:latin typeface="Courier New" panose="02070309020205020404" pitchFamily="49" charset="0"/>
+                <a:cs typeface="Courier New" panose="02070309020205020404" pitchFamily="49" charset="0"/>
+              </a:rPr>
+              <a:t>ExecuteFrame</a:t>
+            </a:r>
+            <a:r>
+              <a:rPr lang="en-US" sz="1200" dirty="0">
+                <a:highlight>
+                  <a:srgbClr val="FFFF00"/>
+                </a:highlight>
+                <a:latin typeface="Courier New" panose="02070309020205020404" pitchFamily="49" charset="0"/>
+                <a:cs typeface="Courier New" panose="02070309020205020404" pitchFamily="49" charset="0"/>
+              </a:rPr>
+              <a:t>, </a:t>
+            </a:r>
+            <a:r>
+              <a:rPr lang="en-US" sz="1200" dirty="0" err="1">
+                <a:highlight>
+                  <a:srgbClr val="FFFF00"/>
+                </a:highlight>
+                <a:latin typeface="Courier New" panose="02070309020205020404" pitchFamily="49" charset="0"/>
+                <a:cs typeface="Courier New" panose="02070309020205020404" pitchFamily="49" charset="0"/>
+              </a:rPr>
+              <a:t>VisualizeFrame</a:t>
+            </a:r>
+            <a:r>
+              <a:rPr lang="en-US" sz="1200" dirty="0">
+                <a:highlight>
+                  <a:srgbClr val="FFFF00"/>
+                </a:highlight>
+                <a:latin typeface="Courier New" panose="02070309020205020404" pitchFamily="49" charset="0"/>
+                <a:cs typeface="Courier New" panose="02070309020205020404" pitchFamily="49" charset="0"/>
+              </a:rPr>
+              <a:t>, </a:t>
+            </a:r>
+            <a:r>
+              <a:rPr lang="en-US" sz="1200" dirty="0" err="1">
+                <a:highlight>
+                  <a:srgbClr val="FFFF00"/>
+                </a:highlight>
+                <a:latin typeface="Courier New" panose="02070309020205020404" pitchFamily="49" charset="0"/>
+                <a:cs typeface="Courier New" panose="02070309020205020404" pitchFamily="49" charset="0"/>
+              </a:rPr>
+              <a:t>OperationsFrame</a:t>
+            </a:r>
+            <a:r>
+              <a:rPr lang="en-US" sz="1200" dirty="0">
+                <a:latin typeface="Courier New" panose="02070309020205020404" pitchFamily="49" charset="0"/>
+                <a:cs typeface="Courier New" panose="02070309020205020404" pitchFamily="49" charset="0"/>
+              </a:rPr>
+              <a:t>):</a:t>
+            </a:r>
+          </a:p>
+          <a:p>
+            <a:pPr marL="0" indent="0">
+              <a:buNone/>
+            </a:pPr>
+            <a:r>
+              <a:rPr lang="en-US" sz="1200" dirty="0">
+                <a:latin typeface="Courier New" panose="02070309020205020404" pitchFamily="49" charset="0"/>
+                <a:cs typeface="Courier New" panose="02070309020205020404" pitchFamily="49" charset="0"/>
+              </a:rPr>
+              <a:t>    </a:t>
+            </a:r>
+            <a:r>
+              <a:rPr lang="en-US" sz="1200" dirty="0" err="1">
+                <a:latin typeface="Courier New" panose="02070309020205020404" pitchFamily="49" charset="0"/>
+                <a:cs typeface="Courier New" panose="02070309020205020404" pitchFamily="49" charset="0"/>
+              </a:rPr>
+              <a:t>page_name</a:t>
+            </a:r>
+            <a:r>
+              <a:rPr lang="en-US" sz="1200" dirty="0">
+                <a:latin typeface="Courier New" panose="02070309020205020404" pitchFamily="49" charset="0"/>
+                <a:cs typeface="Courier New" panose="02070309020205020404" pitchFamily="49" charset="0"/>
+              </a:rPr>
+              <a:t> = </a:t>
+            </a:r>
+            <a:r>
+              <a:rPr lang="en-US" sz="1200" dirty="0" err="1">
+                <a:latin typeface="Courier New" panose="02070309020205020404" pitchFamily="49" charset="0"/>
+                <a:cs typeface="Courier New" panose="02070309020205020404" pitchFamily="49" charset="0"/>
+              </a:rPr>
+              <a:t>F.__name</a:t>
+            </a:r>
+            <a:r>
+              <a:rPr lang="en-US" sz="1200" dirty="0">
+                <a:latin typeface="Courier New" panose="02070309020205020404" pitchFamily="49" charset="0"/>
+                <a:cs typeface="Courier New" panose="02070309020205020404" pitchFamily="49" charset="0"/>
+              </a:rPr>
+              <a:t>__</a:t>
+            </a:r>
+          </a:p>
+          <a:p>
+            <a:pPr marL="0" indent="0">
+              <a:buNone/>
+            </a:pPr>
+            <a:r>
+              <a:rPr lang="en-US" sz="1200" dirty="0">
+                <a:latin typeface="Courier New" panose="02070309020205020404" pitchFamily="49" charset="0"/>
+                <a:cs typeface="Courier New" panose="02070309020205020404" pitchFamily="49" charset="0"/>
+              </a:rPr>
+              <a:t>    frame = F(parent=container, controller=self)</a:t>
+            </a:r>
+          </a:p>
+          <a:p>
+            <a:pPr marL="0" indent="0">
+              <a:buNone/>
+            </a:pPr>
+            <a:r>
+              <a:rPr lang="en-US" sz="1200" dirty="0">
+                <a:latin typeface="Courier New" panose="02070309020205020404" pitchFamily="49" charset="0"/>
+                <a:cs typeface="Courier New" panose="02070309020205020404" pitchFamily="49" charset="0"/>
+              </a:rPr>
+              <a:t>    </a:t>
+            </a:r>
+            <a:r>
+              <a:rPr lang="en-US" sz="1200" dirty="0" err="1">
+                <a:latin typeface="Courier New" panose="02070309020205020404" pitchFamily="49" charset="0"/>
+                <a:cs typeface="Courier New" panose="02070309020205020404" pitchFamily="49" charset="0"/>
+              </a:rPr>
+              <a:t>self.frames</a:t>
+            </a:r>
+            <a:r>
+              <a:rPr lang="en-US" sz="1200" dirty="0">
+                <a:latin typeface="Courier New" panose="02070309020205020404" pitchFamily="49" charset="0"/>
+                <a:cs typeface="Courier New" panose="02070309020205020404" pitchFamily="49" charset="0"/>
+              </a:rPr>
+              <a:t>[</a:t>
+            </a:r>
+            <a:r>
+              <a:rPr lang="en-US" sz="1200" dirty="0" err="1">
+                <a:latin typeface="Courier New" panose="02070309020205020404" pitchFamily="49" charset="0"/>
+                <a:cs typeface="Courier New" panose="02070309020205020404" pitchFamily="49" charset="0"/>
+              </a:rPr>
+              <a:t>page_name</a:t>
+            </a:r>
+            <a:r>
+              <a:rPr lang="en-US" sz="1200" dirty="0">
+                <a:latin typeface="Courier New" panose="02070309020205020404" pitchFamily="49" charset="0"/>
+                <a:cs typeface="Courier New" panose="02070309020205020404" pitchFamily="49" charset="0"/>
+              </a:rPr>
+              <a:t>] = frame</a:t>
+            </a:r>
+          </a:p>
+          <a:p>
+            <a:pPr marL="0" indent="0">
+              <a:buNone/>
+            </a:pPr>
+            <a:endParaRPr lang="en-US" sz="1200" dirty="0">
+              <a:latin typeface="Courier New" panose="02070309020205020404" pitchFamily="49" charset="0"/>
+              <a:cs typeface="Courier New" panose="02070309020205020404" pitchFamily="49" charset="0"/>
+            </a:endParaRPr>
+          </a:p>
+          <a:p>
+            <a:pPr marL="0" indent="0">
+              <a:buNone/>
+            </a:pPr>
+            <a:r>
+              <a:rPr lang="en-US" sz="1200" dirty="0">
+                <a:latin typeface="Courier New" panose="02070309020205020404" pitchFamily="49" charset="0"/>
+                <a:cs typeface="Courier New" panose="02070309020205020404" pitchFamily="49" charset="0"/>
+              </a:rPr>
+              <a:t>    # put all of the pages in the same location;</a:t>
+            </a:r>
+          </a:p>
+          <a:p>
+            <a:pPr marL="0" indent="0">
+              <a:buNone/>
+            </a:pPr>
+            <a:r>
+              <a:rPr lang="en-US" sz="1200" dirty="0">
+                <a:latin typeface="Courier New" panose="02070309020205020404" pitchFamily="49" charset="0"/>
+                <a:cs typeface="Courier New" panose="02070309020205020404" pitchFamily="49" charset="0"/>
+              </a:rPr>
+              <a:t>    # the one on the top of the stacking order</a:t>
+            </a:r>
+          </a:p>
+          <a:p>
+            <a:pPr marL="0" indent="0">
+              <a:buNone/>
+            </a:pPr>
+            <a:r>
+              <a:rPr lang="en-US" sz="1200" dirty="0">
+                <a:latin typeface="Courier New" panose="02070309020205020404" pitchFamily="49" charset="0"/>
+                <a:cs typeface="Courier New" panose="02070309020205020404" pitchFamily="49" charset="0"/>
+              </a:rPr>
+              <a:t>            # will be the one that is visible.</a:t>
+            </a:r>
+          </a:p>
+          <a:p>
+            <a:pPr marL="0" indent="0">
+              <a:buNone/>
+            </a:pPr>
+            <a:r>
+              <a:rPr lang="en-US" sz="1200" dirty="0">
+                <a:latin typeface="Courier New" panose="02070309020205020404" pitchFamily="49" charset="0"/>
+                <a:cs typeface="Courier New" panose="02070309020205020404" pitchFamily="49" charset="0"/>
+              </a:rPr>
+              <a:t>    </a:t>
+            </a:r>
+            <a:r>
+              <a:rPr lang="en-US" sz="1200" dirty="0" err="1">
+                <a:latin typeface="Courier New" panose="02070309020205020404" pitchFamily="49" charset="0"/>
+                <a:cs typeface="Courier New" panose="02070309020205020404" pitchFamily="49" charset="0"/>
+              </a:rPr>
+              <a:t>frame.grid</a:t>
+            </a:r>
+            <a:r>
+              <a:rPr lang="en-US" sz="1200" dirty="0">
+                <a:latin typeface="Courier New" panose="02070309020205020404" pitchFamily="49" charset="0"/>
+                <a:cs typeface="Courier New" panose="02070309020205020404" pitchFamily="49" charset="0"/>
+              </a:rPr>
+              <a:t>(row=0, column=0, sticky="</a:t>
+            </a:r>
+            <a:r>
+              <a:rPr lang="en-US" sz="1200" dirty="0" err="1">
+                <a:latin typeface="Courier New" panose="02070309020205020404" pitchFamily="49" charset="0"/>
+                <a:cs typeface="Courier New" panose="02070309020205020404" pitchFamily="49" charset="0"/>
+              </a:rPr>
+              <a:t>nsew</a:t>
+            </a:r>
+            <a:r>
+              <a:rPr lang="en-US" sz="1200" dirty="0">
+                <a:latin typeface="Courier New" panose="02070309020205020404" pitchFamily="49" charset="0"/>
+                <a:cs typeface="Courier New" panose="02070309020205020404" pitchFamily="49" charset="0"/>
+              </a:rPr>
+              <a:t>")</a:t>
+            </a:r>
+          </a:p>
+          <a:p>
+            <a:pPr marL="0" indent="0">
+              <a:buNone/>
+            </a:pPr>
+            <a:endParaRPr lang="en-US" sz="1200" dirty="0">
+              <a:latin typeface="Courier New" panose="02070309020205020404" pitchFamily="49" charset="0"/>
+              <a:cs typeface="Courier New" panose="02070309020205020404" pitchFamily="49" charset="0"/>
+            </a:endParaRPr>
+          </a:p>
+          <a:p>
+            <a:pPr marL="0" indent="0">
+              <a:buNone/>
+            </a:pPr>
+            <a:r>
+              <a:rPr lang="en-US" sz="1200" dirty="0" err="1">
+                <a:latin typeface="Courier New" panose="02070309020205020404" pitchFamily="49" charset="0"/>
+                <a:cs typeface="Courier New" panose="02070309020205020404" pitchFamily="49" charset="0"/>
+              </a:rPr>
+              <a:t>self.show_frame</a:t>
+            </a:r>
+            <a:r>
+              <a:rPr lang="en-US" sz="1200" dirty="0">
+                <a:latin typeface="Courier New" panose="02070309020205020404" pitchFamily="49" charset="0"/>
+                <a:cs typeface="Courier New" panose="02070309020205020404" pitchFamily="49" charset="0"/>
+              </a:rPr>
+              <a:t>("</a:t>
+            </a:r>
+            <a:r>
+              <a:rPr lang="en-US" sz="1200" dirty="0" err="1">
+                <a:latin typeface="Courier New" panose="02070309020205020404" pitchFamily="49" charset="0"/>
+                <a:cs typeface="Courier New" panose="02070309020205020404" pitchFamily="49" charset="0"/>
+              </a:rPr>
+              <a:t>WelcomeFrame</a:t>
+            </a:r>
+            <a:r>
+              <a:rPr lang="en-US" sz="1200" dirty="0">
+                <a:latin typeface="Courier New" panose="02070309020205020404" pitchFamily="49" charset="0"/>
+                <a:cs typeface="Courier New" panose="02070309020205020404" pitchFamily="49" charset="0"/>
+              </a:rPr>
+              <a:t>")  </a:t>
+            </a:r>
+          </a:p>
+          <a:p>
+            <a:pPr marL="0" indent="0">
+              <a:buNone/>
+            </a:pPr>
+            <a:endParaRPr lang="en-US" sz="1200" dirty="0">
+              <a:latin typeface="Courier New" panose="02070309020205020404" pitchFamily="49" charset="0"/>
+              <a:cs typeface="Courier New" panose="02070309020205020404" pitchFamily="49" charset="0"/>
+            </a:endParaRPr>
+          </a:p>
+          <a:p>
+            <a:pPr marL="0" indent="0">
+              <a:buNone/>
+            </a:pPr>
+            <a:r>
+              <a:rPr lang="en-US" sz="1200" dirty="0">
+                <a:latin typeface="Courier New" panose="02070309020205020404" pitchFamily="49" charset="0"/>
+                <a:cs typeface="Courier New" panose="02070309020205020404" pitchFamily="49" charset="0"/>
+              </a:rPr>
+              <a:t>    def </a:t>
+            </a:r>
+            <a:r>
+              <a:rPr lang="en-US" sz="1200" dirty="0" err="1">
+                <a:highlight>
+                  <a:srgbClr val="FFFF00"/>
+                </a:highlight>
+                <a:latin typeface="Courier New" panose="02070309020205020404" pitchFamily="49" charset="0"/>
+                <a:cs typeface="Courier New" panose="02070309020205020404" pitchFamily="49" charset="0"/>
+              </a:rPr>
+              <a:t>show_frame</a:t>
+            </a:r>
+            <a:r>
+              <a:rPr lang="en-US" sz="1200" dirty="0">
+                <a:latin typeface="Courier New" panose="02070309020205020404" pitchFamily="49" charset="0"/>
+                <a:cs typeface="Courier New" panose="02070309020205020404" pitchFamily="49" charset="0"/>
+              </a:rPr>
+              <a:t>(self, </a:t>
+            </a:r>
+            <a:r>
+              <a:rPr lang="en-US" sz="1200" dirty="0" err="1">
+                <a:latin typeface="Courier New" panose="02070309020205020404" pitchFamily="49" charset="0"/>
+                <a:cs typeface="Courier New" panose="02070309020205020404" pitchFamily="49" charset="0"/>
+              </a:rPr>
+              <a:t>page_name</a:t>
+            </a:r>
+            <a:r>
+              <a:rPr lang="en-US" sz="1200" dirty="0">
+                <a:latin typeface="Courier New" panose="02070309020205020404" pitchFamily="49" charset="0"/>
+                <a:cs typeface="Courier New" panose="02070309020205020404" pitchFamily="49" charset="0"/>
+              </a:rPr>
+              <a:t>):</a:t>
+            </a:r>
+          </a:p>
+          <a:p>
+            <a:pPr marL="0" indent="0">
+              <a:buNone/>
+            </a:pPr>
+            <a:r>
+              <a:rPr lang="en-US" sz="1200" dirty="0">
+                <a:latin typeface="Courier New" panose="02070309020205020404" pitchFamily="49" charset="0"/>
+                <a:cs typeface="Courier New" panose="02070309020205020404" pitchFamily="49" charset="0"/>
+              </a:rPr>
+              <a:t>        '''Show a frame for the given page name'''</a:t>
+            </a:r>
+          </a:p>
+          <a:p>
+            <a:pPr marL="0" indent="0">
+              <a:buNone/>
+            </a:pPr>
+            <a:r>
+              <a:rPr lang="en-US" sz="1200" dirty="0">
+                <a:latin typeface="Courier New" panose="02070309020205020404" pitchFamily="49" charset="0"/>
+                <a:cs typeface="Courier New" panose="02070309020205020404" pitchFamily="49" charset="0"/>
+              </a:rPr>
+              <a:t>        frame = </a:t>
+            </a:r>
+            <a:r>
+              <a:rPr lang="en-US" sz="1200" dirty="0" err="1">
+                <a:latin typeface="Courier New" panose="02070309020205020404" pitchFamily="49" charset="0"/>
+                <a:cs typeface="Courier New" panose="02070309020205020404" pitchFamily="49" charset="0"/>
+              </a:rPr>
+              <a:t>self.frames</a:t>
+            </a:r>
+            <a:r>
+              <a:rPr lang="en-US" sz="1200" dirty="0">
+                <a:latin typeface="Courier New" panose="02070309020205020404" pitchFamily="49" charset="0"/>
+                <a:cs typeface="Courier New" panose="02070309020205020404" pitchFamily="49" charset="0"/>
+              </a:rPr>
+              <a:t>[</a:t>
+            </a:r>
+            <a:r>
+              <a:rPr lang="en-US" sz="1200" dirty="0" err="1">
+                <a:latin typeface="Courier New" panose="02070309020205020404" pitchFamily="49" charset="0"/>
+                <a:cs typeface="Courier New" panose="02070309020205020404" pitchFamily="49" charset="0"/>
+              </a:rPr>
+              <a:t>page_name</a:t>
+            </a:r>
+            <a:r>
+              <a:rPr lang="en-US" sz="1200" dirty="0">
+                <a:latin typeface="Courier New" panose="02070309020205020404" pitchFamily="49" charset="0"/>
+                <a:cs typeface="Courier New" panose="02070309020205020404" pitchFamily="49" charset="0"/>
+              </a:rPr>
+              <a:t>]</a:t>
+            </a:r>
+          </a:p>
+          <a:p>
+            <a:pPr marL="0" indent="0">
+              <a:buNone/>
+            </a:pPr>
+            <a:r>
+              <a:rPr lang="en-US" sz="1200" dirty="0">
+                <a:latin typeface="Courier New" panose="02070309020205020404" pitchFamily="49" charset="0"/>
+                <a:cs typeface="Courier New" panose="02070309020205020404" pitchFamily="49" charset="0"/>
+              </a:rPr>
+              <a:t>        </a:t>
+            </a:r>
+            <a:r>
+              <a:rPr lang="en-US" sz="1200" dirty="0" err="1">
+                <a:latin typeface="Courier New" panose="02070309020205020404" pitchFamily="49" charset="0"/>
+                <a:cs typeface="Courier New" panose="02070309020205020404" pitchFamily="49" charset="0"/>
+              </a:rPr>
+              <a:t>frame.tkraise</a:t>
+            </a:r>
+            <a:r>
+              <a:rPr lang="en-US" sz="1200" dirty="0">
+                <a:latin typeface="Courier New" panose="02070309020205020404" pitchFamily="49" charset="0"/>
+                <a:cs typeface="Courier New" panose="02070309020205020404" pitchFamily="49" charset="0"/>
+              </a:rPr>
+              <a:t>()</a:t>
+            </a:r>
+          </a:p>
+        </p:txBody>
+      </p:sp>
+    </p:spTree>
+    <p:extLst>
+      <p:ext uri="{BB962C8B-B14F-4D97-AF65-F5344CB8AC3E}">
+        <p14:creationId xmlns:p14="http://schemas.microsoft.com/office/powerpoint/2010/main" val="2004027451"/>
       </p:ext>
     </p:extLst>
   </p:cSld>
@@ -5611,6 +7098,36 @@
           <a:chExt cx="0" cy="0"/>
         </a:xfrm>
       </p:grpSpPr>
+      <p:pic>
+        <p:nvPicPr>
+          <p:cNvPr id="48" name="Picture 47">
+            <a:extLst>
+              <a:ext uri="{FF2B5EF4-FFF2-40B4-BE49-F238E27FC236}">
+                <a16:creationId xmlns:a16="http://schemas.microsoft.com/office/drawing/2014/main" id="{CCB76972-A7AB-4FA8-8CD7-CC83811B59FC}"/>
+              </a:ext>
+            </a:extLst>
+          </p:cNvPr>
+          <p:cNvPicPr>
+            <a:picLocks noChangeAspect="1"/>
+          </p:cNvPicPr>
+          <p:nvPr/>
+        </p:nvPicPr>
+        <p:blipFill>
+          <a:blip r:embed="rId2"/>
+          <a:stretch>
+            <a:fillRect/>
+          </a:stretch>
+        </p:blipFill>
+        <p:spPr>
+          <a:xfrm>
+            <a:off x="5311321" y="2270995"/>
+            <a:ext cx="6229742" cy="3101088"/>
+          </a:xfrm>
+          <a:prstGeom prst="rect">
+            <a:avLst/>
+          </a:prstGeom>
+        </p:spPr>
+      </p:pic>
       <p:sp>
         <p:nvSpPr>
           <p:cNvPr id="2" name="Title 1">
@@ -5634,7 +7151,7 @@
           <a:p>
             <a:r>
               <a:rPr lang="en-US" dirty="0"/>
-              <a:t>ConfigureFrame.py</a:t>
+              <a:t>configure/cfframe.py</a:t>
             </a:r>
           </a:p>
         </p:txBody>
@@ -5655,19 +7172,1520 @@
             <p:ph idx="1"/>
           </p:nvPr>
         </p:nvSpPr>
-        <p:spPr/>
-        <p:txBody>
-          <a:bodyPr/>
+        <p:spPr>
+          <a:xfrm>
+            <a:off x="838199" y="1825625"/>
+            <a:ext cx="4168322" cy="3918227"/>
+          </a:xfrm>
+        </p:spPr>
+        <p:txBody>
+          <a:bodyPr>
+            <a:normAutofit/>
+          </a:bodyPr>
           <a:lstStyle/>
           <a:p>
-            <a:endParaRPr lang="en-US" dirty="0"/>
-          </a:p>
-        </p:txBody>
-      </p:sp>
+            <a:r>
+              <a:rPr lang="en-US" sz="1800" dirty="0"/>
+              <a:t>The configure folder contains the modules relating to the mission configuration.</a:t>
+            </a:r>
+          </a:p>
+          <a:p>
+            <a:r>
+              <a:rPr lang="en-US" sz="1800" dirty="0" err="1">
+                <a:latin typeface="Courier New" panose="02070309020205020404" pitchFamily="49" charset="0"/>
+                <a:cs typeface="Courier New" panose="02070309020205020404" pitchFamily="49" charset="0"/>
+              </a:rPr>
+              <a:t>cfframe</a:t>
+            </a:r>
+            <a:r>
+              <a:rPr lang="en-US" sz="1800" dirty="0"/>
+              <a:t> module (</a:t>
+            </a:r>
+            <a:r>
+              <a:rPr lang="en-US" sz="1800" dirty="0" err="1">
+                <a:latin typeface="Courier New" panose="02070309020205020404" pitchFamily="49" charset="0"/>
+                <a:cs typeface="Courier New" panose="02070309020205020404" pitchFamily="49" charset="0"/>
+              </a:rPr>
+              <a:t>ConfigureFrame</a:t>
+            </a:r>
+            <a:r>
+              <a:rPr lang="en-US" sz="1800" dirty="0"/>
+              <a:t> class) lays out all the widgets required for configuring various aspects of the mission.</a:t>
+            </a:r>
+          </a:p>
+          <a:p>
+            <a:r>
+              <a:rPr lang="en-US" sz="1800" dirty="0"/>
+              <a:t>The widgets along with their associated modules is presented in the figure.</a:t>
+            </a:r>
+          </a:p>
+        </p:txBody>
+      </p:sp>
+      <p:cxnSp>
+        <p:nvCxnSpPr>
+          <p:cNvPr id="6" name="Straight Arrow Connector 5">
+            <a:extLst>
+              <a:ext uri="{FF2B5EF4-FFF2-40B4-BE49-F238E27FC236}">
+                <a16:creationId xmlns:a16="http://schemas.microsoft.com/office/drawing/2014/main" id="{FBE501FD-F848-4C1A-A833-1A25A2BB402D}"/>
+              </a:ext>
+            </a:extLst>
+          </p:cNvPr>
+          <p:cNvCxnSpPr>
+            <a:cxnSpLocks/>
+          </p:cNvCxnSpPr>
+          <p:nvPr/>
+        </p:nvCxnSpPr>
+        <p:spPr>
+          <a:xfrm>
+            <a:off x="7048500" y="2903192"/>
+            <a:ext cx="312420" cy="342928"/>
+          </a:xfrm>
+          <a:prstGeom prst="straightConnector1">
+            <a:avLst/>
+          </a:prstGeom>
+          <a:ln>
+            <a:tailEnd type="triangle"/>
+          </a:ln>
+        </p:spPr>
+        <p:style>
+          <a:lnRef idx="1">
+            <a:schemeClr val="accent1"/>
+          </a:lnRef>
+          <a:fillRef idx="0">
+            <a:schemeClr val="accent1"/>
+          </a:fillRef>
+          <a:effectRef idx="0">
+            <a:schemeClr val="accent1"/>
+          </a:effectRef>
+          <a:fontRef idx="minor">
+            <a:schemeClr val="tx1"/>
+          </a:fontRef>
+        </p:style>
+      </p:cxnSp>
+      <p:sp>
+        <p:nvSpPr>
+          <p:cNvPr id="7" name="TextBox 6">
+            <a:extLst>
+              <a:ext uri="{FF2B5EF4-FFF2-40B4-BE49-F238E27FC236}">
+                <a16:creationId xmlns:a16="http://schemas.microsoft.com/office/drawing/2014/main" id="{1B1C5349-A40C-4D1C-96DC-C135954906F4}"/>
+              </a:ext>
+            </a:extLst>
+          </p:cNvPr>
+          <p:cNvSpPr txBox="1"/>
+          <p:nvPr/>
+        </p:nvSpPr>
+        <p:spPr>
+          <a:xfrm>
+            <a:off x="6400170" y="2638601"/>
+            <a:ext cx="1023833" cy="276999"/>
+          </a:xfrm>
+          <a:prstGeom prst="rect">
+            <a:avLst/>
+          </a:prstGeom>
+          <a:noFill/>
+        </p:spPr>
+        <p:txBody>
+          <a:bodyPr wrap="square">
+            <a:spAutoFit/>
+          </a:bodyPr>
+          <a:lstStyle/>
+          <a:p>
+            <a:r>
+              <a:rPr lang="en-US" sz="1200" dirty="0" err="1">
+                <a:highlight>
+                  <a:srgbClr val="FFFF00"/>
+                </a:highlight>
+                <a:latin typeface="Courier New" panose="02070309020205020404" pitchFamily="49" charset="0"/>
+                <a:cs typeface="Courier New" panose="02070309020205020404" pitchFamily="49" charset="0"/>
+              </a:rPr>
+              <a:t>cfmission</a:t>
+            </a:r>
+            <a:endParaRPr lang="en-US" sz="1200" dirty="0">
+              <a:highlight>
+                <a:srgbClr val="FFFF00"/>
+              </a:highlight>
+              <a:latin typeface="Courier New" panose="02070309020205020404" pitchFamily="49" charset="0"/>
+              <a:cs typeface="Courier New" panose="02070309020205020404" pitchFamily="49" charset="0"/>
+            </a:endParaRPr>
+          </a:p>
+        </p:txBody>
+      </p:sp>
+      <p:sp>
+        <p:nvSpPr>
+          <p:cNvPr id="10" name="TextBox 9">
+            <a:extLst>
+              <a:ext uri="{FF2B5EF4-FFF2-40B4-BE49-F238E27FC236}">
+                <a16:creationId xmlns:a16="http://schemas.microsoft.com/office/drawing/2014/main" id="{064A035A-497A-46DC-B539-A241054DFF9D}"/>
+              </a:ext>
+            </a:extLst>
+          </p:cNvPr>
+          <p:cNvSpPr txBox="1"/>
+          <p:nvPr/>
+        </p:nvSpPr>
+        <p:spPr>
+          <a:xfrm>
+            <a:off x="8064891" y="3683040"/>
+            <a:ext cx="1279019" cy="276999"/>
+          </a:xfrm>
+          <a:prstGeom prst="rect">
+            <a:avLst/>
+          </a:prstGeom>
+          <a:noFill/>
+        </p:spPr>
+        <p:txBody>
+          <a:bodyPr wrap="square">
+            <a:spAutoFit/>
+          </a:bodyPr>
+          <a:lstStyle/>
+          <a:p>
+            <a:r>
+              <a:rPr lang="en-US" sz="1200" dirty="0" err="1">
+                <a:highlight>
+                  <a:srgbClr val="FFFF00"/>
+                </a:highlight>
+                <a:latin typeface="Courier New" panose="02070309020205020404" pitchFamily="49" charset="0"/>
+                <a:cs typeface="Courier New" panose="02070309020205020404" pitchFamily="49" charset="0"/>
+              </a:rPr>
+              <a:t>cfpropagate</a:t>
+            </a:r>
+            <a:endParaRPr lang="en-US" sz="1200" dirty="0">
+              <a:highlight>
+                <a:srgbClr val="FFFF00"/>
+              </a:highlight>
+              <a:latin typeface="Courier New" panose="02070309020205020404" pitchFamily="49" charset="0"/>
+              <a:cs typeface="Courier New" panose="02070309020205020404" pitchFamily="49" charset="0"/>
+            </a:endParaRPr>
+          </a:p>
+        </p:txBody>
+      </p:sp>
+      <p:sp>
+        <p:nvSpPr>
+          <p:cNvPr id="11" name="TextBox 10">
+            <a:extLst>
+              <a:ext uri="{FF2B5EF4-FFF2-40B4-BE49-F238E27FC236}">
+                <a16:creationId xmlns:a16="http://schemas.microsoft.com/office/drawing/2014/main" id="{E1F7097C-4A9F-4084-BF98-24F5FF78875E}"/>
+              </a:ext>
+            </a:extLst>
+          </p:cNvPr>
+          <p:cNvSpPr txBox="1"/>
+          <p:nvPr/>
+        </p:nvSpPr>
+        <p:spPr>
+          <a:xfrm>
+            <a:off x="8017353" y="2646197"/>
+            <a:ext cx="1279020" cy="276999"/>
+          </a:xfrm>
+          <a:prstGeom prst="rect">
+            <a:avLst/>
+          </a:prstGeom>
+          <a:noFill/>
+        </p:spPr>
+        <p:txBody>
+          <a:bodyPr wrap="square">
+            <a:spAutoFit/>
+          </a:bodyPr>
+          <a:lstStyle/>
+          <a:p>
+            <a:r>
+              <a:rPr lang="en-US" sz="1200" dirty="0" err="1">
+                <a:highlight>
+                  <a:srgbClr val="FFFF00"/>
+                </a:highlight>
+                <a:latin typeface="Courier New" panose="02070309020205020404" pitchFamily="49" charset="0"/>
+                <a:cs typeface="Courier New" panose="02070309020205020404" pitchFamily="49" charset="0"/>
+              </a:rPr>
+              <a:t>cfsatellite</a:t>
+            </a:r>
+            <a:endParaRPr lang="en-US" sz="1200" dirty="0">
+              <a:highlight>
+                <a:srgbClr val="FFFF00"/>
+              </a:highlight>
+              <a:latin typeface="Courier New" panose="02070309020205020404" pitchFamily="49" charset="0"/>
+              <a:cs typeface="Courier New" panose="02070309020205020404" pitchFamily="49" charset="0"/>
+            </a:endParaRPr>
+          </a:p>
+        </p:txBody>
+      </p:sp>
+      <p:sp>
+        <p:nvSpPr>
+          <p:cNvPr id="12" name="TextBox 11">
+            <a:extLst>
+              <a:ext uri="{FF2B5EF4-FFF2-40B4-BE49-F238E27FC236}">
+                <a16:creationId xmlns:a16="http://schemas.microsoft.com/office/drawing/2014/main" id="{C2B09E27-2FC6-45BD-9DC8-1FFA3CA7465C}"/>
+              </a:ext>
+            </a:extLst>
+          </p:cNvPr>
+          <p:cNvSpPr txBox="1"/>
+          <p:nvPr/>
+        </p:nvSpPr>
+        <p:spPr>
+          <a:xfrm>
+            <a:off x="8108250" y="3360252"/>
+            <a:ext cx="945587" cy="276999"/>
+          </a:xfrm>
+          <a:prstGeom prst="rect">
+            <a:avLst/>
+          </a:prstGeom>
+          <a:noFill/>
+        </p:spPr>
+        <p:txBody>
+          <a:bodyPr wrap="square">
+            <a:spAutoFit/>
+          </a:bodyPr>
+          <a:lstStyle/>
+          <a:p>
+            <a:r>
+              <a:rPr lang="en-US" sz="1200" dirty="0" err="1">
+                <a:highlight>
+                  <a:srgbClr val="FFFF00"/>
+                </a:highlight>
+                <a:latin typeface="Courier New" panose="02070309020205020404" pitchFamily="49" charset="0"/>
+                <a:cs typeface="Courier New" panose="02070309020205020404" pitchFamily="49" charset="0"/>
+              </a:rPr>
+              <a:t>cfsensor</a:t>
+            </a:r>
+            <a:endParaRPr lang="en-US" sz="1200" dirty="0">
+              <a:highlight>
+                <a:srgbClr val="FFFF00"/>
+              </a:highlight>
+              <a:latin typeface="Courier New" panose="02070309020205020404" pitchFamily="49" charset="0"/>
+              <a:cs typeface="Courier New" panose="02070309020205020404" pitchFamily="49" charset="0"/>
+            </a:endParaRPr>
+          </a:p>
+        </p:txBody>
+      </p:sp>
+      <p:sp>
+        <p:nvSpPr>
+          <p:cNvPr id="13" name="TextBox 12">
+            <a:extLst>
+              <a:ext uri="{FF2B5EF4-FFF2-40B4-BE49-F238E27FC236}">
+                <a16:creationId xmlns:a16="http://schemas.microsoft.com/office/drawing/2014/main" id="{741CF94B-7B1D-4910-8A6A-05C562F5ADEB}"/>
+              </a:ext>
+            </a:extLst>
+          </p:cNvPr>
+          <p:cNvSpPr txBox="1"/>
+          <p:nvPr/>
+        </p:nvSpPr>
+        <p:spPr>
+          <a:xfrm>
+            <a:off x="9576264" y="2467149"/>
+            <a:ext cx="1628184" cy="276999"/>
+          </a:xfrm>
+          <a:prstGeom prst="rect">
+            <a:avLst/>
+          </a:prstGeom>
+          <a:noFill/>
+        </p:spPr>
+        <p:txBody>
+          <a:bodyPr wrap="square">
+            <a:spAutoFit/>
+          </a:bodyPr>
+          <a:lstStyle/>
+          <a:p>
+            <a:r>
+              <a:rPr lang="en-US" sz="1200" dirty="0" err="1">
+                <a:highlight>
+                  <a:srgbClr val="FFFF00"/>
+                </a:highlight>
+                <a:latin typeface="Courier New" panose="02070309020205020404" pitchFamily="49" charset="0"/>
+                <a:cs typeface="Courier New" panose="02070309020205020404" pitchFamily="49" charset="0"/>
+              </a:rPr>
+              <a:t>cfconstellation</a:t>
+            </a:r>
+            <a:endParaRPr lang="en-US" sz="1200" dirty="0">
+              <a:highlight>
+                <a:srgbClr val="FFFF00"/>
+              </a:highlight>
+              <a:latin typeface="Courier New" panose="02070309020205020404" pitchFamily="49" charset="0"/>
+              <a:cs typeface="Courier New" panose="02070309020205020404" pitchFamily="49" charset="0"/>
+            </a:endParaRPr>
+          </a:p>
+        </p:txBody>
+      </p:sp>
+      <p:sp>
+        <p:nvSpPr>
+          <p:cNvPr id="15" name="TextBox 14">
+            <a:extLst>
+              <a:ext uri="{FF2B5EF4-FFF2-40B4-BE49-F238E27FC236}">
+                <a16:creationId xmlns:a16="http://schemas.microsoft.com/office/drawing/2014/main" id="{14B3E35B-92CA-44C7-B825-7DDE20770358}"/>
+              </a:ext>
+            </a:extLst>
+          </p:cNvPr>
+          <p:cNvSpPr txBox="1"/>
+          <p:nvPr/>
+        </p:nvSpPr>
+        <p:spPr>
+          <a:xfrm>
+            <a:off x="7980009" y="4259747"/>
+            <a:ext cx="1157895" cy="276999"/>
+          </a:xfrm>
+          <a:prstGeom prst="rect">
+            <a:avLst/>
+          </a:prstGeom>
+          <a:noFill/>
+        </p:spPr>
+        <p:txBody>
+          <a:bodyPr wrap="square">
+            <a:spAutoFit/>
+          </a:bodyPr>
+          <a:lstStyle/>
+          <a:p>
+            <a:r>
+              <a:rPr lang="en-US" sz="1200" dirty="0" err="1">
+                <a:highlight>
+                  <a:srgbClr val="FFFF00"/>
+                </a:highlight>
+                <a:latin typeface="Courier New" panose="02070309020205020404" pitchFamily="49" charset="0"/>
+                <a:cs typeface="Courier New" panose="02070309020205020404" pitchFamily="49" charset="0"/>
+              </a:rPr>
+              <a:t>cfcoverage</a:t>
+            </a:r>
+            <a:endParaRPr lang="en-US" sz="1200" dirty="0">
+              <a:highlight>
+                <a:srgbClr val="FFFF00"/>
+              </a:highlight>
+              <a:latin typeface="Courier New" panose="02070309020205020404" pitchFamily="49" charset="0"/>
+              <a:cs typeface="Courier New" panose="02070309020205020404" pitchFamily="49" charset="0"/>
+            </a:endParaRPr>
+          </a:p>
+        </p:txBody>
+      </p:sp>
+      <p:sp>
+        <p:nvSpPr>
+          <p:cNvPr id="16" name="TextBox 15">
+            <a:extLst>
+              <a:ext uri="{FF2B5EF4-FFF2-40B4-BE49-F238E27FC236}">
+                <a16:creationId xmlns:a16="http://schemas.microsoft.com/office/drawing/2014/main" id="{CC595F1F-30F4-4F06-A2BA-A2C15D2CF480}"/>
+              </a:ext>
+            </a:extLst>
+          </p:cNvPr>
+          <p:cNvSpPr txBox="1"/>
+          <p:nvPr/>
+        </p:nvSpPr>
+        <p:spPr>
+          <a:xfrm>
+            <a:off x="10336666" y="3550820"/>
+            <a:ext cx="1593727" cy="276999"/>
+          </a:xfrm>
+          <a:prstGeom prst="rect">
+            <a:avLst/>
+          </a:prstGeom>
+          <a:noFill/>
+        </p:spPr>
+        <p:txBody>
+          <a:bodyPr wrap="square">
+            <a:spAutoFit/>
+          </a:bodyPr>
+          <a:lstStyle/>
+          <a:p>
+            <a:r>
+              <a:rPr lang="en-US" sz="1200" dirty="0" err="1">
+                <a:highlight>
+                  <a:srgbClr val="FFFF00"/>
+                </a:highlight>
+                <a:latin typeface="Courier New" panose="02070309020205020404" pitchFamily="49" charset="0"/>
+                <a:cs typeface="Courier New" panose="02070309020205020404" pitchFamily="49" charset="0"/>
+              </a:rPr>
+              <a:t>cfgroundstation</a:t>
+            </a:r>
+            <a:endParaRPr lang="en-US" sz="1200" dirty="0">
+              <a:highlight>
+                <a:srgbClr val="FFFF00"/>
+              </a:highlight>
+              <a:latin typeface="Courier New" panose="02070309020205020404" pitchFamily="49" charset="0"/>
+              <a:cs typeface="Courier New" panose="02070309020205020404" pitchFamily="49" charset="0"/>
+            </a:endParaRPr>
+          </a:p>
+        </p:txBody>
+      </p:sp>
+      <p:cxnSp>
+        <p:nvCxnSpPr>
+          <p:cNvPr id="17" name="Straight Arrow Connector 16">
+            <a:extLst>
+              <a:ext uri="{FF2B5EF4-FFF2-40B4-BE49-F238E27FC236}">
+                <a16:creationId xmlns:a16="http://schemas.microsoft.com/office/drawing/2014/main" id="{E45C92E9-0DFE-4D6D-A0F1-47B95431EB13}"/>
+              </a:ext>
+            </a:extLst>
+          </p:cNvPr>
+          <p:cNvCxnSpPr>
+            <a:cxnSpLocks/>
+          </p:cNvCxnSpPr>
+          <p:nvPr/>
+        </p:nvCxnSpPr>
+        <p:spPr>
+          <a:xfrm>
+            <a:off x="9079267" y="2903192"/>
+            <a:ext cx="155288" cy="164110"/>
+          </a:xfrm>
+          <a:prstGeom prst="straightConnector1">
+            <a:avLst/>
+          </a:prstGeom>
+          <a:ln>
+            <a:tailEnd type="triangle"/>
+          </a:ln>
+        </p:spPr>
+        <p:style>
+          <a:lnRef idx="1">
+            <a:schemeClr val="accent1"/>
+          </a:lnRef>
+          <a:fillRef idx="0">
+            <a:schemeClr val="accent1"/>
+          </a:fillRef>
+          <a:effectRef idx="0">
+            <a:schemeClr val="accent1"/>
+          </a:effectRef>
+          <a:fontRef idx="minor">
+            <a:schemeClr val="tx1"/>
+          </a:fontRef>
+        </p:style>
+      </p:cxnSp>
+      <p:cxnSp>
+        <p:nvCxnSpPr>
+          <p:cNvPr id="19" name="Straight Arrow Connector 18">
+            <a:extLst>
+              <a:ext uri="{FF2B5EF4-FFF2-40B4-BE49-F238E27FC236}">
+                <a16:creationId xmlns:a16="http://schemas.microsoft.com/office/drawing/2014/main" id="{53FC3A05-3638-49B9-82EB-AB3080415908}"/>
+              </a:ext>
+            </a:extLst>
+          </p:cNvPr>
+          <p:cNvCxnSpPr>
+            <a:cxnSpLocks/>
+          </p:cNvCxnSpPr>
+          <p:nvPr/>
+        </p:nvCxnSpPr>
+        <p:spPr>
+          <a:xfrm flipH="1">
+            <a:off x="10424160" y="2708121"/>
+            <a:ext cx="106489" cy="342544"/>
+          </a:xfrm>
+          <a:prstGeom prst="straightConnector1">
+            <a:avLst/>
+          </a:prstGeom>
+          <a:ln>
+            <a:tailEnd type="triangle"/>
+          </a:ln>
+        </p:spPr>
+        <p:style>
+          <a:lnRef idx="1">
+            <a:schemeClr val="accent1"/>
+          </a:lnRef>
+          <a:fillRef idx="0">
+            <a:schemeClr val="accent1"/>
+          </a:fillRef>
+          <a:effectRef idx="0">
+            <a:schemeClr val="accent1"/>
+          </a:effectRef>
+          <a:fontRef idx="minor">
+            <a:schemeClr val="tx1"/>
+          </a:fontRef>
+        </p:style>
+      </p:cxnSp>
+      <p:cxnSp>
+        <p:nvCxnSpPr>
+          <p:cNvPr id="21" name="Straight Arrow Connector 20">
+            <a:extLst>
+              <a:ext uri="{FF2B5EF4-FFF2-40B4-BE49-F238E27FC236}">
+                <a16:creationId xmlns:a16="http://schemas.microsoft.com/office/drawing/2014/main" id="{02CD56B1-F029-4FFC-968E-3756270FA806}"/>
+              </a:ext>
+            </a:extLst>
+          </p:cNvPr>
+          <p:cNvCxnSpPr>
+            <a:cxnSpLocks/>
+          </p:cNvCxnSpPr>
+          <p:nvPr/>
+        </p:nvCxnSpPr>
+        <p:spPr>
+          <a:xfrm flipV="1">
+            <a:off x="9003792" y="4306476"/>
+            <a:ext cx="293858" cy="172774"/>
+          </a:xfrm>
+          <a:prstGeom prst="straightConnector1">
+            <a:avLst/>
+          </a:prstGeom>
+          <a:ln>
+            <a:tailEnd type="triangle"/>
+          </a:ln>
+        </p:spPr>
+        <p:style>
+          <a:lnRef idx="1">
+            <a:schemeClr val="accent1"/>
+          </a:lnRef>
+          <a:fillRef idx="0">
+            <a:schemeClr val="accent1"/>
+          </a:fillRef>
+          <a:effectRef idx="0">
+            <a:schemeClr val="accent1"/>
+          </a:effectRef>
+          <a:fontRef idx="minor">
+            <a:schemeClr val="tx1"/>
+          </a:fontRef>
+        </p:style>
+      </p:cxnSp>
+      <p:cxnSp>
+        <p:nvCxnSpPr>
+          <p:cNvPr id="23" name="Straight Arrow Connector 22">
+            <a:extLst>
+              <a:ext uri="{FF2B5EF4-FFF2-40B4-BE49-F238E27FC236}">
+                <a16:creationId xmlns:a16="http://schemas.microsoft.com/office/drawing/2014/main" id="{A91F250C-6C4A-4B01-975E-99D5323468CA}"/>
+              </a:ext>
+            </a:extLst>
+          </p:cNvPr>
+          <p:cNvCxnSpPr>
+            <a:cxnSpLocks/>
+          </p:cNvCxnSpPr>
+          <p:nvPr/>
+        </p:nvCxnSpPr>
+        <p:spPr>
+          <a:xfrm flipV="1">
+            <a:off x="8942832" y="3375492"/>
+            <a:ext cx="333432" cy="86206"/>
+          </a:xfrm>
+          <a:prstGeom prst="straightConnector1">
+            <a:avLst/>
+          </a:prstGeom>
+          <a:ln>
+            <a:tailEnd type="triangle"/>
+          </a:ln>
+        </p:spPr>
+        <p:style>
+          <a:lnRef idx="1">
+            <a:schemeClr val="accent1"/>
+          </a:lnRef>
+          <a:fillRef idx="0">
+            <a:schemeClr val="accent1"/>
+          </a:fillRef>
+          <a:effectRef idx="0">
+            <a:schemeClr val="accent1"/>
+          </a:effectRef>
+          <a:fontRef idx="minor">
+            <a:schemeClr val="tx1"/>
+          </a:fontRef>
+        </p:style>
+      </p:cxnSp>
+      <p:cxnSp>
+        <p:nvCxnSpPr>
+          <p:cNvPr id="35" name="Straight Arrow Connector 34">
+            <a:extLst>
+              <a:ext uri="{FF2B5EF4-FFF2-40B4-BE49-F238E27FC236}">
+                <a16:creationId xmlns:a16="http://schemas.microsoft.com/office/drawing/2014/main" id="{3014279C-D337-4C30-99C5-DFF5F18B8B96}"/>
+              </a:ext>
+            </a:extLst>
+          </p:cNvPr>
+          <p:cNvCxnSpPr>
+            <a:cxnSpLocks/>
+          </p:cNvCxnSpPr>
+          <p:nvPr/>
+        </p:nvCxnSpPr>
+        <p:spPr>
+          <a:xfrm>
+            <a:off x="8954233" y="3900208"/>
+            <a:ext cx="280322" cy="134870"/>
+          </a:xfrm>
+          <a:prstGeom prst="straightConnector1">
+            <a:avLst/>
+          </a:prstGeom>
+          <a:ln>
+            <a:tailEnd type="triangle"/>
+          </a:ln>
+        </p:spPr>
+        <p:style>
+          <a:lnRef idx="1">
+            <a:schemeClr val="accent1"/>
+          </a:lnRef>
+          <a:fillRef idx="0">
+            <a:schemeClr val="accent1"/>
+          </a:fillRef>
+          <a:effectRef idx="0">
+            <a:schemeClr val="accent1"/>
+          </a:effectRef>
+          <a:fontRef idx="minor">
+            <a:schemeClr val="tx1"/>
+          </a:fontRef>
+        </p:style>
+      </p:cxnSp>
+      <p:cxnSp>
+        <p:nvCxnSpPr>
+          <p:cNvPr id="39" name="Straight Arrow Connector 38">
+            <a:extLst>
+              <a:ext uri="{FF2B5EF4-FFF2-40B4-BE49-F238E27FC236}">
+                <a16:creationId xmlns:a16="http://schemas.microsoft.com/office/drawing/2014/main" id="{DE5831A8-B08B-491D-8D0F-588655B2C5E2}"/>
+              </a:ext>
+            </a:extLst>
+          </p:cNvPr>
+          <p:cNvCxnSpPr>
+            <a:cxnSpLocks/>
+          </p:cNvCxnSpPr>
+          <p:nvPr/>
+        </p:nvCxnSpPr>
+        <p:spPr>
+          <a:xfrm flipH="1" flipV="1">
+            <a:off x="10765536" y="3418595"/>
+            <a:ext cx="1" cy="218656"/>
+          </a:xfrm>
+          <a:prstGeom prst="straightConnector1">
+            <a:avLst/>
+          </a:prstGeom>
+          <a:ln>
+            <a:tailEnd type="triangle"/>
+          </a:ln>
+        </p:spPr>
+        <p:style>
+          <a:lnRef idx="1">
+            <a:schemeClr val="accent1"/>
+          </a:lnRef>
+          <a:fillRef idx="0">
+            <a:schemeClr val="accent1"/>
+          </a:fillRef>
+          <a:effectRef idx="0">
+            <a:schemeClr val="accent1"/>
+          </a:effectRef>
+          <a:fontRef idx="minor">
+            <a:schemeClr val="tx1"/>
+          </a:fontRef>
+        </p:style>
+      </p:cxnSp>
+      <p:sp>
+        <p:nvSpPr>
+          <p:cNvPr id="42" name="TextBox 41">
+            <a:extLst>
+              <a:ext uri="{FF2B5EF4-FFF2-40B4-BE49-F238E27FC236}">
+                <a16:creationId xmlns:a16="http://schemas.microsoft.com/office/drawing/2014/main" id="{2176000E-B545-4DDA-88B7-91F0358DA0ED}"/>
+              </a:ext>
+            </a:extLst>
+          </p:cNvPr>
+          <p:cNvSpPr txBox="1"/>
+          <p:nvPr/>
+        </p:nvSpPr>
+        <p:spPr>
+          <a:xfrm>
+            <a:off x="9961017" y="4155834"/>
+            <a:ext cx="2066391" cy="276999"/>
+          </a:xfrm>
+          <a:prstGeom prst="rect">
+            <a:avLst/>
+          </a:prstGeom>
+          <a:noFill/>
+        </p:spPr>
+        <p:txBody>
+          <a:bodyPr wrap="square">
+            <a:spAutoFit/>
+          </a:bodyPr>
+          <a:lstStyle/>
+          <a:p>
+            <a:r>
+              <a:rPr lang="en-US" sz="1200" dirty="0" err="1">
+                <a:highlight>
+                  <a:srgbClr val="FFFF00"/>
+                </a:highlight>
+                <a:latin typeface="Courier New" panose="02070309020205020404" pitchFamily="49" charset="0"/>
+                <a:cs typeface="Courier New" panose="02070309020205020404" pitchFamily="49" charset="0"/>
+              </a:rPr>
+              <a:t>cfintersatellitecomm</a:t>
+            </a:r>
+            <a:endParaRPr lang="en-US" sz="1200" dirty="0">
+              <a:highlight>
+                <a:srgbClr val="FFFF00"/>
+              </a:highlight>
+              <a:latin typeface="Courier New" panose="02070309020205020404" pitchFamily="49" charset="0"/>
+              <a:cs typeface="Courier New" panose="02070309020205020404" pitchFamily="49" charset="0"/>
+            </a:endParaRPr>
+          </a:p>
+        </p:txBody>
+      </p:sp>
+      <p:cxnSp>
+        <p:nvCxnSpPr>
+          <p:cNvPr id="43" name="Straight Arrow Connector 42">
+            <a:extLst>
+              <a:ext uri="{FF2B5EF4-FFF2-40B4-BE49-F238E27FC236}">
+                <a16:creationId xmlns:a16="http://schemas.microsoft.com/office/drawing/2014/main" id="{51417656-02D0-4FA0-B0D0-CE826EEEFE32}"/>
+              </a:ext>
+            </a:extLst>
+          </p:cNvPr>
+          <p:cNvCxnSpPr>
+            <a:cxnSpLocks/>
+          </p:cNvCxnSpPr>
+          <p:nvPr/>
+        </p:nvCxnSpPr>
+        <p:spPr>
+          <a:xfrm flipH="1" flipV="1">
+            <a:off x="10624333" y="4037825"/>
+            <a:ext cx="141203" cy="221922"/>
+          </a:xfrm>
+          <a:prstGeom prst="straightConnector1">
+            <a:avLst/>
+          </a:prstGeom>
+          <a:ln>
+            <a:tailEnd type="triangle"/>
+          </a:ln>
+        </p:spPr>
+        <p:style>
+          <a:lnRef idx="1">
+            <a:schemeClr val="accent1"/>
+          </a:lnRef>
+          <a:fillRef idx="0">
+            <a:schemeClr val="accent1"/>
+          </a:fillRef>
+          <a:effectRef idx="0">
+            <a:schemeClr val="accent1"/>
+          </a:effectRef>
+          <a:fontRef idx="minor">
+            <a:schemeClr val="tx1"/>
+          </a:fontRef>
+        </p:style>
+      </p:cxnSp>
     </p:spTree>
     <p:extLst>
       <p:ext uri="{BB962C8B-B14F-4D97-AF65-F5344CB8AC3E}">
         <p14:creationId xmlns:p14="http://schemas.microsoft.com/office/powerpoint/2010/main" val="1628478703"/>
+      </p:ext>
+    </p:extLst>
+  </p:cSld>
+  <p:clrMapOvr>
+    <a:masterClrMapping/>
+  </p:clrMapOvr>
+</p:sld>
+</file>
+
+<file path=ppt/slides/slide8.xml><?xml version="1.0" encoding="utf-8"?>
+<p:sld xmlns:a="http://schemas.openxmlformats.org/drawingml/2006/main" xmlns:r="http://schemas.openxmlformats.org/officeDocument/2006/relationships" xmlns:p="http://schemas.openxmlformats.org/presentationml/2006/main">
+  <p:cSld>
+    <p:spTree>
+      <p:nvGrpSpPr>
+        <p:cNvPr id="1" name=""/>
+        <p:cNvGrpSpPr/>
+        <p:nvPr/>
+      </p:nvGrpSpPr>
+      <p:grpSpPr>
+        <a:xfrm>
+          <a:off x="0" y="0"/>
+          <a:ext cx="0" cy="0"/>
+          <a:chOff x="0" y="0"/>
+          <a:chExt cx="0" cy="0"/>
+        </a:xfrm>
+      </p:grpSpPr>
+      <p:sp>
+        <p:nvSpPr>
+          <p:cNvPr id="2" name="Title 1">
+            <a:extLst>
+              <a:ext uri="{FF2B5EF4-FFF2-40B4-BE49-F238E27FC236}">
+                <a16:creationId xmlns:a16="http://schemas.microsoft.com/office/drawing/2014/main" id="{DF4BB113-B8B2-4A70-AFE7-29FF8386057F}"/>
+              </a:ext>
+            </a:extLst>
+          </p:cNvPr>
+          <p:cNvSpPr>
+            <a:spLocks noGrp="1"/>
+          </p:cNvSpPr>
+          <p:nvPr>
+            <p:ph type="title"/>
+          </p:nvPr>
+        </p:nvSpPr>
+        <p:spPr/>
+        <p:txBody>
+          <a:bodyPr/>
+          <a:lstStyle/>
+          <a:p>
+            <a:r>
+              <a:rPr lang="en-US" dirty="0"/>
+              <a:t>config.py</a:t>
+            </a:r>
+          </a:p>
+        </p:txBody>
+      </p:sp>
+      <p:sp>
+        <p:nvSpPr>
+          <p:cNvPr id="3" name="Content Placeholder 2">
+            <a:extLst>
+              <a:ext uri="{FF2B5EF4-FFF2-40B4-BE49-F238E27FC236}">
+                <a16:creationId xmlns:a16="http://schemas.microsoft.com/office/drawing/2014/main" id="{668258D0-7C27-44FF-A656-A93B6F699377}"/>
+              </a:ext>
+            </a:extLst>
+          </p:cNvPr>
+          <p:cNvSpPr>
+            <a:spLocks noGrp="1"/>
+          </p:cNvSpPr>
+          <p:nvPr>
+            <p:ph idx="1"/>
+          </p:nvPr>
+        </p:nvSpPr>
+        <p:spPr>
+          <a:xfrm>
+            <a:off x="756920" y="1591945"/>
+            <a:ext cx="5509334" cy="3998126"/>
+          </a:xfrm>
+        </p:spPr>
+        <p:txBody>
+          <a:bodyPr>
+            <a:normAutofit lnSpcReduction="10000"/>
+          </a:bodyPr>
+          <a:lstStyle/>
+          <a:p>
+            <a:r>
+              <a:rPr lang="en-US" sz="1600" dirty="0"/>
+              <a:t>This module contains the </a:t>
+            </a:r>
+            <a:r>
+              <a:rPr lang="en-US" sz="1600" dirty="0" err="1"/>
+              <a:t>GuiStyle</a:t>
+            </a:r>
+            <a:r>
+              <a:rPr lang="en-US" sz="1600" dirty="0"/>
+              <a:t> class, which contains the configuration of the GUI widgets. </a:t>
+            </a:r>
+          </a:p>
+          <a:p>
+            <a:pPr lvl="1"/>
+            <a:r>
+              <a:rPr lang="en-US" sz="1400" dirty="0"/>
+              <a:t>It can be referenced in other modules and a uniform custom style (e.g., fonts of labels, color of buttons, etc.) can be maintained easily. (Not done currently, mostly the default widget style is used.) </a:t>
+            </a:r>
+          </a:p>
+          <a:p>
+            <a:r>
+              <a:rPr lang="en-US" sz="1600" dirty="0"/>
+              <a:t>The module also stores variables which are used as global variables over the other modules of </a:t>
+            </a:r>
+            <a:r>
+              <a:rPr lang="en-US" sz="1600" dirty="0" err="1"/>
+              <a:t>eosim</a:t>
+            </a:r>
+            <a:r>
+              <a:rPr lang="en-US" sz="1600" dirty="0"/>
+              <a:t>.</a:t>
+            </a:r>
+          </a:p>
+          <a:p>
+            <a:pPr lvl="1"/>
+            <a:r>
+              <a:rPr lang="en-US" sz="1600" dirty="0" err="1">
+                <a:latin typeface="Courier New" panose="02070309020205020404" pitchFamily="49" charset="0"/>
+                <a:cs typeface="Courier New" panose="02070309020205020404" pitchFamily="49" charset="0"/>
+              </a:rPr>
+              <a:t>workspace_dir</a:t>
+            </a:r>
+            <a:r>
+              <a:rPr lang="en-US" sz="1600" dirty="0">
+                <a:cs typeface="Courier New" panose="02070309020205020404" pitchFamily="49" charset="0"/>
+              </a:rPr>
+              <a:t>: This variable stores the workspace directory.  It is written onto when the user selects the workspace directory (new or old) in the </a:t>
+            </a:r>
+            <a:r>
+              <a:rPr lang="en-US" sz="1600" dirty="0" err="1">
+                <a:cs typeface="Courier New" panose="02070309020205020404" pitchFamily="49" charset="0"/>
+              </a:rPr>
+              <a:t>menubar</a:t>
+            </a:r>
+            <a:r>
+              <a:rPr lang="en-US" sz="1600" dirty="0">
+                <a:cs typeface="Courier New" panose="02070309020205020404" pitchFamily="49" charset="0"/>
+              </a:rPr>
+              <a:t>.</a:t>
+            </a:r>
+          </a:p>
+          <a:p>
+            <a:pPr lvl="1"/>
+            <a:r>
+              <a:rPr lang="en-US" sz="1600" dirty="0" err="1">
+                <a:latin typeface="Courier New" panose="02070309020205020404" pitchFamily="49" charset="0"/>
+                <a:cs typeface="Courier New" panose="02070309020205020404" pitchFamily="49" charset="0"/>
+              </a:rPr>
+              <a:t>mission_specs</a:t>
+            </a:r>
+            <a:r>
+              <a:rPr lang="en-US" sz="1600" dirty="0">
+                <a:latin typeface="Courier New" panose="02070309020205020404" pitchFamily="49" charset="0"/>
+                <a:cs typeface="Courier New" panose="02070309020205020404" pitchFamily="49" charset="0"/>
+              </a:rPr>
+              <a:t>: </a:t>
+            </a:r>
+            <a:r>
+              <a:rPr lang="en-US" sz="1600" dirty="0">
+                <a:cs typeface="Courier New" panose="02070309020205020404" pitchFamily="49" charset="0"/>
+              </a:rPr>
+              <a:t>This variable stores the mission specifications as and when they are updated in the Configure frame.</a:t>
+            </a:r>
+          </a:p>
+          <a:p>
+            <a:r>
+              <a:rPr lang="en-US" sz="1600" dirty="0">
+                <a:cs typeface="Courier New" panose="02070309020205020404" pitchFamily="49" charset="0"/>
+              </a:rPr>
+              <a:t>This method of using global variables is not safe. </a:t>
+            </a:r>
+            <a:r>
+              <a:rPr lang="en-US" sz="1600" i="1" dirty="0">
+                <a:cs typeface="Courier New" panose="02070309020205020404" pitchFamily="49" charset="0"/>
+              </a:rPr>
+              <a:t>Unless</a:t>
+            </a:r>
+            <a:r>
+              <a:rPr lang="en-US" sz="1600" dirty="0">
+                <a:cs typeface="Courier New" panose="02070309020205020404" pitchFamily="49" charset="0"/>
+              </a:rPr>
+              <a:t> the variables are manipulated (write, read) in the correct order, the application can fail.</a:t>
+            </a:r>
+          </a:p>
+        </p:txBody>
+      </p:sp>
+    </p:spTree>
+    <p:extLst>
+      <p:ext uri="{BB962C8B-B14F-4D97-AF65-F5344CB8AC3E}">
+        <p14:creationId xmlns:p14="http://schemas.microsoft.com/office/powerpoint/2010/main" val="2484587524"/>
+      </p:ext>
+    </p:extLst>
+  </p:cSld>
+  <p:clrMapOvr>
+    <a:masterClrMapping/>
+  </p:clrMapOvr>
+</p:sld>
+</file>
+
+<file path=ppt/slides/slide9.xml><?xml version="1.0" encoding="utf-8"?>
+<p:sld xmlns:a="http://schemas.openxmlformats.org/drawingml/2006/main" xmlns:r="http://schemas.openxmlformats.org/officeDocument/2006/relationships" xmlns:p="http://schemas.openxmlformats.org/presentationml/2006/main">
+  <p:cSld>
+    <p:spTree>
+      <p:nvGrpSpPr>
+        <p:cNvPr id="1" name=""/>
+        <p:cNvGrpSpPr/>
+        <p:nvPr/>
+      </p:nvGrpSpPr>
+      <p:grpSpPr>
+        <a:xfrm>
+          <a:off x="0" y="0"/>
+          <a:ext cx="0" cy="0"/>
+          <a:chOff x="0" y="0"/>
+          <a:chExt cx="0" cy="0"/>
+        </a:xfrm>
+      </p:grpSpPr>
+      <p:sp>
+        <p:nvSpPr>
+          <p:cNvPr id="2" name="Title 1">
+            <a:extLst>
+              <a:ext uri="{FF2B5EF4-FFF2-40B4-BE49-F238E27FC236}">
+                <a16:creationId xmlns:a16="http://schemas.microsoft.com/office/drawing/2014/main" id="{45C44DAD-FDD1-4E6E-87C4-7068186AD2A4}"/>
+              </a:ext>
+            </a:extLst>
+          </p:cNvPr>
+          <p:cNvSpPr>
+            <a:spLocks noGrp="1"/>
+          </p:cNvSpPr>
+          <p:nvPr>
+            <p:ph type="title"/>
+          </p:nvPr>
+        </p:nvSpPr>
+        <p:spPr/>
+        <p:txBody>
+          <a:bodyPr/>
+          <a:lstStyle/>
+          <a:p>
+            <a:r>
+              <a:rPr lang="en-US" dirty="0"/>
+              <a:t>General notes on coding style</a:t>
+            </a:r>
+          </a:p>
+        </p:txBody>
+      </p:sp>
+      <p:sp>
+        <p:nvSpPr>
+          <p:cNvPr id="4" name="Content Placeholder 2">
+            <a:extLst>
+              <a:ext uri="{FF2B5EF4-FFF2-40B4-BE49-F238E27FC236}">
+                <a16:creationId xmlns:a16="http://schemas.microsoft.com/office/drawing/2014/main" id="{1549F9C8-27FF-454B-A76D-C8DD80A6C666}"/>
+              </a:ext>
+            </a:extLst>
+          </p:cNvPr>
+          <p:cNvSpPr>
+            <a:spLocks noGrp="1"/>
+          </p:cNvSpPr>
+          <p:nvPr>
+            <p:ph idx="1"/>
+          </p:nvPr>
+        </p:nvSpPr>
+        <p:spPr>
+          <a:xfrm>
+            <a:off x="838200" y="1825624"/>
+            <a:ext cx="6099175" cy="4351656"/>
+          </a:xfrm>
+        </p:spPr>
+        <p:txBody>
+          <a:bodyPr>
+            <a:normAutofit lnSpcReduction="10000"/>
+          </a:bodyPr>
+          <a:lstStyle/>
+          <a:p>
+            <a:r>
+              <a:rPr lang="en-US" sz="2000" dirty="0"/>
+              <a:t>‘frame’ widgets are used to define the different sections of the window. A “master” frame encompasses all the frames in the window is also usually defined. </a:t>
+            </a:r>
+          </a:p>
+          <a:p>
+            <a:r>
+              <a:rPr lang="en-US" sz="2000" dirty="0"/>
+              <a:t>E.g. in the alongside window (see </a:t>
+            </a:r>
+            <a:r>
+              <a:rPr lang="en-US" sz="2000" dirty="0">
+                <a:latin typeface="Courier New" panose="02070309020205020404" pitchFamily="49" charset="0"/>
+                <a:cs typeface="Courier New" panose="02070309020205020404" pitchFamily="49" charset="0"/>
+              </a:rPr>
+              <a:t>cfsatellite.py </a:t>
+            </a:r>
+            <a:r>
+              <a:rPr lang="en-US" sz="2000" dirty="0"/>
+              <a:t>module), there are three frames defined: (1) </a:t>
+            </a:r>
+            <a:r>
+              <a:rPr lang="en-US" sz="2000" dirty="0" err="1">
+                <a:latin typeface="Courier New" panose="02070309020205020404" pitchFamily="49" charset="0"/>
+                <a:cs typeface="Courier New" panose="02070309020205020404" pitchFamily="49" charset="0"/>
+              </a:rPr>
+              <a:t>sat_win_frame</a:t>
+            </a:r>
+            <a:r>
+              <a:rPr lang="en-US" sz="2000" dirty="0">
+                <a:latin typeface="Courier New" panose="02070309020205020404" pitchFamily="49" charset="0"/>
+                <a:cs typeface="Courier New" panose="02070309020205020404" pitchFamily="49" charset="0"/>
+              </a:rPr>
+              <a:t> </a:t>
+            </a:r>
+            <a:r>
+              <a:rPr lang="en-US" sz="2000" dirty="0"/>
+              <a:t>(the master frame) (2) </a:t>
+            </a:r>
+            <a:r>
+              <a:rPr lang="en-US" sz="2000" dirty="0" err="1">
+                <a:latin typeface="Courier New" panose="02070309020205020404" pitchFamily="49" charset="0"/>
+                <a:cs typeface="Courier New" panose="02070309020205020404" pitchFamily="49" charset="0"/>
+              </a:rPr>
+              <a:t>sat_kep_specs_frame</a:t>
+            </a:r>
+            <a:r>
+              <a:rPr lang="en-US" sz="2000" dirty="0">
+                <a:latin typeface="Courier New" panose="02070309020205020404" pitchFamily="49" charset="0"/>
+                <a:cs typeface="Courier New" panose="02070309020205020404" pitchFamily="49" charset="0"/>
+              </a:rPr>
+              <a:t> </a:t>
+            </a:r>
+            <a:r>
+              <a:rPr lang="en-US" sz="2000" dirty="0"/>
+              <a:t>(3) </a:t>
+            </a:r>
+            <a:r>
+              <a:rPr lang="en-US" sz="2000" dirty="0" err="1">
+                <a:latin typeface="Courier New" panose="02070309020205020404" pitchFamily="49" charset="0"/>
+                <a:cs typeface="Courier New" panose="02070309020205020404" pitchFamily="49" charset="0"/>
+              </a:rPr>
+              <a:t>okcancel_frame</a:t>
+            </a:r>
+            <a:r>
+              <a:rPr lang="en-US" sz="2000" dirty="0">
+                <a:latin typeface="Courier New" panose="02070309020205020404" pitchFamily="49" charset="0"/>
+                <a:cs typeface="Courier New" panose="02070309020205020404" pitchFamily="49" charset="0"/>
+              </a:rPr>
+              <a:t>.</a:t>
+            </a:r>
+          </a:p>
+          <a:p>
+            <a:r>
+              <a:rPr lang="en-US" sz="2000" dirty="0">
+                <a:cs typeface="Courier New" panose="02070309020205020404" pitchFamily="49" charset="0"/>
+              </a:rPr>
+              <a:t>Default values can be provided as illustrated in the following snippet:</a:t>
+            </a:r>
+          </a:p>
+          <a:p>
+            <a:pPr marL="0" indent="0">
+              <a:buNone/>
+            </a:pPr>
+            <a:r>
+              <a:rPr lang="en-US" sz="1200" dirty="0" err="1">
+                <a:latin typeface="Courier New" panose="02070309020205020404" pitchFamily="49" charset="0"/>
+                <a:cs typeface="Courier New" panose="02070309020205020404" pitchFamily="49" charset="0"/>
+              </a:rPr>
+              <a:t>alt_entry.insert</a:t>
+            </a:r>
+            <a:r>
+              <a:rPr lang="en-US" sz="1200" dirty="0">
+                <a:latin typeface="Courier New" panose="02070309020205020404" pitchFamily="49" charset="0"/>
+                <a:cs typeface="Courier New" panose="02070309020205020404" pitchFamily="49" charset="0"/>
+              </a:rPr>
+              <a:t>(0,500)</a:t>
+            </a:r>
+          </a:p>
+          <a:p>
+            <a:pPr marL="0" indent="0">
+              <a:buNone/>
+            </a:pPr>
+            <a:r>
+              <a:rPr lang="en-US" sz="1200" dirty="0" err="1">
+                <a:latin typeface="Courier New" panose="02070309020205020404" pitchFamily="49" charset="0"/>
+                <a:cs typeface="Courier New" panose="02070309020205020404" pitchFamily="49" charset="0"/>
+              </a:rPr>
+              <a:t>alt_entry.bind</a:t>
+            </a:r>
+            <a:r>
+              <a:rPr lang="en-US" sz="1200" dirty="0">
+                <a:latin typeface="Courier New" panose="02070309020205020404" pitchFamily="49" charset="0"/>
+                <a:cs typeface="Courier New" panose="02070309020205020404" pitchFamily="49" charset="0"/>
+              </a:rPr>
+              <a:t>("&lt;</a:t>
+            </a:r>
+            <a:r>
+              <a:rPr lang="en-US" sz="1200" dirty="0" err="1">
+                <a:latin typeface="Courier New" panose="02070309020205020404" pitchFamily="49" charset="0"/>
+                <a:cs typeface="Courier New" panose="02070309020205020404" pitchFamily="49" charset="0"/>
+              </a:rPr>
+              <a:t>FocusIn</a:t>
+            </a:r>
+            <a:r>
+              <a:rPr lang="en-US" sz="1200" dirty="0">
+                <a:latin typeface="Courier New" panose="02070309020205020404" pitchFamily="49" charset="0"/>
+                <a:cs typeface="Courier New" panose="02070309020205020404" pitchFamily="49" charset="0"/>
+              </a:rPr>
+              <a:t>&gt;", lambda </a:t>
+            </a:r>
+            <a:r>
+              <a:rPr lang="en-US" sz="1200" dirty="0" err="1">
+                <a:latin typeface="Courier New" panose="02070309020205020404" pitchFamily="49" charset="0"/>
+                <a:cs typeface="Courier New" panose="02070309020205020404" pitchFamily="49" charset="0"/>
+              </a:rPr>
+              <a:t>args</a:t>
+            </a:r>
+            <a:r>
+              <a:rPr lang="en-US" sz="1200" dirty="0">
+                <a:latin typeface="Courier New" panose="02070309020205020404" pitchFamily="49" charset="0"/>
+                <a:cs typeface="Courier New" panose="02070309020205020404" pitchFamily="49" charset="0"/>
+              </a:rPr>
+              <a:t>: </a:t>
+            </a:r>
+            <a:r>
+              <a:rPr lang="en-US" sz="1200" dirty="0" err="1">
+                <a:latin typeface="Courier New" panose="02070309020205020404" pitchFamily="49" charset="0"/>
+                <a:cs typeface="Courier New" panose="02070309020205020404" pitchFamily="49" charset="0"/>
+              </a:rPr>
+              <a:t>alt_entry.delete</a:t>
+            </a:r>
+            <a:r>
+              <a:rPr lang="en-US" sz="1200" dirty="0">
+                <a:latin typeface="Courier New" panose="02070309020205020404" pitchFamily="49" charset="0"/>
+                <a:cs typeface="Courier New" panose="02070309020205020404" pitchFamily="49" charset="0"/>
+              </a:rPr>
+              <a:t>('0', 'end’))</a:t>
+            </a:r>
+          </a:p>
+          <a:p>
+            <a:pPr marL="0" indent="0">
+              <a:buNone/>
+            </a:pPr>
+            <a:r>
+              <a:rPr lang="en-US" sz="1800" dirty="0">
+                <a:cs typeface="Courier New" panose="02070309020205020404" pitchFamily="49" charset="0"/>
+              </a:rPr>
+              <a:t>‘500’ is the default value in the altitude </a:t>
+            </a:r>
+            <a:r>
+              <a:rPr lang="en-US" sz="1800" i="1" dirty="0">
+                <a:cs typeface="Courier New" panose="02070309020205020404" pitchFamily="49" charset="0"/>
+              </a:rPr>
+              <a:t>entry</a:t>
+            </a:r>
+            <a:r>
+              <a:rPr lang="en-US" sz="1800" dirty="0">
+                <a:cs typeface="Courier New" panose="02070309020205020404" pitchFamily="49" charset="0"/>
+              </a:rPr>
+              <a:t> widget. It gets cleared when one clicks inside the entry widget.</a:t>
+            </a:r>
+          </a:p>
+        </p:txBody>
+      </p:sp>
+      <p:pic>
+        <p:nvPicPr>
+          <p:cNvPr id="6" name="Picture 5">
+            <a:extLst>
+              <a:ext uri="{FF2B5EF4-FFF2-40B4-BE49-F238E27FC236}">
+                <a16:creationId xmlns:a16="http://schemas.microsoft.com/office/drawing/2014/main" id="{0D621A4E-CBF4-4DBD-A425-2A1FE90D4259}"/>
+              </a:ext>
+            </a:extLst>
+          </p:cNvPr>
+          <p:cNvPicPr>
+            <a:picLocks noChangeAspect="1"/>
+          </p:cNvPicPr>
+          <p:nvPr/>
+        </p:nvPicPr>
+        <p:blipFill>
+          <a:blip r:embed="rId2"/>
+          <a:stretch>
+            <a:fillRect/>
+          </a:stretch>
+        </p:blipFill>
+        <p:spPr>
+          <a:xfrm>
+            <a:off x="8790305" y="1581397"/>
+            <a:ext cx="3000375" cy="3238500"/>
+          </a:xfrm>
+          <a:prstGeom prst="rect">
+            <a:avLst/>
+          </a:prstGeom>
+        </p:spPr>
+      </p:pic>
+      <p:cxnSp>
+        <p:nvCxnSpPr>
+          <p:cNvPr id="8" name="Straight Arrow Connector 7">
+            <a:extLst>
+              <a:ext uri="{FF2B5EF4-FFF2-40B4-BE49-F238E27FC236}">
+                <a16:creationId xmlns:a16="http://schemas.microsoft.com/office/drawing/2014/main" id="{9FCE6D85-4BB2-4A70-9544-4FB8556AE06C}"/>
+              </a:ext>
+            </a:extLst>
+          </p:cNvPr>
+          <p:cNvCxnSpPr>
+            <a:cxnSpLocks/>
+          </p:cNvCxnSpPr>
+          <p:nvPr/>
+        </p:nvCxnSpPr>
+        <p:spPr>
+          <a:xfrm>
+            <a:off x="9865360" y="1214596"/>
+            <a:ext cx="264160" cy="868204"/>
+          </a:xfrm>
+          <a:prstGeom prst="straightConnector1">
+            <a:avLst/>
+          </a:prstGeom>
+          <a:ln>
+            <a:tailEnd type="triangle"/>
+          </a:ln>
+        </p:spPr>
+        <p:style>
+          <a:lnRef idx="1">
+            <a:schemeClr val="accent1"/>
+          </a:lnRef>
+          <a:fillRef idx="0">
+            <a:schemeClr val="accent1"/>
+          </a:fillRef>
+          <a:effectRef idx="0">
+            <a:schemeClr val="accent1"/>
+          </a:effectRef>
+          <a:fontRef idx="minor">
+            <a:schemeClr val="tx1"/>
+          </a:fontRef>
+        </p:style>
+      </p:cxnSp>
+      <p:cxnSp>
+        <p:nvCxnSpPr>
+          <p:cNvPr id="10" name="Straight Arrow Connector 9">
+            <a:extLst>
+              <a:ext uri="{FF2B5EF4-FFF2-40B4-BE49-F238E27FC236}">
+                <a16:creationId xmlns:a16="http://schemas.microsoft.com/office/drawing/2014/main" id="{948D55C6-A0B9-4C35-B36C-39D65F0A313E}"/>
+              </a:ext>
+            </a:extLst>
+          </p:cNvPr>
+          <p:cNvCxnSpPr>
+            <a:cxnSpLocks/>
+            <a:stCxn id="19" idx="2"/>
+          </p:cNvCxnSpPr>
+          <p:nvPr/>
+        </p:nvCxnSpPr>
+        <p:spPr>
+          <a:xfrm flipV="1">
+            <a:off x="8044814" y="3200648"/>
+            <a:ext cx="1312546" cy="444646"/>
+          </a:xfrm>
+          <a:prstGeom prst="straightConnector1">
+            <a:avLst/>
+          </a:prstGeom>
+          <a:ln>
+            <a:tailEnd type="triangle"/>
+          </a:ln>
+        </p:spPr>
+        <p:style>
+          <a:lnRef idx="1">
+            <a:schemeClr val="accent1"/>
+          </a:lnRef>
+          <a:fillRef idx="0">
+            <a:schemeClr val="accent1"/>
+          </a:fillRef>
+          <a:effectRef idx="0">
+            <a:schemeClr val="accent1"/>
+          </a:effectRef>
+          <a:fontRef idx="minor">
+            <a:schemeClr val="tx1"/>
+          </a:fontRef>
+        </p:style>
+      </p:cxnSp>
+      <p:cxnSp>
+        <p:nvCxnSpPr>
+          <p:cNvPr id="14" name="Straight Arrow Connector 13">
+            <a:extLst>
+              <a:ext uri="{FF2B5EF4-FFF2-40B4-BE49-F238E27FC236}">
+                <a16:creationId xmlns:a16="http://schemas.microsoft.com/office/drawing/2014/main" id="{BCE39BAA-4922-41B7-99CA-D19110F801C9}"/>
+              </a:ext>
+            </a:extLst>
+          </p:cNvPr>
+          <p:cNvCxnSpPr>
+            <a:cxnSpLocks/>
+          </p:cNvCxnSpPr>
+          <p:nvPr/>
+        </p:nvCxnSpPr>
+        <p:spPr>
+          <a:xfrm flipH="1" flipV="1">
+            <a:off x="9489440" y="4593954"/>
+            <a:ext cx="375920" cy="592744"/>
+          </a:xfrm>
+          <a:prstGeom prst="straightConnector1">
+            <a:avLst/>
+          </a:prstGeom>
+          <a:ln>
+            <a:tailEnd type="triangle"/>
+          </a:ln>
+        </p:spPr>
+        <p:style>
+          <a:lnRef idx="1">
+            <a:schemeClr val="accent1"/>
+          </a:lnRef>
+          <a:fillRef idx="0">
+            <a:schemeClr val="accent1"/>
+          </a:fillRef>
+          <a:effectRef idx="0">
+            <a:schemeClr val="accent1"/>
+          </a:effectRef>
+          <a:fontRef idx="minor">
+            <a:schemeClr val="tx1"/>
+          </a:fontRef>
+        </p:style>
+      </p:cxnSp>
+      <p:sp>
+        <p:nvSpPr>
+          <p:cNvPr id="17" name="TextBox 16">
+            <a:extLst>
+              <a:ext uri="{FF2B5EF4-FFF2-40B4-BE49-F238E27FC236}">
+                <a16:creationId xmlns:a16="http://schemas.microsoft.com/office/drawing/2014/main" id="{336544EA-8F69-4993-B5B9-7ED4D0C76CC3}"/>
+              </a:ext>
+            </a:extLst>
+          </p:cNvPr>
+          <p:cNvSpPr txBox="1"/>
+          <p:nvPr/>
+        </p:nvSpPr>
+        <p:spPr>
+          <a:xfrm>
+            <a:off x="9166135" y="5107913"/>
+            <a:ext cx="2248714" cy="369332"/>
+          </a:xfrm>
+          <a:prstGeom prst="rect">
+            <a:avLst/>
+          </a:prstGeom>
+          <a:noFill/>
+        </p:spPr>
+        <p:txBody>
+          <a:bodyPr wrap="square">
+            <a:spAutoFit/>
+          </a:bodyPr>
+          <a:lstStyle/>
+          <a:p>
+            <a:r>
+              <a:rPr lang="en-US" sz="1800" dirty="0" err="1">
+                <a:latin typeface="Courier New" panose="02070309020205020404" pitchFamily="49" charset="0"/>
+                <a:cs typeface="Courier New" panose="02070309020205020404" pitchFamily="49" charset="0"/>
+              </a:rPr>
+              <a:t>okcancel_frame</a:t>
+            </a:r>
+            <a:endParaRPr lang="en-US" dirty="0"/>
+          </a:p>
+        </p:txBody>
+      </p:sp>
+      <p:sp>
+        <p:nvSpPr>
+          <p:cNvPr id="19" name="TextBox 18">
+            <a:extLst>
+              <a:ext uri="{FF2B5EF4-FFF2-40B4-BE49-F238E27FC236}">
+                <a16:creationId xmlns:a16="http://schemas.microsoft.com/office/drawing/2014/main" id="{2861592D-041D-47A0-BC89-01A1BED74B14}"/>
+              </a:ext>
+            </a:extLst>
+          </p:cNvPr>
+          <p:cNvSpPr txBox="1"/>
+          <p:nvPr/>
+        </p:nvSpPr>
+        <p:spPr>
+          <a:xfrm rot="16888615">
+            <a:off x="6238240" y="3423884"/>
+            <a:ext cx="3251200" cy="369332"/>
+          </a:xfrm>
+          <a:prstGeom prst="rect">
+            <a:avLst/>
+          </a:prstGeom>
+          <a:noFill/>
+        </p:spPr>
+        <p:txBody>
+          <a:bodyPr wrap="square">
+            <a:spAutoFit/>
+          </a:bodyPr>
+          <a:lstStyle/>
+          <a:p>
+            <a:r>
+              <a:rPr lang="en-US" sz="1800" dirty="0" err="1">
+                <a:latin typeface="Courier New" panose="02070309020205020404" pitchFamily="49" charset="0"/>
+                <a:cs typeface="Courier New" panose="02070309020205020404" pitchFamily="49" charset="0"/>
+              </a:rPr>
+              <a:t>sat_kep_specs_frame</a:t>
+            </a:r>
+            <a:r>
+              <a:rPr lang="en-US" sz="1800" dirty="0">
+                <a:latin typeface="Courier New" panose="02070309020205020404" pitchFamily="49" charset="0"/>
+                <a:cs typeface="Courier New" panose="02070309020205020404" pitchFamily="49" charset="0"/>
+              </a:rPr>
+              <a:t> </a:t>
+            </a:r>
+            <a:endParaRPr lang="en-US" dirty="0"/>
+          </a:p>
+        </p:txBody>
+      </p:sp>
+      <p:sp>
+        <p:nvSpPr>
+          <p:cNvPr id="22" name="TextBox 21">
+            <a:extLst>
+              <a:ext uri="{FF2B5EF4-FFF2-40B4-BE49-F238E27FC236}">
+                <a16:creationId xmlns:a16="http://schemas.microsoft.com/office/drawing/2014/main" id="{A27A6B38-9A59-4F73-998A-351B6C0EAEFD}"/>
+              </a:ext>
+            </a:extLst>
+          </p:cNvPr>
+          <p:cNvSpPr txBox="1"/>
+          <p:nvPr/>
+        </p:nvSpPr>
+        <p:spPr>
+          <a:xfrm>
+            <a:off x="8883332" y="843240"/>
+            <a:ext cx="2814320" cy="369332"/>
+          </a:xfrm>
+          <a:prstGeom prst="rect">
+            <a:avLst/>
+          </a:prstGeom>
+          <a:noFill/>
+        </p:spPr>
+        <p:txBody>
+          <a:bodyPr wrap="square">
+            <a:spAutoFit/>
+          </a:bodyPr>
+          <a:lstStyle/>
+          <a:p>
+            <a:r>
+              <a:rPr lang="en-US" sz="1800" dirty="0" err="1">
+                <a:latin typeface="Courier New" panose="02070309020205020404" pitchFamily="49" charset="0"/>
+                <a:cs typeface="Courier New" panose="02070309020205020404" pitchFamily="49" charset="0"/>
+              </a:rPr>
+              <a:t>sat_win_frame</a:t>
+            </a:r>
+            <a:r>
+              <a:rPr lang="en-US" sz="1800" dirty="0">
+                <a:latin typeface="Courier New" panose="02070309020205020404" pitchFamily="49" charset="0"/>
+                <a:cs typeface="Courier New" panose="02070309020205020404" pitchFamily="49" charset="0"/>
+              </a:rPr>
+              <a:t> </a:t>
+            </a:r>
+            <a:endParaRPr lang="en-US" dirty="0"/>
+          </a:p>
+        </p:txBody>
+      </p:sp>
+    </p:spTree>
+    <p:extLst>
+      <p:ext uri="{BB962C8B-B14F-4D97-AF65-F5344CB8AC3E}">
+        <p14:creationId xmlns:p14="http://schemas.microsoft.com/office/powerpoint/2010/main" val="320172902"/>
       </p:ext>
     </p:extLst>
   </p:cSld>

</xml_diff>

<commit_message>
cfsensor module basic-sensor update and cfcoverage update
</commit_message>
<xml_diff>
--- a/docs/codebase_description.pptx
+++ b/docs/codebase_description.pptx
@@ -16,6 +16,7 @@
     <p:sldId id="264" r:id="rId10"/>
     <p:sldId id="265" r:id="rId11"/>
     <p:sldId id="266" r:id="rId12"/>
+    <p:sldId id="267" r:id="rId13"/>
   </p:sldIdLst>
   <p:sldSz cx="12192000" cy="6858000"/>
   <p:notesSz cx="6858000" cy="9144000"/>
@@ -4882,6 +4883,138 @@
 </p:sld>
 </file>
 
+<file path=ppt/slides/slide12.xml><?xml version="1.0" encoding="utf-8"?>
+<p:sld xmlns:a="http://schemas.openxmlformats.org/drawingml/2006/main" xmlns:r="http://schemas.openxmlformats.org/officeDocument/2006/relationships" xmlns:p="http://schemas.openxmlformats.org/presentationml/2006/main">
+  <p:cSld>
+    <p:spTree>
+      <p:nvGrpSpPr>
+        <p:cNvPr id="1" name=""/>
+        <p:cNvGrpSpPr/>
+        <p:nvPr/>
+      </p:nvGrpSpPr>
+      <p:grpSpPr>
+        <a:xfrm>
+          <a:off x="0" y="0"/>
+          <a:ext cx="0" cy="0"/>
+          <a:chOff x="0" y="0"/>
+          <a:chExt cx="0" cy="0"/>
+        </a:xfrm>
+      </p:grpSpPr>
+      <p:sp>
+        <p:nvSpPr>
+          <p:cNvPr id="2" name="Title 1">
+            <a:extLst>
+              <a:ext uri="{FF2B5EF4-FFF2-40B4-BE49-F238E27FC236}">
+                <a16:creationId xmlns:a16="http://schemas.microsoft.com/office/drawing/2014/main" id="{EFF3126B-80BE-4BB5-9D53-6570BBEAB642}"/>
+              </a:ext>
+            </a:extLst>
+          </p:cNvPr>
+          <p:cNvSpPr>
+            <a:spLocks noGrp="1"/>
+          </p:cNvSpPr>
+          <p:nvPr>
+            <p:ph type="title"/>
+          </p:nvPr>
+        </p:nvSpPr>
+        <p:spPr/>
+        <p:txBody>
+          <a:bodyPr/>
+          <a:lstStyle/>
+          <a:p>
+            <a:r>
+              <a:rPr lang="en-US" dirty="0"/>
+              <a:t>General notes on coding style</a:t>
+            </a:r>
+          </a:p>
+        </p:txBody>
+      </p:sp>
+      <p:sp>
+        <p:nvSpPr>
+          <p:cNvPr id="4" name="Content Placeholder 2">
+            <a:extLst>
+              <a:ext uri="{FF2B5EF4-FFF2-40B4-BE49-F238E27FC236}">
+                <a16:creationId xmlns:a16="http://schemas.microsoft.com/office/drawing/2014/main" id="{B02985F4-C396-499F-94AD-B40C7CCEA073}"/>
+              </a:ext>
+            </a:extLst>
+          </p:cNvPr>
+          <p:cNvSpPr>
+            <a:spLocks noGrp="1"/>
+          </p:cNvSpPr>
+          <p:nvPr>
+            <p:ph idx="1"/>
+          </p:nvPr>
+        </p:nvSpPr>
+        <p:spPr>
+          <a:xfrm>
+            <a:off x="838201" y="1825624"/>
+            <a:ext cx="5461000" cy="3366136"/>
+          </a:xfrm>
+        </p:spPr>
+        <p:txBody>
+          <a:bodyPr>
+            <a:normAutofit/>
+          </a:bodyPr>
+          <a:lstStyle/>
+          <a:p>
+            <a:r>
+              <a:rPr lang="en-US" sz="1800"/>
+              <a:t>Frames </a:t>
+            </a:r>
+            <a:r>
+              <a:rPr lang="en-US" sz="1800" dirty="0"/>
+              <a:t>may be defined as classes. They materialize at the point in the program when an object of that class is instantiated.</a:t>
+            </a:r>
+          </a:p>
+          <a:p>
+            <a:r>
+              <a:rPr lang="en-US" sz="1800" dirty="0"/>
+              <a:t>Example: </a:t>
+            </a:r>
+            <a:r>
+              <a:rPr lang="en-US" sz="1800" dirty="0" err="1"/>
+              <a:t>WelcomeFrame</a:t>
+            </a:r>
+            <a:r>
+              <a:rPr lang="en-US" sz="1800" dirty="0"/>
+              <a:t>, </a:t>
+            </a:r>
+            <a:r>
+              <a:rPr lang="en-US" sz="1800" dirty="0" err="1"/>
+              <a:t>ConfigureFrame</a:t>
+            </a:r>
+            <a:r>
+              <a:rPr lang="en-US" sz="1800" dirty="0"/>
+              <a:t>, </a:t>
+            </a:r>
+            <a:r>
+              <a:rPr lang="en-US" sz="1800" dirty="0" err="1"/>
+              <a:t>etc</a:t>
+            </a:r>
+            <a:endParaRPr lang="en-US" sz="1800" dirty="0"/>
+          </a:p>
+          <a:p>
+            <a:pPr marL="0" indent="0">
+              <a:buNone/>
+            </a:pPr>
+            <a:endParaRPr lang="en-US" sz="1800" dirty="0">
+              <a:cs typeface="Courier New" panose="02070309020205020404" pitchFamily="49" charset="0"/>
+            </a:endParaRPr>
+          </a:p>
+        </p:txBody>
+      </p:sp>
+    </p:spTree>
+    <p:extLst>
+      <p:ext uri="{BB962C8B-B14F-4D97-AF65-F5344CB8AC3E}">
+        <p14:creationId xmlns:p14="http://schemas.microsoft.com/office/powerpoint/2010/main" val="3362265858"/>
+      </p:ext>
+    </p:extLst>
+  </p:cSld>
+  <p:clrMapOvr>
+    <a:masterClrMapping/>
+  </p:clrMapOvr>
+</p:sld>
+</file>
+
 <file path=ppt/slides/slide2.xml><?xml version="1.0" encoding="utf-8"?>
 <p:sld xmlns:a="http://schemas.openxmlformats.org/drawingml/2006/main" xmlns:r="http://schemas.openxmlformats.org/officeDocument/2006/relationships" xmlns:p="http://schemas.openxmlformats.org/presentationml/2006/main">
   <p:cSld>

</xml_diff>

<commit_message>
change folder name from visualizeframe to visualize
</commit_message>
<xml_diff>
--- a/docs/codebase_description.pptx
+++ b/docs/codebase_description.pptx
@@ -12,11 +12,13 @@
     <p:sldId id="262" r:id="rId6"/>
     <p:sldId id="259" r:id="rId7"/>
     <p:sldId id="260" r:id="rId8"/>
-    <p:sldId id="263" r:id="rId9"/>
-    <p:sldId id="264" r:id="rId10"/>
-    <p:sldId id="265" r:id="rId11"/>
-    <p:sldId id="266" r:id="rId12"/>
-    <p:sldId id="267" r:id="rId13"/>
+    <p:sldId id="268" r:id="rId9"/>
+    <p:sldId id="269" r:id="rId10"/>
+    <p:sldId id="263" r:id="rId11"/>
+    <p:sldId id="264" r:id="rId12"/>
+    <p:sldId id="265" r:id="rId13"/>
+    <p:sldId id="266" r:id="rId14"/>
+    <p:sldId id="267" r:id="rId15"/>
   </p:sldIdLst>
   <p:sldSz cx="12192000" cy="6858000"/>
   <p:notesSz cx="6858000" cy="9144000"/>
@@ -270,7 +272,7 @@
           <a:p>
             <a:fld id="{F6612307-B608-4FD9-90D8-D494C0A10B27}" type="datetimeFigureOut">
               <a:rPr lang="en-US" smtClean="0"/>
-              <a:t>9/20/2021</a:t>
+              <a:t>10/11/2021</a:t>
             </a:fld>
             <a:endParaRPr lang="en-US"/>
           </a:p>
@@ -468,7 +470,7 @@
           <a:p>
             <a:fld id="{F6612307-B608-4FD9-90D8-D494C0A10B27}" type="datetimeFigureOut">
               <a:rPr lang="en-US" smtClean="0"/>
-              <a:t>9/20/2021</a:t>
+              <a:t>10/11/2021</a:t>
             </a:fld>
             <a:endParaRPr lang="en-US"/>
           </a:p>
@@ -676,7 +678,7 @@
           <a:p>
             <a:fld id="{F6612307-B608-4FD9-90D8-D494C0A10B27}" type="datetimeFigureOut">
               <a:rPr lang="en-US" smtClean="0"/>
-              <a:t>9/20/2021</a:t>
+              <a:t>10/11/2021</a:t>
             </a:fld>
             <a:endParaRPr lang="en-US"/>
           </a:p>
@@ -874,7 +876,7 @@
           <a:p>
             <a:fld id="{F6612307-B608-4FD9-90D8-D494C0A10B27}" type="datetimeFigureOut">
               <a:rPr lang="en-US" smtClean="0"/>
-              <a:t>9/20/2021</a:t>
+              <a:t>10/11/2021</a:t>
             </a:fld>
             <a:endParaRPr lang="en-US"/>
           </a:p>
@@ -1149,7 +1151,7 @@
           <a:p>
             <a:fld id="{F6612307-B608-4FD9-90D8-D494C0A10B27}" type="datetimeFigureOut">
               <a:rPr lang="en-US" smtClean="0"/>
-              <a:t>9/20/2021</a:t>
+              <a:t>10/11/2021</a:t>
             </a:fld>
             <a:endParaRPr lang="en-US"/>
           </a:p>
@@ -1414,7 +1416,7 @@
           <a:p>
             <a:fld id="{F6612307-B608-4FD9-90D8-D494C0A10B27}" type="datetimeFigureOut">
               <a:rPr lang="en-US" smtClean="0"/>
-              <a:t>9/20/2021</a:t>
+              <a:t>10/11/2021</a:t>
             </a:fld>
             <a:endParaRPr lang="en-US"/>
           </a:p>
@@ -1826,7 +1828,7 @@
           <a:p>
             <a:fld id="{F6612307-B608-4FD9-90D8-D494C0A10B27}" type="datetimeFigureOut">
               <a:rPr lang="en-US" smtClean="0"/>
-              <a:t>9/20/2021</a:t>
+              <a:t>10/11/2021</a:t>
             </a:fld>
             <a:endParaRPr lang="en-US"/>
           </a:p>
@@ -1967,7 +1969,7 @@
           <a:p>
             <a:fld id="{F6612307-B608-4FD9-90D8-D494C0A10B27}" type="datetimeFigureOut">
               <a:rPr lang="en-US" smtClean="0"/>
-              <a:t>9/20/2021</a:t>
+              <a:t>10/11/2021</a:t>
             </a:fld>
             <a:endParaRPr lang="en-US"/>
           </a:p>
@@ -2080,7 +2082,7 @@
           <a:p>
             <a:fld id="{F6612307-B608-4FD9-90D8-D494C0A10B27}" type="datetimeFigureOut">
               <a:rPr lang="en-US" smtClean="0"/>
-              <a:t>9/20/2021</a:t>
+              <a:t>10/11/2021</a:t>
             </a:fld>
             <a:endParaRPr lang="en-US"/>
           </a:p>
@@ -2391,7 +2393,7 @@
           <a:p>
             <a:fld id="{F6612307-B608-4FD9-90D8-D494C0A10B27}" type="datetimeFigureOut">
               <a:rPr lang="en-US" smtClean="0"/>
-              <a:t>9/20/2021</a:t>
+              <a:t>10/11/2021</a:t>
             </a:fld>
             <a:endParaRPr lang="en-US"/>
           </a:p>
@@ -2679,7 +2681,7 @@
           <a:p>
             <a:fld id="{F6612307-B608-4FD9-90D8-D494C0A10B27}" type="datetimeFigureOut">
               <a:rPr lang="en-US" smtClean="0"/>
-              <a:t>9/20/2021</a:t>
+              <a:t>10/11/2021</a:t>
             </a:fld>
             <a:endParaRPr lang="en-US"/>
           </a:p>
@@ -2920,7 +2922,7 @@
           <a:p>
             <a:fld id="{F6612307-B608-4FD9-90D8-D494C0A10B27}" type="datetimeFigureOut">
               <a:rPr lang="en-US" smtClean="0"/>
-              <a:t>9/20/2021</a:t>
+              <a:t>10/11/2021</a:t>
             </a:fld>
             <a:endParaRPr lang="en-US"/>
           </a:p>
@@ -3422,6 +3424,755 @@
           <p:cNvPr id="2" name="Title 1">
             <a:extLst>
               <a:ext uri="{FF2B5EF4-FFF2-40B4-BE49-F238E27FC236}">
+                <a16:creationId xmlns:a16="http://schemas.microsoft.com/office/drawing/2014/main" id="{DF4BB113-B8B2-4A70-AFE7-29FF8386057F}"/>
+              </a:ext>
+            </a:extLst>
+          </p:cNvPr>
+          <p:cNvSpPr>
+            <a:spLocks noGrp="1"/>
+          </p:cNvSpPr>
+          <p:nvPr>
+            <p:ph type="title"/>
+          </p:nvPr>
+        </p:nvSpPr>
+        <p:spPr/>
+        <p:txBody>
+          <a:bodyPr/>
+          <a:lstStyle/>
+          <a:p>
+            <a:r>
+              <a:rPr lang="en-US" dirty="0"/>
+              <a:t>config.py</a:t>
+            </a:r>
+          </a:p>
+        </p:txBody>
+      </p:sp>
+      <p:sp>
+        <p:nvSpPr>
+          <p:cNvPr id="3" name="Content Placeholder 2">
+            <a:extLst>
+              <a:ext uri="{FF2B5EF4-FFF2-40B4-BE49-F238E27FC236}">
+                <a16:creationId xmlns:a16="http://schemas.microsoft.com/office/drawing/2014/main" id="{668258D0-7C27-44FF-A656-A93B6F699377}"/>
+              </a:ext>
+            </a:extLst>
+          </p:cNvPr>
+          <p:cNvSpPr>
+            <a:spLocks noGrp="1"/>
+          </p:cNvSpPr>
+          <p:nvPr>
+            <p:ph idx="1"/>
+          </p:nvPr>
+        </p:nvSpPr>
+        <p:spPr>
+          <a:xfrm>
+            <a:off x="756920" y="1591945"/>
+            <a:ext cx="5509334" cy="3998126"/>
+          </a:xfrm>
+        </p:spPr>
+        <p:txBody>
+          <a:bodyPr>
+            <a:normAutofit lnSpcReduction="10000"/>
+          </a:bodyPr>
+          <a:lstStyle/>
+          <a:p>
+            <a:r>
+              <a:rPr lang="en-US" sz="1600" dirty="0"/>
+              <a:t>This module contains the </a:t>
+            </a:r>
+            <a:r>
+              <a:rPr lang="en-US" sz="1600" dirty="0" err="1"/>
+              <a:t>GuiStyle</a:t>
+            </a:r>
+            <a:r>
+              <a:rPr lang="en-US" sz="1600" dirty="0"/>
+              <a:t> class, which contains the configuration of the GUI widgets. </a:t>
+            </a:r>
+          </a:p>
+          <a:p>
+            <a:pPr lvl="1"/>
+            <a:r>
+              <a:rPr lang="en-US" sz="1400" dirty="0"/>
+              <a:t>It can be referenced in other modules and a uniform custom style (e.g., fonts of labels, color of buttons, etc.) can be maintained easily. (Not done currently, mostly the default widget style is used.) </a:t>
+            </a:r>
+          </a:p>
+          <a:p>
+            <a:r>
+              <a:rPr lang="en-US" sz="1600" dirty="0"/>
+              <a:t>The module also stores variables which are used as global variables over the other modules of </a:t>
+            </a:r>
+            <a:r>
+              <a:rPr lang="en-US" sz="1600" dirty="0" err="1"/>
+              <a:t>eosim</a:t>
+            </a:r>
+            <a:r>
+              <a:rPr lang="en-US" sz="1600" dirty="0"/>
+              <a:t>.</a:t>
+            </a:r>
+          </a:p>
+          <a:p>
+            <a:pPr lvl="1"/>
+            <a:r>
+              <a:rPr lang="en-US" sz="1600" dirty="0" err="1">
+                <a:latin typeface="Courier New" panose="02070309020205020404" pitchFamily="49" charset="0"/>
+                <a:cs typeface="Courier New" panose="02070309020205020404" pitchFamily="49" charset="0"/>
+              </a:rPr>
+              <a:t>workspace_dir</a:t>
+            </a:r>
+            <a:r>
+              <a:rPr lang="en-US" sz="1600" dirty="0">
+                <a:cs typeface="Courier New" panose="02070309020205020404" pitchFamily="49" charset="0"/>
+              </a:rPr>
+              <a:t>: This variable stores the workspace directory.  It is written onto when the user selects the workspace directory (new or old) in the </a:t>
+            </a:r>
+            <a:r>
+              <a:rPr lang="en-US" sz="1600" dirty="0" err="1">
+                <a:cs typeface="Courier New" panose="02070309020205020404" pitchFamily="49" charset="0"/>
+              </a:rPr>
+              <a:t>menubar</a:t>
+            </a:r>
+            <a:r>
+              <a:rPr lang="en-US" sz="1600" dirty="0">
+                <a:cs typeface="Courier New" panose="02070309020205020404" pitchFamily="49" charset="0"/>
+              </a:rPr>
+              <a:t>.</a:t>
+            </a:r>
+          </a:p>
+          <a:p>
+            <a:pPr lvl="1"/>
+            <a:r>
+              <a:rPr lang="en-US" sz="1600" dirty="0" err="1">
+                <a:latin typeface="Courier New" panose="02070309020205020404" pitchFamily="49" charset="0"/>
+                <a:cs typeface="Courier New" panose="02070309020205020404" pitchFamily="49" charset="0"/>
+              </a:rPr>
+              <a:t>mission_specs</a:t>
+            </a:r>
+            <a:r>
+              <a:rPr lang="en-US" sz="1600" dirty="0">
+                <a:latin typeface="Courier New" panose="02070309020205020404" pitchFamily="49" charset="0"/>
+                <a:cs typeface="Courier New" panose="02070309020205020404" pitchFamily="49" charset="0"/>
+              </a:rPr>
+              <a:t>: </a:t>
+            </a:r>
+            <a:r>
+              <a:rPr lang="en-US" sz="1600" dirty="0">
+                <a:cs typeface="Courier New" panose="02070309020205020404" pitchFamily="49" charset="0"/>
+              </a:rPr>
+              <a:t>This variable stores the mission specifications as and when they are updated in the Configure frame.</a:t>
+            </a:r>
+          </a:p>
+          <a:p>
+            <a:r>
+              <a:rPr lang="en-US" sz="1600" dirty="0">
+                <a:cs typeface="Courier New" panose="02070309020205020404" pitchFamily="49" charset="0"/>
+              </a:rPr>
+              <a:t>This method of using global variables is not safe. </a:t>
+            </a:r>
+            <a:r>
+              <a:rPr lang="en-US" sz="1600" i="1" dirty="0">
+                <a:cs typeface="Courier New" panose="02070309020205020404" pitchFamily="49" charset="0"/>
+              </a:rPr>
+              <a:t>Unless</a:t>
+            </a:r>
+            <a:r>
+              <a:rPr lang="en-US" sz="1600" dirty="0">
+                <a:cs typeface="Courier New" panose="02070309020205020404" pitchFamily="49" charset="0"/>
+              </a:rPr>
+              <a:t> the variables are manipulated (write, read) in the correct order, the application can fail.</a:t>
+            </a:r>
+          </a:p>
+        </p:txBody>
+      </p:sp>
+    </p:spTree>
+    <p:extLst>
+      <p:ext uri="{BB962C8B-B14F-4D97-AF65-F5344CB8AC3E}">
+        <p14:creationId xmlns:p14="http://schemas.microsoft.com/office/powerpoint/2010/main" val="2484587524"/>
+      </p:ext>
+    </p:extLst>
+  </p:cSld>
+  <p:clrMapOvr>
+    <a:masterClrMapping/>
+  </p:clrMapOvr>
+</p:sld>
+</file>
+
+<file path=ppt/slides/slide11.xml><?xml version="1.0" encoding="utf-8"?>
+<p:sld xmlns:a="http://schemas.openxmlformats.org/drawingml/2006/main" xmlns:r="http://schemas.openxmlformats.org/officeDocument/2006/relationships" xmlns:p="http://schemas.openxmlformats.org/presentationml/2006/main">
+  <p:cSld>
+    <p:spTree>
+      <p:nvGrpSpPr>
+        <p:cNvPr id="1" name=""/>
+        <p:cNvGrpSpPr/>
+        <p:nvPr/>
+      </p:nvGrpSpPr>
+      <p:grpSpPr>
+        <a:xfrm>
+          <a:off x="0" y="0"/>
+          <a:ext cx="0" cy="0"/>
+          <a:chOff x="0" y="0"/>
+          <a:chExt cx="0" cy="0"/>
+        </a:xfrm>
+      </p:grpSpPr>
+      <p:sp>
+        <p:nvSpPr>
+          <p:cNvPr id="2" name="Title 1">
+            <a:extLst>
+              <a:ext uri="{FF2B5EF4-FFF2-40B4-BE49-F238E27FC236}">
+                <a16:creationId xmlns:a16="http://schemas.microsoft.com/office/drawing/2014/main" id="{45C44DAD-FDD1-4E6E-87C4-7068186AD2A4}"/>
+              </a:ext>
+            </a:extLst>
+          </p:cNvPr>
+          <p:cNvSpPr>
+            <a:spLocks noGrp="1"/>
+          </p:cNvSpPr>
+          <p:nvPr>
+            <p:ph type="title"/>
+          </p:nvPr>
+        </p:nvSpPr>
+        <p:spPr/>
+        <p:txBody>
+          <a:bodyPr/>
+          <a:lstStyle/>
+          <a:p>
+            <a:r>
+              <a:rPr lang="en-US" dirty="0"/>
+              <a:t>General notes on coding style</a:t>
+            </a:r>
+          </a:p>
+        </p:txBody>
+      </p:sp>
+      <p:sp>
+        <p:nvSpPr>
+          <p:cNvPr id="4" name="Content Placeholder 2">
+            <a:extLst>
+              <a:ext uri="{FF2B5EF4-FFF2-40B4-BE49-F238E27FC236}">
+                <a16:creationId xmlns:a16="http://schemas.microsoft.com/office/drawing/2014/main" id="{1549F9C8-27FF-454B-A76D-C8DD80A6C666}"/>
+              </a:ext>
+            </a:extLst>
+          </p:cNvPr>
+          <p:cNvSpPr>
+            <a:spLocks noGrp="1"/>
+          </p:cNvSpPr>
+          <p:nvPr>
+            <p:ph idx="1"/>
+          </p:nvPr>
+        </p:nvSpPr>
+        <p:spPr>
+          <a:xfrm>
+            <a:off x="838200" y="1825624"/>
+            <a:ext cx="6099175" cy="4351656"/>
+          </a:xfrm>
+        </p:spPr>
+        <p:txBody>
+          <a:bodyPr>
+            <a:normAutofit lnSpcReduction="10000"/>
+          </a:bodyPr>
+          <a:lstStyle/>
+          <a:p>
+            <a:r>
+              <a:rPr lang="en-US" sz="2000" dirty="0"/>
+              <a:t>‘frame’ widgets are used to define the different sections of the window. A “master” frame encompasses all the frames in the window is also usually defined. </a:t>
+            </a:r>
+          </a:p>
+          <a:p>
+            <a:r>
+              <a:rPr lang="en-US" sz="2000" dirty="0"/>
+              <a:t>E.g. in the alongside window (see </a:t>
+            </a:r>
+            <a:r>
+              <a:rPr lang="en-US" sz="2000" dirty="0">
+                <a:latin typeface="Courier New" panose="02070309020205020404" pitchFamily="49" charset="0"/>
+                <a:cs typeface="Courier New" panose="02070309020205020404" pitchFamily="49" charset="0"/>
+              </a:rPr>
+              <a:t>cfsatellite.py </a:t>
+            </a:r>
+            <a:r>
+              <a:rPr lang="en-US" sz="2000" dirty="0"/>
+              <a:t>module), there are three frames defined: (1) </a:t>
+            </a:r>
+            <a:r>
+              <a:rPr lang="en-US" sz="2000" dirty="0" err="1">
+                <a:latin typeface="Courier New" panose="02070309020205020404" pitchFamily="49" charset="0"/>
+                <a:cs typeface="Courier New" panose="02070309020205020404" pitchFamily="49" charset="0"/>
+              </a:rPr>
+              <a:t>sat_win_frame</a:t>
+            </a:r>
+            <a:r>
+              <a:rPr lang="en-US" sz="2000" dirty="0">
+                <a:latin typeface="Courier New" panose="02070309020205020404" pitchFamily="49" charset="0"/>
+                <a:cs typeface="Courier New" panose="02070309020205020404" pitchFamily="49" charset="0"/>
+              </a:rPr>
+              <a:t> </a:t>
+            </a:r>
+            <a:r>
+              <a:rPr lang="en-US" sz="2000" dirty="0"/>
+              <a:t>(the master frame) (2) </a:t>
+            </a:r>
+            <a:r>
+              <a:rPr lang="en-US" sz="2000" dirty="0" err="1">
+                <a:latin typeface="Courier New" panose="02070309020205020404" pitchFamily="49" charset="0"/>
+                <a:cs typeface="Courier New" panose="02070309020205020404" pitchFamily="49" charset="0"/>
+              </a:rPr>
+              <a:t>sat_kep_specs_frame</a:t>
+            </a:r>
+            <a:r>
+              <a:rPr lang="en-US" sz="2000" dirty="0">
+                <a:latin typeface="Courier New" panose="02070309020205020404" pitchFamily="49" charset="0"/>
+                <a:cs typeface="Courier New" panose="02070309020205020404" pitchFamily="49" charset="0"/>
+              </a:rPr>
+              <a:t> </a:t>
+            </a:r>
+            <a:r>
+              <a:rPr lang="en-US" sz="2000" dirty="0"/>
+              <a:t>(3) </a:t>
+            </a:r>
+            <a:r>
+              <a:rPr lang="en-US" sz="2000" dirty="0" err="1">
+                <a:latin typeface="Courier New" panose="02070309020205020404" pitchFamily="49" charset="0"/>
+                <a:cs typeface="Courier New" panose="02070309020205020404" pitchFamily="49" charset="0"/>
+              </a:rPr>
+              <a:t>okcancel_frame</a:t>
+            </a:r>
+            <a:r>
+              <a:rPr lang="en-US" sz="2000" dirty="0">
+                <a:latin typeface="Courier New" panose="02070309020205020404" pitchFamily="49" charset="0"/>
+                <a:cs typeface="Courier New" panose="02070309020205020404" pitchFamily="49" charset="0"/>
+              </a:rPr>
+              <a:t>.</a:t>
+            </a:r>
+          </a:p>
+          <a:p>
+            <a:r>
+              <a:rPr lang="en-US" sz="2000" dirty="0">
+                <a:cs typeface="Courier New" panose="02070309020205020404" pitchFamily="49" charset="0"/>
+              </a:rPr>
+              <a:t>Default values can be provided as illustrated in the following snippet:</a:t>
+            </a:r>
+          </a:p>
+          <a:p>
+            <a:pPr marL="0" indent="0">
+              <a:buNone/>
+            </a:pPr>
+            <a:r>
+              <a:rPr lang="en-US" sz="1200" dirty="0" err="1">
+                <a:latin typeface="Courier New" panose="02070309020205020404" pitchFamily="49" charset="0"/>
+                <a:cs typeface="Courier New" panose="02070309020205020404" pitchFamily="49" charset="0"/>
+              </a:rPr>
+              <a:t>alt_entry.insert</a:t>
+            </a:r>
+            <a:r>
+              <a:rPr lang="en-US" sz="1200" dirty="0">
+                <a:latin typeface="Courier New" panose="02070309020205020404" pitchFamily="49" charset="0"/>
+                <a:cs typeface="Courier New" panose="02070309020205020404" pitchFamily="49" charset="0"/>
+              </a:rPr>
+              <a:t>(0,500)</a:t>
+            </a:r>
+          </a:p>
+          <a:p>
+            <a:pPr marL="0" indent="0">
+              <a:buNone/>
+            </a:pPr>
+            <a:r>
+              <a:rPr lang="en-US" sz="1200" dirty="0" err="1">
+                <a:latin typeface="Courier New" panose="02070309020205020404" pitchFamily="49" charset="0"/>
+                <a:cs typeface="Courier New" panose="02070309020205020404" pitchFamily="49" charset="0"/>
+              </a:rPr>
+              <a:t>alt_entry.bind</a:t>
+            </a:r>
+            <a:r>
+              <a:rPr lang="en-US" sz="1200" dirty="0">
+                <a:latin typeface="Courier New" panose="02070309020205020404" pitchFamily="49" charset="0"/>
+                <a:cs typeface="Courier New" panose="02070309020205020404" pitchFamily="49" charset="0"/>
+              </a:rPr>
+              <a:t>("&lt;</a:t>
+            </a:r>
+            <a:r>
+              <a:rPr lang="en-US" sz="1200" dirty="0" err="1">
+                <a:latin typeface="Courier New" panose="02070309020205020404" pitchFamily="49" charset="0"/>
+                <a:cs typeface="Courier New" panose="02070309020205020404" pitchFamily="49" charset="0"/>
+              </a:rPr>
+              <a:t>FocusIn</a:t>
+            </a:r>
+            <a:r>
+              <a:rPr lang="en-US" sz="1200" dirty="0">
+                <a:latin typeface="Courier New" panose="02070309020205020404" pitchFamily="49" charset="0"/>
+                <a:cs typeface="Courier New" panose="02070309020205020404" pitchFamily="49" charset="0"/>
+              </a:rPr>
+              <a:t>&gt;", lambda </a:t>
+            </a:r>
+            <a:r>
+              <a:rPr lang="en-US" sz="1200" dirty="0" err="1">
+                <a:latin typeface="Courier New" panose="02070309020205020404" pitchFamily="49" charset="0"/>
+                <a:cs typeface="Courier New" panose="02070309020205020404" pitchFamily="49" charset="0"/>
+              </a:rPr>
+              <a:t>args</a:t>
+            </a:r>
+            <a:r>
+              <a:rPr lang="en-US" sz="1200" dirty="0">
+                <a:latin typeface="Courier New" panose="02070309020205020404" pitchFamily="49" charset="0"/>
+                <a:cs typeface="Courier New" panose="02070309020205020404" pitchFamily="49" charset="0"/>
+              </a:rPr>
+              <a:t>: </a:t>
+            </a:r>
+            <a:r>
+              <a:rPr lang="en-US" sz="1200" dirty="0" err="1">
+                <a:latin typeface="Courier New" panose="02070309020205020404" pitchFamily="49" charset="0"/>
+                <a:cs typeface="Courier New" panose="02070309020205020404" pitchFamily="49" charset="0"/>
+              </a:rPr>
+              <a:t>alt_entry.delete</a:t>
+            </a:r>
+            <a:r>
+              <a:rPr lang="en-US" sz="1200" dirty="0">
+                <a:latin typeface="Courier New" panose="02070309020205020404" pitchFamily="49" charset="0"/>
+                <a:cs typeface="Courier New" panose="02070309020205020404" pitchFamily="49" charset="0"/>
+              </a:rPr>
+              <a:t>('0', 'end’))</a:t>
+            </a:r>
+          </a:p>
+          <a:p>
+            <a:pPr marL="0" indent="0">
+              <a:buNone/>
+            </a:pPr>
+            <a:r>
+              <a:rPr lang="en-US" sz="1800" dirty="0">
+                <a:cs typeface="Courier New" panose="02070309020205020404" pitchFamily="49" charset="0"/>
+              </a:rPr>
+              <a:t>‘500’ is the default value in the altitude </a:t>
+            </a:r>
+            <a:r>
+              <a:rPr lang="en-US" sz="1800" i="1" dirty="0">
+                <a:cs typeface="Courier New" panose="02070309020205020404" pitchFamily="49" charset="0"/>
+              </a:rPr>
+              <a:t>entry</a:t>
+            </a:r>
+            <a:r>
+              <a:rPr lang="en-US" sz="1800" dirty="0">
+                <a:cs typeface="Courier New" panose="02070309020205020404" pitchFamily="49" charset="0"/>
+              </a:rPr>
+              <a:t> widget. It gets cleared when one clicks inside the entry widget.</a:t>
+            </a:r>
+          </a:p>
+        </p:txBody>
+      </p:sp>
+      <p:pic>
+        <p:nvPicPr>
+          <p:cNvPr id="6" name="Picture 5">
+            <a:extLst>
+              <a:ext uri="{FF2B5EF4-FFF2-40B4-BE49-F238E27FC236}">
+                <a16:creationId xmlns:a16="http://schemas.microsoft.com/office/drawing/2014/main" id="{0D621A4E-CBF4-4DBD-A425-2A1FE90D4259}"/>
+              </a:ext>
+            </a:extLst>
+          </p:cNvPr>
+          <p:cNvPicPr>
+            <a:picLocks noChangeAspect="1"/>
+          </p:cNvPicPr>
+          <p:nvPr/>
+        </p:nvPicPr>
+        <p:blipFill>
+          <a:blip r:embed="rId2"/>
+          <a:stretch>
+            <a:fillRect/>
+          </a:stretch>
+        </p:blipFill>
+        <p:spPr>
+          <a:xfrm>
+            <a:off x="8790305" y="1581397"/>
+            <a:ext cx="3000375" cy="3238500"/>
+          </a:xfrm>
+          <a:prstGeom prst="rect">
+            <a:avLst/>
+          </a:prstGeom>
+        </p:spPr>
+      </p:pic>
+      <p:cxnSp>
+        <p:nvCxnSpPr>
+          <p:cNvPr id="8" name="Straight Arrow Connector 7">
+            <a:extLst>
+              <a:ext uri="{FF2B5EF4-FFF2-40B4-BE49-F238E27FC236}">
+                <a16:creationId xmlns:a16="http://schemas.microsoft.com/office/drawing/2014/main" id="{9FCE6D85-4BB2-4A70-9544-4FB8556AE06C}"/>
+              </a:ext>
+            </a:extLst>
+          </p:cNvPr>
+          <p:cNvCxnSpPr>
+            <a:cxnSpLocks/>
+          </p:cNvCxnSpPr>
+          <p:nvPr/>
+        </p:nvCxnSpPr>
+        <p:spPr>
+          <a:xfrm>
+            <a:off x="9865360" y="1214596"/>
+            <a:ext cx="264160" cy="868204"/>
+          </a:xfrm>
+          <a:prstGeom prst="straightConnector1">
+            <a:avLst/>
+          </a:prstGeom>
+          <a:ln>
+            <a:tailEnd type="triangle"/>
+          </a:ln>
+        </p:spPr>
+        <p:style>
+          <a:lnRef idx="1">
+            <a:schemeClr val="accent1"/>
+          </a:lnRef>
+          <a:fillRef idx="0">
+            <a:schemeClr val="accent1"/>
+          </a:fillRef>
+          <a:effectRef idx="0">
+            <a:schemeClr val="accent1"/>
+          </a:effectRef>
+          <a:fontRef idx="minor">
+            <a:schemeClr val="tx1"/>
+          </a:fontRef>
+        </p:style>
+      </p:cxnSp>
+      <p:cxnSp>
+        <p:nvCxnSpPr>
+          <p:cNvPr id="10" name="Straight Arrow Connector 9">
+            <a:extLst>
+              <a:ext uri="{FF2B5EF4-FFF2-40B4-BE49-F238E27FC236}">
+                <a16:creationId xmlns:a16="http://schemas.microsoft.com/office/drawing/2014/main" id="{948D55C6-A0B9-4C35-B36C-39D65F0A313E}"/>
+              </a:ext>
+            </a:extLst>
+          </p:cNvPr>
+          <p:cNvCxnSpPr>
+            <a:cxnSpLocks/>
+            <a:stCxn id="19" idx="2"/>
+          </p:cNvCxnSpPr>
+          <p:nvPr/>
+        </p:nvCxnSpPr>
+        <p:spPr>
+          <a:xfrm flipV="1">
+            <a:off x="8044814" y="3200648"/>
+            <a:ext cx="1312546" cy="444646"/>
+          </a:xfrm>
+          <a:prstGeom prst="straightConnector1">
+            <a:avLst/>
+          </a:prstGeom>
+          <a:ln>
+            <a:tailEnd type="triangle"/>
+          </a:ln>
+        </p:spPr>
+        <p:style>
+          <a:lnRef idx="1">
+            <a:schemeClr val="accent1"/>
+          </a:lnRef>
+          <a:fillRef idx="0">
+            <a:schemeClr val="accent1"/>
+          </a:fillRef>
+          <a:effectRef idx="0">
+            <a:schemeClr val="accent1"/>
+          </a:effectRef>
+          <a:fontRef idx="minor">
+            <a:schemeClr val="tx1"/>
+          </a:fontRef>
+        </p:style>
+      </p:cxnSp>
+      <p:cxnSp>
+        <p:nvCxnSpPr>
+          <p:cNvPr id="14" name="Straight Arrow Connector 13">
+            <a:extLst>
+              <a:ext uri="{FF2B5EF4-FFF2-40B4-BE49-F238E27FC236}">
+                <a16:creationId xmlns:a16="http://schemas.microsoft.com/office/drawing/2014/main" id="{BCE39BAA-4922-41B7-99CA-D19110F801C9}"/>
+              </a:ext>
+            </a:extLst>
+          </p:cNvPr>
+          <p:cNvCxnSpPr>
+            <a:cxnSpLocks/>
+          </p:cNvCxnSpPr>
+          <p:nvPr/>
+        </p:nvCxnSpPr>
+        <p:spPr>
+          <a:xfrm flipH="1" flipV="1">
+            <a:off x="9489440" y="4593954"/>
+            <a:ext cx="375920" cy="592744"/>
+          </a:xfrm>
+          <a:prstGeom prst="straightConnector1">
+            <a:avLst/>
+          </a:prstGeom>
+          <a:ln>
+            <a:tailEnd type="triangle"/>
+          </a:ln>
+        </p:spPr>
+        <p:style>
+          <a:lnRef idx="1">
+            <a:schemeClr val="accent1"/>
+          </a:lnRef>
+          <a:fillRef idx="0">
+            <a:schemeClr val="accent1"/>
+          </a:fillRef>
+          <a:effectRef idx="0">
+            <a:schemeClr val="accent1"/>
+          </a:effectRef>
+          <a:fontRef idx="minor">
+            <a:schemeClr val="tx1"/>
+          </a:fontRef>
+        </p:style>
+      </p:cxnSp>
+      <p:sp>
+        <p:nvSpPr>
+          <p:cNvPr id="17" name="TextBox 16">
+            <a:extLst>
+              <a:ext uri="{FF2B5EF4-FFF2-40B4-BE49-F238E27FC236}">
+                <a16:creationId xmlns:a16="http://schemas.microsoft.com/office/drawing/2014/main" id="{336544EA-8F69-4993-B5B9-7ED4D0C76CC3}"/>
+              </a:ext>
+            </a:extLst>
+          </p:cNvPr>
+          <p:cNvSpPr txBox="1"/>
+          <p:nvPr/>
+        </p:nvSpPr>
+        <p:spPr>
+          <a:xfrm>
+            <a:off x="9166135" y="5107913"/>
+            <a:ext cx="2248714" cy="369332"/>
+          </a:xfrm>
+          <a:prstGeom prst="rect">
+            <a:avLst/>
+          </a:prstGeom>
+          <a:noFill/>
+        </p:spPr>
+        <p:txBody>
+          <a:bodyPr wrap="square">
+            <a:spAutoFit/>
+          </a:bodyPr>
+          <a:lstStyle/>
+          <a:p>
+            <a:r>
+              <a:rPr lang="en-US" sz="1800" dirty="0" err="1">
+                <a:latin typeface="Courier New" panose="02070309020205020404" pitchFamily="49" charset="0"/>
+                <a:cs typeface="Courier New" panose="02070309020205020404" pitchFamily="49" charset="0"/>
+              </a:rPr>
+              <a:t>okcancel_frame</a:t>
+            </a:r>
+            <a:endParaRPr lang="en-US" dirty="0"/>
+          </a:p>
+        </p:txBody>
+      </p:sp>
+      <p:sp>
+        <p:nvSpPr>
+          <p:cNvPr id="19" name="TextBox 18">
+            <a:extLst>
+              <a:ext uri="{FF2B5EF4-FFF2-40B4-BE49-F238E27FC236}">
+                <a16:creationId xmlns:a16="http://schemas.microsoft.com/office/drawing/2014/main" id="{2861592D-041D-47A0-BC89-01A1BED74B14}"/>
+              </a:ext>
+            </a:extLst>
+          </p:cNvPr>
+          <p:cNvSpPr txBox="1"/>
+          <p:nvPr/>
+        </p:nvSpPr>
+        <p:spPr>
+          <a:xfrm rot="16888615">
+            <a:off x="6238240" y="3423884"/>
+            <a:ext cx="3251200" cy="369332"/>
+          </a:xfrm>
+          <a:prstGeom prst="rect">
+            <a:avLst/>
+          </a:prstGeom>
+          <a:noFill/>
+        </p:spPr>
+        <p:txBody>
+          <a:bodyPr wrap="square">
+            <a:spAutoFit/>
+          </a:bodyPr>
+          <a:lstStyle/>
+          <a:p>
+            <a:r>
+              <a:rPr lang="en-US" sz="1800" dirty="0" err="1">
+                <a:latin typeface="Courier New" panose="02070309020205020404" pitchFamily="49" charset="0"/>
+                <a:cs typeface="Courier New" panose="02070309020205020404" pitchFamily="49" charset="0"/>
+              </a:rPr>
+              <a:t>sat_kep_specs_frame</a:t>
+            </a:r>
+            <a:r>
+              <a:rPr lang="en-US" sz="1800" dirty="0">
+                <a:latin typeface="Courier New" panose="02070309020205020404" pitchFamily="49" charset="0"/>
+                <a:cs typeface="Courier New" panose="02070309020205020404" pitchFamily="49" charset="0"/>
+              </a:rPr>
+              <a:t> </a:t>
+            </a:r>
+            <a:endParaRPr lang="en-US" dirty="0"/>
+          </a:p>
+        </p:txBody>
+      </p:sp>
+      <p:sp>
+        <p:nvSpPr>
+          <p:cNvPr id="22" name="TextBox 21">
+            <a:extLst>
+              <a:ext uri="{FF2B5EF4-FFF2-40B4-BE49-F238E27FC236}">
+                <a16:creationId xmlns:a16="http://schemas.microsoft.com/office/drawing/2014/main" id="{A27A6B38-9A59-4F73-998A-351B6C0EAEFD}"/>
+              </a:ext>
+            </a:extLst>
+          </p:cNvPr>
+          <p:cNvSpPr txBox="1"/>
+          <p:nvPr/>
+        </p:nvSpPr>
+        <p:spPr>
+          <a:xfrm>
+            <a:off x="8883332" y="843240"/>
+            <a:ext cx="2814320" cy="369332"/>
+          </a:xfrm>
+          <a:prstGeom prst="rect">
+            <a:avLst/>
+          </a:prstGeom>
+          <a:noFill/>
+        </p:spPr>
+        <p:txBody>
+          <a:bodyPr wrap="square">
+            <a:spAutoFit/>
+          </a:bodyPr>
+          <a:lstStyle/>
+          <a:p>
+            <a:r>
+              <a:rPr lang="en-US" sz="1800" dirty="0" err="1">
+                <a:latin typeface="Courier New" panose="02070309020205020404" pitchFamily="49" charset="0"/>
+                <a:cs typeface="Courier New" panose="02070309020205020404" pitchFamily="49" charset="0"/>
+              </a:rPr>
+              <a:t>sat_win_frame</a:t>
+            </a:r>
+            <a:r>
+              <a:rPr lang="en-US" sz="1800" dirty="0">
+                <a:latin typeface="Courier New" panose="02070309020205020404" pitchFamily="49" charset="0"/>
+                <a:cs typeface="Courier New" panose="02070309020205020404" pitchFamily="49" charset="0"/>
+              </a:rPr>
+              <a:t> </a:t>
+            </a:r>
+            <a:endParaRPr lang="en-US" dirty="0"/>
+          </a:p>
+        </p:txBody>
+      </p:sp>
+    </p:spTree>
+    <p:extLst>
+      <p:ext uri="{BB962C8B-B14F-4D97-AF65-F5344CB8AC3E}">
+        <p14:creationId xmlns:p14="http://schemas.microsoft.com/office/powerpoint/2010/main" val="320172902"/>
+      </p:ext>
+    </p:extLst>
+  </p:cSld>
+  <p:clrMapOvr>
+    <a:masterClrMapping/>
+  </p:clrMapOvr>
+</p:sld>
+</file>
+
+<file path=ppt/slides/slide12.xml><?xml version="1.0" encoding="utf-8"?>
+<p:sld xmlns:a="http://schemas.openxmlformats.org/drawingml/2006/main" xmlns:r="http://schemas.openxmlformats.org/officeDocument/2006/relationships" xmlns:p="http://schemas.openxmlformats.org/presentationml/2006/main">
+  <p:cSld>
+    <p:spTree>
+      <p:nvGrpSpPr>
+        <p:cNvPr id="1" name=""/>
+        <p:cNvGrpSpPr/>
+        <p:nvPr/>
+      </p:nvGrpSpPr>
+      <p:grpSpPr>
+        <a:xfrm>
+          <a:off x="0" y="0"/>
+          <a:ext cx="0" cy="0"/>
+          <a:chOff x="0" y="0"/>
+          <a:chExt cx="0" cy="0"/>
+        </a:xfrm>
+      </p:grpSpPr>
+      <p:sp>
+        <p:nvSpPr>
+          <p:cNvPr id="2" name="Title 1">
+            <a:extLst>
+              <a:ext uri="{FF2B5EF4-FFF2-40B4-BE49-F238E27FC236}">
                 <a16:creationId xmlns:a16="http://schemas.microsoft.com/office/drawing/2014/main" id="{E20219A9-ED48-4EB4-9E6E-5DC82134B943}"/>
               </a:ext>
             </a:extLst>
@@ -4134,7 +4885,7 @@
 </p:sld>
 </file>
 
-<file path=ppt/slides/slide11.xml><?xml version="1.0" encoding="utf-8"?>
+<file path=ppt/slides/slide13.xml><?xml version="1.0" encoding="utf-8"?>
 <p:sld xmlns:a="http://schemas.openxmlformats.org/drawingml/2006/main" xmlns:r="http://schemas.openxmlformats.org/officeDocument/2006/relationships" xmlns:p="http://schemas.openxmlformats.org/presentationml/2006/main">
   <p:cSld>
     <p:spTree>
@@ -4883,7 +5634,7 @@
 </p:sld>
 </file>
 
-<file path=ppt/slides/slide12.xml><?xml version="1.0" encoding="utf-8"?>
+<file path=ppt/slides/slide14.xml><?xml version="1.0" encoding="utf-8"?>
 <p:sld xmlns:a="http://schemas.openxmlformats.org/drawingml/2006/main" xmlns:r="http://schemas.openxmlformats.org/officeDocument/2006/relationships" xmlns:p="http://schemas.openxmlformats.org/presentationml/2006/main">
   <p:cSld>
     <p:spTree>
@@ -8101,7 +8852,7 @@
           <p:cNvPr id="2" name="Title 1">
             <a:extLst>
               <a:ext uri="{FF2B5EF4-FFF2-40B4-BE49-F238E27FC236}">
-                <a16:creationId xmlns:a16="http://schemas.microsoft.com/office/drawing/2014/main" id="{DF4BB113-B8B2-4A70-AFE7-29FF8386057F}"/>
+                <a16:creationId xmlns:a16="http://schemas.microsoft.com/office/drawing/2014/main" id="{CD7E050C-798F-4307-A2F5-66D68D30EE39}"/>
               </a:ext>
             </a:extLst>
           </p:cNvPr>
@@ -8119,17 +8870,17 @@
           <a:p>
             <a:r>
               <a:rPr lang="en-US" dirty="0"/>
-              <a:t>config.py</a:t>
-            </a:r>
-          </a:p>
-        </p:txBody>
-      </p:sp>
-      <p:sp>
-        <p:nvSpPr>
-          <p:cNvPr id="3" name="Content Placeholder 2">
-            <a:extLst>
-              <a:ext uri="{FF2B5EF4-FFF2-40B4-BE49-F238E27FC236}">
-                <a16:creationId xmlns:a16="http://schemas.microsoft.com/office/drawing/2014/main" id="{668258D0-7C27-44FF-A656-A93B6F699377}"/>
+              <a:t>executeframe.py</a:t>
+            </a:r>
+          </a:p>
+        </p:txBody>
+      </p:sp>
+      <p:sp>
+        <p:nvSpPr>
+          <p:cNvPr id="4" name="Content Placeholder 2">
+            <a:extLst>
+              <a:ext uri="{FF2B5EF4-FFF2-40B4-BE49-F238E27FC236}">
+                <a16:creationId xmlns:a16="http://schemas.microsoft.com/office/drawing/2014/main" id="{E376CA74-ABBC-4B48-910B-D37884FB3AA5}"/>
               </a:ext>
             </a:extLst>
           </p:cNvPr>
@@ -8142,8 +8893,8 @@
         </p:nvSpPr>
         <p:spPr>
           <a:xfrm>
-            <a:off x="756920" y="1591945"/>
-            <a:ext cx="5509334" cy="3998126"/>
+            <a:off x="704849" y="1463675"/>
+            <a:ext cx="4752976" cy="5251450"/>
           </a:xfrm>
         </p:spPr>
         <p:txBody>
@@ -8153,116 +8904,134 @@
           <a:lstStyle/>
           <a:p>
             <a:r>
-              <a:rPr lang="en-US" sz="1600" dirty="0"/>
-              <a:t>This module contains the </a:t>
-            </a:r>
-            <a:r>
-              <a:rPr lang="en-US" sz="1600" dirty="0" err="1"/>
-              <a:t>GuiStyle</a:t>
-            </a:r>
-            <a:r>
-              <a:rPr lang="en-US" sz="1600" dirty="0"/>
-              <a:t> class, which contains the configuration of the GUI widgets. </a:t>
+              <a:rPr lang="en-US" sz="1800" dirty="0"/>
+              <a:t>The </a:t>
+            </a:r>
+            <a:r>
+              <a:rPr lang="en-US" sz="1800" dirty="0" err="1">
+                <a:latin typeface="Courier New" panose="02070309020205020404" pitchFamily="49" charset="0"/>
+                <a:cs typeface="Courier New" panose="02070309020205020404" pitchFamily="49" charset="0"/>
+              </a:rPr>
+              <a:t>executeframe</a:t>
+            </a:r>
+            <a:r>
+              <a:rPr lang="en-US" sz="1800" dirty="0"/>
+              <a:t> module contains the widgets to initiate execution of the various functionalities.</a:t>
             </a:r>
           </a:p>
           <a:p>
             <a:pPr lvl="1"/>
             <a:r>
               <a:rPr lang="en-US" sz="1400" dirty="0"/>
-              <a:t>It can be referenced in other modules and a uniform custom style (e.g., fonts of labels, color of buttons, etc.) can be maintained easily. (Not done currently, mostly the default widget style is used.) </a:t>
-            </a:r>
-          </a:p>
-          <a:p>
-            <a:r>
-              <a:rPr lang="en-US" sz="1600" dirty="0"/>
-              <a:t>The module also stores variables which are used as global variables over the other modules of </a:t>
-            </a:r>
-            <a:r>
-              <a:rPr lang="en-US" sz="1600" dirty="0" err="1"/>
-              <a:t>eosim</a:t>
-            </a:r>
-            <a:r>
-              <a:rPr lang="en-US" sz="1600" dirty="0"/>
-              <a:t>.</a:t>
+              <a:t>Orbit propagation</a:t>
             </a:r>
           </a:p>
           <a:p>
             <a:pPr lvl="1"/>
             <a:r>
-              <a:rPr lang="en-US" sz="1600" dirty="0" err="1">
-                <a:latin typeface="Courier New" panose="02070309020205020404" pitchFamily="49" charset="0"/>
-                <a:cs typeface="Courier New" panose="02070309020205020404" pitchFamily="49" charset="0"/>
-              </a:rPr>
-              <a:t>workspace_dir</a:t>
-            </a:r>
-            <a:r>
-              <a:rPr lang="en-US" sz="1600" dirty="0">
-                <a:cs typeface="Courier New" panose="02070309020205020404" pitchFamily="49" charset="0"/>
-              </a:rPr>
-              <a:t>: This variable stores the workspace directory.  It is written onto when the user selects the workspace directory (new or old) in the </a:t>
-            </a:r>
-            <a:r>
-              <a:rPr lang="en-US" sz="1600" dirty="0" err="1">
-                <a:cs typeface="Courier New" panose="02070309020205020404" pitchFamily="49" charset="0"/>
-              </a:rPr>
-              <a:t>menubar</a:t>
-            </a:r>
-            <a:r>
-              <a:rPr lang="en-US" sz="1600" dirty="0">
-                <a:cs typeface="Courier New" panose="02070309020205020404" pitchFamily="49" charset="0"/>
-              </a:rPr>
-              <a:t>.</a:t>
+              <a:rPr lang="en-US" sz="1400" dirty="0"/>
+              <a:t>Coverage calc</a:t>
             </a:r>
           </a:p>
           <a:p>
             <a:pPr lvl="1"/>
             <a:r>
-              <a:rPr lang="en-US" sz="1600" dirty="0" err="1">
-                <a:latin typeface="Courier New" panose="02070309020205020404" pitchFamily="49" charset="0"/>
-                <a:cs typeface="Courier New" panose="02070309020205020404" pitchFamily="49" charset="0"/>
-              </a:rPr>
-              <a:t>mission_specs</a:t>
-            </a:r>
-            <a:r>
-              <a:rPr lang="en-US" sz="1600" dirty="0">
-                <a:latin typeface="Courier New" panose="02070309020205020404" pitchFamily="49" charset="0"/>
-                <a:cs typeface="Courier New" panose="02070309020205020404" pitchFamily="49" charset="0"/>
-              </a:rPr>
-              <a:t>: </a:t>
-            </a:r>
-            <a:r>
-              <a:rPr lang="en-US" sz="1600" dirty="0">
-                <a:cs typeface="Courier New" panose="02070309020205020404" pitchFamily="49" charset="0"/>
-              </a:rPr>
-              <a:t>This variable stores the mission specifications as and when they are updated in the Configure frame.</a:t>
-            </a:r>
-          </a:p>
-          <a:p>
-            <a:r>
-              <a:rPr lang="en-US" sz="1600" dirty="0">
-                <a:cs typeface="Courier New" panose="02070309020205020404" pitchFamily="49" charset="0"/>
-              </a:rPr>
-              <a:t>This method of using global variables is not safe. </a:t>
-            </a:r>
-            <a:r>
-              <a:rPr lang="en-US" sz="1600" i="1" dirty="0">
-                <a:cs typeface="Courier New" panose="02070309020205020404" pitchFamily="49" charset="0"/>
-              </a:rPr>
-              <a:t>Unless</a:t>
-            </a:r>
-            <a:r>
-              <a:rPr lang="en-US" sz="1600" dirty="0">
-                <a:cs typeface="Courier New" panose="02070309020205020404" pitchFamily="49" charset="0"/>
-              </a:rPr>
-              <a:t> the variables are manipulated (write, read) in the correct order, the application can fail.</a:t>
-            </a:r>
-          </a:p>
-        </p:txBody>
-      </p:sp>
+              <a:rPr lang="en-US" sz="1400" dirty="0"/>
+              <a:t>Ground-</a:t>
+            </a:r>
+            <a:r>
+              <a:rPr lang="en-US" sz="1400" dirty="0" err="1"/>
+              <a:t>stn</a:t>
+            </a:r>
+            <a:r>
+              <a:rPr lang="en-US" sz="1400" dirty="0"/>
+              <a:t> contact finder</a:t>
+            </a:r>
+          </a:p>
+          <a:p>
+            <a:pPr lvl="1"/>
+            <a:r>
+              <a:rPr lang="en-US" sz="1400" dirty="0"/>
+              <a:t>Inter-sat contact finder</a:t>
+            </a:r>
+          </a:p>
+          <a:p>
+            <a:pPr lvl="1"/>
+            <a:r>
+              <a:rPr lang="en-US" sz="1400" dirty="0"/>
+              <a:t>Eclipse finder</a:t>
+            </a:r>
+          </a:p>
+          <a:p>
+            <a:pPr lvl="1"/>
+            <a:r>
+              <a:rPr lang="en-US" sz="1400" dirty="0"/>
+              <a:t>Data-metrics calc</a:t>
+            </a:r>
+          </a:p>
+          <a:p>
+            <a:r>
+              <a:rPr lang="en-US" sz="1800" dirty="0"/>
+              <a:t>Each function is run in a separate thread to not freeze the GUI while the execution is taking place. The “progress” bar indicates the status of the process.</a:t>
+            </a:r>
+          </a:p>
+          <a:p>
+            <a:r>
+              <a:rPr lang="en-US" sz="1800" dirty="0"/>
+              <a:t>The output-info (meta-data about the output files such as location of the files) is written onto the </a:t>
+            </a:r>
+            <a:r>
+              <a:rPr lang="en-US" sz="1800" dirty="0" err="1"/>
+              <a:t>MissionSpecs.json</a:t>
+            </a:r>
+            <a:r>
+              <a:rPr lang="en-US" sz="1800" dirty="0"/>
+              <a:t> file (when saved).</a:t>
+            </a:r>
+          </a:p>
+          <a:p>
+            <a:r>
+              <a:rPr lang="en-US" sz="1800" dirty="0"/>
+              <a:t>It is important that the orbit-propagation be run prior to any of the other functions. The coverage calculation must be run prior to the data-metrics calculation.</a:t>
+            </a:r>
+            <a:endParaRPr lang="en-US" sz="1400" dirty="0"/>
+          </a:p>
+        </p:txBody>
+      </p:sp>
+      <p:pic>
+        <p:nvPicPr>
+          <p:cNvPr id="5" name="Picture 4">
+            <a:extLst>
+              <a:ext uri="{FF2B5EF4-FFF2-40B4-BE49-F238E27FC236}">
+                <a16:creationId xmlns:a16="http://schemas.microsoft.com/office/drawing/2014/main" id="{10DCA093-E7C7-4DD2-BBBF-97BF01A39807}"/>
+              </a:ext>
+            </a:extLst>
+          </p:cNvPr>
+          <p:cNvPicPr>
+            <a:picLocks noChangeAspect="1"/>
+          </p:cNvPicPr>
+          <p:nvPr/>
+        </p:nvPicPr>
+        <p:blipFill>
+          <a:blip r:embed="rId2"/>
+          <a:stretch>
+            <a:fillRect/>
+          </a:stretch>
+        </p:blipFill>
+        <p:spPr>
+          <a:xfrm>
+            <a:off x="5646511" y="1463675"/>
+            <a:ext cx="6440714" cy="3155950"/>
+          </a:xfrm>
+          <a:prstGeom prst="rect">
+            <a:avLst/>
+          </a:prstGeom>
+        </p:spPr>
+      </p:pic>
     </p:spTree>
     <p:extLst>
       <p:ext uri="{BB962C8B-B14F-4D97-AF65-F5344CB8AC3E}">
-        <p14:creationId xmlns:p14="http://schemas.microsoft.com/office/powerpoint/2010/main" val="2484587524"/>
+        <p14:creationId xmlns:p14="http://schemas.microsoft.com/office/powerpoint/2010/main" val="3515507734"/>
       </p:ext>
     </p:extLst>
   </p:cSld>
@@ -8294,7 +9063,7 @@
           <p:cNvPr id="2" name="Title 1">
             <a:extLst>
               <a:ext uri="{FF2B5EF4-FFF2-40B4-BE49-F238E27FC236}">
-                <a16:creationId xmlns:a16="http://schemas.microsoft.com/office/drawing/2014/main" id="{45C44DAD-FDD1-4E6E-87C4-7068186AD2A4}"/>
+                <a16:creationId xmlns:a16="http://schemas.microsoft.com/office/drawing/2014/main" id="{3D8E300D-58E2-4C43-896B-A7A2A383662C}"/>
               </a:ext>
             </a:extLst>
           </p:cNvPr>
@@ -8311,18 +9080,22 @@
           <a:lstStyle/>
           <a:p>
             <a:r>
+              <a:rPr lang="en-US"/>
+              <a:t>visualize/</a:t>
+            </a:r>
+            <a:r>
               <a:rPr lang="en-US" dirty="0"/>
-              <a:t>General notes on coding style</a:t>
-            </a:r>
-          </a:p>
-        </p:txBody>
-      </p:sp>
-      <p:sp>
-        <p:nvSpPr>
-          <p:cNvPr id="4" name="Content Placeholder 2">
-            <a:extLst>
-              <a:ext uri="{FF2B5EF4-FFF2-40B4-BE49-F238E27FC236}">
-                <a16:creationId xmlns:a16="http://schemas.microsoft.com/office/drawing/2014/main" id="{1549F9C8-27FF-454B-A76D-C8DD80A6C666}"/>
+              <a:t>visualizeframe.py</a:t>
+            </a:r>
+          </a:p>
+        </p:txBody>
+      </p:sp>
+      <p:sp>
+        <p:nvSpPr>
+          <p:cNvPr id="3" name="Content Placeholder 2">
+            <a:extLst>
+              <a:ext uri="{FF2B5EF4-FFF2-40B4-BE49-F238E27FC236}">
+                <a16:creationId xmlns:a16="http://schemas.microsoft.com/office/drawing/2014/main" id="{FDFFC907-9913-4BDC-825A-56F711ED4F06}"/>
               </a:ext>
             </a:extLst>
           </p:cNvPr>
@@ -8333,492 +9106,19 @@
             <p:ph idx="1"/>
           </p:nvPr>
         </p:nvSpPr>
-        <p:spPr>
-          <a:xfrm>
-            <a:off x="838200" y="1825624"/>
-            <a:ext cx="6099175" cy="4351656"/>
-          </a:xfrm>
-        </p:spPr>
-        <p:txBody>
-          <a:bodyPr>
-            <a:normAutofit lnSpcReduction="10000"/>
-          </a:bodyPr>
+        <p:spPr/>
+        <p:txBody>
+          <a:bodyPr/>
           <a:lstStyle/>
           <a:p>
-            <a:r>
-              <a:rPr lang="en-US" sz="2000" dirty="0"/>
-              <a:t>‘frame’ widgets are used to define the different sections of the window. A “master” frame encompasses all the frames in the window is also usually defined. </a:t>
-            </a:r>
-          </a:p>
-          <a:p>
-            <a:r>
-              <a:rPr lang="en-US" sz="2000" dirty="0"/>
-              <a:t>E.g. in the alongside window (see </a:t>
-            </a:r>
-            <a:r>
-              <a:rPr lang="en-US" sz="2000" dirty="0">
-                <a:latin typeface="Courier New" panose="02070309020205020404" pitchFamily="49" charset="0"/>
-                <a:cs typeface="Courier New" panose="02070309020205020404" pitchFamily="49" charset="0"/>
-              </a:rPr>
-              <a:t>cfsatellite.py </a:t>
-            </a:r>
-            <a:r>
-              <a:rPr lang="en-US" sz="2000" dirty="0"/>
-              <a:t>module), there are three frames defined: (1) </a:t>
-            </a:r>
-            <a:r>
-              <a:rPr lang="en-US" sz="2000" dirty="0" err="1">
-                <a:latin typeface="Courier New" panose="02070309020205020404" pitchFamily="49" charset="0"/>
-                <a:cs typeface="Courier New" panose="02070309020205020404" pitchFamily="49" charset="0"/>
-              </a:rPr>
-              <a:t>sat_win_frame</a:t>
-            </a:r>
-            <a:r>
-              <a:rPr lang="en-US" sz="2000" dirty="0">
-                <a:latin typeface="Courier New" panose="02070309020205020404" pitchFamily="49" charset="0"/>
-                <a:cs typeface="Courier New" panose="02070309020205020404" pitchFamily="49" charset="0"/>
-              </a:rPr>
-              <a:t> </a:t>
-            </a:r>
-            <a:r>
-              <a:rPr lang="en-US" sz="2000" dirty="0"/>
-              <a:t>(the master frame) (2) </a:t>
-            </a:r>
-            <a:r>
-              <a:rPr lang="en-US" sz="2000" dirty="0" err="1">
-                <a:latin typeface="Courier New" panose="02070309020205020404" pitchFamily="49" charset="0"/>
-                <a:cs typeface="Courier New" panose="02070309020205020404" pitchFamily="49" charset="0"/>
-              </a:rPr>
-              <a:t>sat_kep_specs_frame</a:t>
-            </a:r>
-            <a:r>
-              <a:rPr lang="en-US" sz="2000" dirty="0">
-                <a:latin typeface="Courier New" panose="02070309020205020404" pitchFamily="49" charset="0"/>
-                <a:cs typeface="Courier New" panose="02070309020205020404" pitchFamily="49" charset="0"/>
-              </a:rPr>
-              <a:t> </a:t>
-            </a:r>
-            <a:r>
-              <a:rPr lang="en-US" sz="2000" dirty="0"/>
-              <a:t>(3) </a:t>
-            </a:r>
-            <a:r>
-              <a:rPr lang="en-US" sz="2000" dirty="0" err="1">
-                <a:latin typeface="Courier New" panose="02070309020205020404" pitchFamily="49" charset="0"/>
-                <a:cs typeface="Courier New" panose="02070309020205020404" pitchFamily="49" charset="0"/>
-              </a:rPr>
-              <a:t>okcancel_frame</a:t>
-            </a:r>
-            <a:r>
-              <a:rPr lang="en-US" sz="2000" dirty="0">
-                <a:latin typeface="Courier New" panose="02070309020205020404" pitchFamily="49" charset="0"/>
-                <a:cs typeface="Courier New" panose="02070309020205020404" pitchFamily="49" charset="0"/>
-              </a:rPr>
-              <a:t>.</a:t>
-            </a:r>
-          </a:p>
-          <a:p>
-            <a:r>
-              <a:rPr lang="en-US" sz="2000" dirty="0">
-                <a:cs typeface="Courier New" panose="02070309020205020404" pitchFamily="49" charset="0"/>
-              </a:rPr>
-              <a:t>Default values can be provided as illustrated in the following snippet:</a:t>
-            </a:r>
-          </a:p>
-          <a:p>
-            <a:pPr marL="0" indent="0">
-              <a:buNone/>
-            </a:pPr>
-            <a:r>
-              <a:rPr lang="en-US" sz="1200" dirty="0" err="1">
-                <a:latin typeface="Courier New" panose="02070309020205020404" pitchFamily="49" charset="0"/>
-                <a:cs typeface="Courier New" panose="02070309020205020404" pitchFamily="49" charset="0"/>
-              </a:rPr>
-              <a:t>alt_entry.insert</a:t>
-            </a:r>
-            <a:r>
-              <a:rPr lang="en-US" sz="1200" dirty="0">
-                <a:latin typeface="Courier New" panose="02070309020205020404" pitchFamily="49" charset="0"/>
-                <a:cs typeface="Courier New" panose="02070309020205020404" pitchFamily="49" charset="0"/>
-              </a:rPr>
-              <a:t>(0,500)</a:t>
-            </a:r>
-          </a:p>
-          <a:p>
-            <a:pPr marL="0" indent="0">
-              <a:buNone/>
-            </a:pPr>
-            <a:r>
-              <a:rPr lang="en-US" sz="1200" dirty="0" err="1">
-                <a:latin typeface="Courier New" panose="02070309020205020404" pitchFamily="49" charset="0"/>
-                <a:cs typeface="Courier New" panose="02070309020205020404" pitchFamily="49" charset="0"/>
-              </a:rPr>
-              <a:t>alt_entry.bind</a:t>
-            </a:r>
-            <a:r>
-              <a:rPr lang="en-US" sz="1200" dirty="0">
-                <a:latin typeface="Courier New" panose="02070309020205020404" pitchFamily="49" charset="0"/>
-                <a:cs typeface="Courier New" panose="02070309020205020404" pitchFamily="49" charset="0"/>
-              </a:rPr>
-              <a:t>("&lt;</a:t>
-            </a:r>
-            <a:r>
-              <a:rPr lang="en-US" sz="1200" dirty="0" err="1">
-                <a:latin typeface="Courier New" panose="02070309020205020404" pitchFamily="49" charset="0"/>
-                <a:cs typeface="Courier New" panose="02070309020205020404" pitchFamily="49" charset="0"/>
-              </a:rPr>
-              <a:t>FocusIn</a:t>
-            </a:r>
-            <a:r>
-              <a:rPr lang="en-US" sz="1200" dirty="0">
-                <a:latin typeface="Courier New" panose="02070309020205020404" pitchFamily="49" charset="0"/>
-                <a:cs typeface="Courier New" panose="02070309020205020404" pitchFamily="49" charset="0"/>
-              </a:rPr>
-              <a:t>&gt;", lambda </a:t>
-            </a:r>
-            <a:r>
-              <a:rPr lang="en-US" sz="1200" dirty="0" err="1">
-                <a:latin typeface="Courier New" panose="02070309020205020404" pitchFamily="49" charset="0"/>
-                <a:cs typeface="Courier New" panose="02070309020205020404" pitchFamily="49" charset="0"/>
-              </a:rPr>
-              <a:t>args</a:t>
-            </a:r>
-            <a:r>
-              <a:rPr lang="en-US" sz="1200" dirty="0">
-                <a:latin typeface="Courier New" panose="02070309020205020404" pitchFamily="49" charset="0"/>
-                <a:cs typeface="Courier New" panose="02070309020205020404" pitchFamily="49" charset="0"/>
-              </a:rPr>
-              <a:t>: </a:t>
-            </a:r>
-            <a:r>
-              <a:rPr lang="en-US" sz="1200" dirty="0" err="1">
-                <a:latin typeface="Courier New" panose="02070309020205020404" pitchFamily="49" charset="0"/>
-                <a:cs typeface="Courier New" panose="02070309020205020404" pitchFamily="49" charset="0"/>
-              </a:rPr>
-              <a:t>alt_entry.delete</a:t>
-            </a:r>
-            <a:r>
-              <a:rPr lang="en-US" sz="1200" dirty="0">
-                <a:latin typeface="Courier New" panose="02070309020205020404" pitchFamily="49" charset="0"/>
-                <a:cs typeface="Courier New" panose="02070309020205020404" pitchFamily="49" charset="0"/>
-              </a:rPr>
-              <a:t>('0', 'end’))</a:t>
-            </a:r>
-          </a:p>
-          <a:p>
-            <a:pPr marL="0" indent="0">
-              <a:buNone/>
-            </a:pPr>
-            <a:r>
-              <a:rPr lang="en-US" sz="1800" dirty="0">
-                <a:cs typeface="Courier New" panose="02070309020205020404" pitchFamily="49" charset="0"/>
-              </a:rPr>
-              <a:t>‘500’ is the default value in the altitude </a:t>
-            </a:r>
-            <a:r>
-              <a:rPr lang="en-US" sz="1800" i="1" dirty="0">
-                <a:cs typeface="Courier New" panose="02070309020205020404" pitchFamily="49" charset="0"/>
-              </a:rPr>
-              <a:t>entry</a:t>
-            </a:r>
-            <a:r>
-              <a:rPr lang="en-US" sz="1800" dirty="0">
-                <a:cs typeface="Courier New" panose="02070309020205020404" pitchFamily="49" charset="0"/>
-              </a:rPr>
-              <a:t> widget. It gets cleared when one clicks inside the entry widget.</a:t>
-            </a:r>
-          </a:p>
-        </p:txBody>
-      </p:sp>
-      <p:pic>
-        <p:nvPicPr>
-          <p:cNvPr id="6" name="Picture 5">
-            <a:extLst>
-              <a:ext uri="{FF2B5EF4-FFF2-40B4-BE49-F238E27FC236}">
-                <a16:creationId xmlns:a16="http://schemas.microsoft.com/office/drawing/2014/main" id="{0D621A4E-CBF4-4DBD-A425-2A1FE90D4259}"/>
-              </a:ext>
-            </a:extLst>
-          </p:cNvPr>
-          <p:cNvPicPr>
-            <a:picLocks noChangeAspect="1"/>
-          </p:cNvPicPr>
-          <p:nvPr/>
-        </p:nvPicPr>
-        <p:blipFill>
-          <a:blip r:embed="rId2"/>
-          <a:stretch>
-            <a:fillRect/>
-          </a:stretch>
-        </p:blipFill>
-        <p:spPr>
-          <a:xfrm>
-            <a:off x="8790305" y="1581397"/>
-            <a:ext cx="3000375" cy="3238500"/>
-          </a:xfrm>
-          <a:prstGeom prst="rect">
-            <a:avLst/>
-          </a:prstGeom>
-        </p:spPr>
-      </p:pic>
-      <p:cxnSp>
-        <p:nvCxnSpPr>
-          <p:cNvPr id="8" name="Straight Arrow Connector 7">
-            <a:extLst>
-              <a:ext uri="{FF2B5EF4-FFF2-40B4-BE49-F238E27FC236}">
-                <a16:creationId xmlns:a16="http://schemas.microsoft.com/office/drawing/2014/main" id="{9FCE6D85-4BB2-4A70-9544-4FB8556AE06C}"/>
-              </a:ext>
-            </a:extLst>
-          </p:cNvPr>
-          <p:cNvCxnSpPr>
-            <a:cxnSpLocks/>
-          </p:cNvCxnSpPr>
-          <p:nvPr/>
-        </p:nvCxnSpPr>
-        <p:spPr>
-          <a:xfrm>
-            <a:off x="9865360" y="1214596"/>
-            <a:ext cx="264160" cy="868204"/>
-          </a:xfrm>
-          <a:prstGeom prst="straightConnector1">
-            <a:avLst/>
-          </a:prstGeom>
-          <a:ln>
-            <a:tailEnd type="triangle"/>
-          </a:ln>
-        </p:spPr>
-        <p:style>
-          <a:lnRef idx="1">
-            <a:schemeClr val="accent1"/>
-          </a:lnRef>
-          <a:fillRef idx="0">
-            <a:schemeClr val="accent1"/>
-          </a:fillRef>
-          <a:effectRef idx="0">
-            <a:schemeClr val="accent1"/>
-          </a:effectRef>
-          <a:fontRef idx="minor">
-            <a:schemeClr val="tx1"/>
-          </a:fontRef>
-        </p:style>
-      </p:cxnSp>
-      <p:cxnSp>
-        <p:nvCxnSpPr>
-          <p:cNvPr id="10" name="Straight Arrow Connector 9">
-            <a:extLst>
-              <a:ext uri="{FF2B5EF4-FFF2-40B4-BE49-F238E27FC236}">
-                <a16:creationId xmlns:a16="http://schemas.microsoft.com/office/drawing/2014/main" id="{948D55C6-A0B9-4C35-B36C-39D65F0A313E}"/>
-              </a:ext>
-            </a:extLst>
-          </p:cNvPr>
-          <p:cNvCxnSpPr>
-            <a:cxnSpLocks/>
-            <a:stCxn id="19" idx="2"/>
-          </p:cNvCxnSpPr>
-          <p:nvPr/>
-        </p:nvCxnSpPr>
-        <p:spPr>
-          <a:xfrm flipV="1">
-            <a:off x="8044814" y="3200648"/>
-            <a:ext cx="1312546" cy="444646"/>
-          </a:xfrm>
-          <a:prstGeom prst="straightConnector1">
-            <a:avLst/>
-          </a:prstGeom>
-          <a:ln>
-            <a:tailEnd type="triangle"/>
-          </a:ln>
-        </p:spPr>
-        <p:style>
-          <a:lnRef idx="1">
-            <a:schemeClr val="accent1"/>
-          </a:lnRef>
-          <a:fillRef idx="0">
-            <a:schemeClr val="accent1"/>
-          </a:fillRef>
-          <a:effectRef idx="0">
-            <a:schemeClr val="accent1"/>
-          </a:effectRef>
-          <a:fontRef idx="minor">
-            <a:schemeClr val="tx1"/>
-          </a:fontRef>
-        </p:style>
-      </p:cxnSp>
-      <p:cxnSp>
-        <p:nvCxnSpPr>
-          <p:cNvPr id="14" name="Straight Arrow Connector 13">
-            <a:extLst>
-              <a:ext uri="{FF2B5EF4-FFF2-40B4-BE49-F238E27FC236}">
-                <a16:creationId xmlns:a16="http://schemas.microsoft.com/office/drawing/2014/main" id="{BCE39BAA-4922-41B7-99CA-D19110F801C9}"/>
-              </a:ext>
-            </a:extLst>
-          </p:cNvPr>
-          <p:cNvCxnSpPr>
-            <a:cxnSpLocks/>
-          </p:cNvCxnSpPr>
-          <p:nvPr/>
-        </p:nvCxnSpPr>
-        <p:spPr>
-          <a:xfrm flipH="1" flipV="1">
-            <a:off x="9489440" y="4593954"/>
-            <a:ext cx="375920" cy="592744"/>
-          </a:xfrm>
-          <a:prstGeom prst="straightConnector1">
-            <a:avLst/>
-          </a:prstGeom>
-          <a:ln>
-            <a:tailEnd type="triangle"/>
-          </a:ln>
-        </p:spPr>
-        <p:style>
-          <a:lnRef idx="1">
-            <a:schemeClr val="accent1"/>
-          </a:lnRef>
-          <a:fillRef idx="0">
-            <a:schemeClr val="accent1"/>
-          </a:fillRef>
-          <a:effectRef idx="0">
-            <a:schemeClr val="accent1"/>
-          </a:effectRef>
-          <a:fontRef idx="minor">
-            <a:schemeClr val="tx1"/>
-          </a:fontRef>
-        </p:style>
-      </p:cxnSp>
-      <p:sp>
-        <p:nvSpPr>
-          <p:cNvPr id="17" name="TextBox 16">
-            <a:extLst>
-              <a:ext uri="{FF2B5EF4-FFF2-40B4-BE49-F238E27FC236}">
-                <a16:creationId xmlns:a16="http://schemas.microsoft.com/office/drawing/2014/main" id="{336544EA-8F69-4993-B5B9-7ED4D0C76CC3}"/>
-              </a:ext>
-            </a:extLst>
-          </p:cNvPr>
-          <p:cNvSpPr txBox="1"/>
-          <p:nvPr/>
-        </p:nvSpPr>
-        <p:spPr>
-          <a:xfrm>
-            <a:off x="9166135" y="5107913"/>
-            <a:ext cx="2248714" cy="369332"/>
-          </a:xfrm>
-          <a:prstGeom prst="rect">
-            <a:avLst/>
-          </a:prstGeom>
-          <a:noFill/>
-        </p:spPr>
-        <p:txBody>
-          <a:bodyPr wrap="square">
-            <a:spAutoFit/>
-          </a:bodyPr>
-          <a:lstStyle/>
-          <a:p>
-            <a:r>
-              <a:rPr lang="en-US" sz="1800" dirty="0" err="1">
-                <a:latin typeface="Courier New" panose="02070309020205020404" pitchFamily="49" charset="0"/>
-                <a:cs typeface="Courier New" panose="02070309020205020404" pitchFamily="49" charset="0"/>
-              </a:rPr>
-              <a:t>okcancel_frame</a:t>
-            </a:r>
-            <a:endParaRPr lang="en-US" dirty="0"/>
-          </a:p>
-        </p:txBody>
-      </p:sp>
-      <p:sp>
-        <p:nvSpPr>
-          <p:cNvPr id="19" name="TextBox 18">
-            <a:extLst>
-              <a:ext uri="{FF2B5EF4-FFF2-40B4-BE49-F238E27FC236}">
-                <a16:creationId xmlns:a16="http://schemas.microsoft.com/office/drawing/2014/main" id="{2861592D-041D-47A0-BC89-01A1BED74B14}"/>
-              </a:ext>
-            </a:extLst>
-          </p:cNvPr>
-          <p:cNvSpPr txBox="1"/>
-          <p:nvPr/>
-        </p:nvSpPr>
-        <p:spPr>
-          <a:xfrm rot="16888615">
-            <a:off x="6238240" y="3423884"/>
-            <a:ext cx="3251200" cy="369332"/>
-          </a:xfrm>
-          <a:prstGeom prst="rect">
-            <a:avLst/>
-          </a:prstGeom>
-          <a:noFill/>
-        </p:spPr>
-        <p:txBody>
-          <a:bodyPr wrap="square">
-            <a:spAutoFit/>
-          </a:bodyPr>
-          <a:lstStyle/>
-          <a:p>
-            <a:r>
-              <a:rPr lang="en-US" sz="1800" dirty="0" err="1">
-                <a:latin typeface="Courier New" panose="02070309020205020404" pitchFamily="49" charset="0"/>
-                <a:cs typeface="Courier New" panose="02070309020205020404" pitchFamily="49" charset="0"/>
-              </a:rPr>
-              <a:t>sat_kep_specs_frame</a:t>
-            </a:r>
-            <a:r>
-              <a:rPr lang="en-US" sz="1800" dirty="0">
-                <a:latin typeface="Courier New" panose="02070309020205020404" pitchFamily="49" charset="0"/>
-                <a:cs typeface="Courier New" panose="02070309020205020404" pitchFamily="49" charset="0"/>
-              </a:rPr>
-              <a:t> </a:t>
-            </a:r>
-            <a:endParaRPr lang="en-US" dirty="0"/>
-          </a:p>
-        </p:txBody>
-      </p:sp>
-      <p:sp>
-        <p:nvSpPr>
-          <p:cNvPr id="22" name="TextBox 21">
-            <a:extLst>
-              <a:ext uri="{FF2B5EF4-FFF2-40B4-BE49-F238E27FC236}">
-                <a16:creationId xmlns:a16="http://schemas.microsoft.com/office/drawing/2014/main" id="{A27A6B38-9A59-4F73-998A-351B6C0EAEFD}"/>
-              </a:ext>
-            </a:extLst>
-          </p:cNvPr>
-          <p:cNvSpPr txBox="1"/>
-          <p:nvPr/>
-        </p:nvSpPr>
-        <p:spPr>
-          <a:xfrm>
-            <a:off x="8883332" y="843240"/>
-            <a:ext cx="2814320" cy="369332"/>
-          </a:xfrm>
-          <a:prstGeom prst="rect">
-            <a:avLst/>
-          </a:prstGeom>
-          <a:noFill/>
-        </p:spPr>
-        <p:txBody>
-          <a:bodyPr wrap="square">
-            <a:spAutoFit/>
-          </a:bodyPr>
-          <a:lstStyle/>
-          <a:p>
-            <a:r>
-              <a:rPr lang="en-US" sz="1800" dirty="0" err="1">
-                <a:latin typeface="Courier New" panose="02070309020205020404" pitchFamily="49" charset="0"/>
-                <a:cs typeface="Courier New" panose="02070309020205020404" pitchFamily="49" charset="0"/>
-              </a:rPr>
-              <a:t>sat_win_frame</a:t>
-            </a:r>
-            <a:r>
-              <a:rPr lang="en-US" sz="1800" dirty="0">
-                <a:latin typeface="Courier New" panose="02070309020205020404" pitchFamily="49" charset="0"/>
-                <a:cs typeface="Courier New" panose="02070309020205020404" pitchFamily="49" charset="0"/>
-              </a:rPr>
-              <a:t> </a:t>
-            </a:r>
-            <a:endParaRPr lang="en-US" dirty="0"/>
+            <a:endParaRPr lang="en-US"/>
           </a:p>
         </p:txBody>
       </p:sp>
     </p:spTree>
     <p:extLst>
       <p:ext uri="{BB962C8B-B14F-4D97-AF65-F5344CB8AC3E}">
-        <p14:creationId xmlns:p14="http://schemas.microsoft.com/office/powerpoint/2010/main" val="320172902"/>
+        <p14:creationId xmlns:p14="http://schemas.microsoft.com/office/powerpoint/2010/main" val="1207547318"/>
       </p:ext>
     </p:extLst>
   </p:cSld>

</xml_diff>

<commit_message>
visualization on a map update and correction of xy visualization
</commit_message>
<xml_diff>
--- a/docs/codebase_description.pptx
+++ b/docs/codebase_description.pptx
@@ -15,11 +15,12 @@
     <p:sldId id="268" r:id="rId9"/>
     <p:sldId id="269" r:id="rId10"/>
     <p:sldId id="270" r:id="rId11"/>
-    <p:sldId id="263" r:id="rId12"/>
-    <p:sldId id="264" r:id="rId13"/>
-    <p:sldId id="265" r:id="rId14"/>
-    <p:sldId id="266" r:id="rId15"/>
-    <p:sldId id="267" r:id="rId16"/>
+    <p:sldId id="271" r:id="rId12"/>
+    <p:sldId id="263" r:id="rId13"/>
+    <p:sldId id="264" r:id="rId14"/>
+    <p:sldId id="265" r:id="rId15"/>
+    <p:sldId id="266" r:id="rId16"/>
+    <p:sldId id="267" r:id="rId17"/>
   </p:sldIdLst>
   <p:sldSz cx="12192000" cy="6858000"/>
   <p:notesSz cx="6858000" cy="9144000"/>
@@ -273,7 +274,7 @@
           <a:p>
             <a:fld id="{F6612307-B608-4FD9-90D8-D494C0A10B27}" type="datetimeFigureOut">
               <a:rPr lang="en-US" smtClean="0"/>
-              <a:t>10/12/2021</a:t>
+              <a:t>10/15/2021</a:t>
             </a:fld>
             <a:endParaRPr lang="en-US"/>
           </a:p>
@@ -471,7 +472,7 @@
           <a:p>
             <a:fld id="{F6612307-B608-4FD9-90D8-D494C0A10B27}" type="datetimeFigureOut">
               <a:rPr lang="en-US" smtClean="0"/>
-              <a:t>10/12/2021</a:t>
+              <a:t>10/15/2021</a:t>
             </a:fld>
             <a:endParaRPr lang="en-US"/>
           </a:p>
@@ -679,7 +680,7 @@
           <a:p>
             <a:fld id="{F6612307-B608-4FD9-90D8-D494C0A10B27}" type="datetimeFigureOut">
               <a:rPr lang="en-US" smtClean="0"/>
-              <a:t>10/12/2021</a:t>
+              <a:t>10/15/2021</a:t>
             </a:fld>
             <a:endParaRPr lang="en-US"/>
           </a:p>
@@ -877,7 +878,7 @@
           <a:p>
             <a:fld id="{F6612307-B608-4FD9-90D8-D494C0A10B27}" type="datetimeFigureOut">
               <a:rPr lang="en-US" smtClean="0"/>
-              <a:t>10/12/2021</a:t>
+              <a:t>10/15/2021</a:t>
             </a:fld>
             <a:endParaRPr lang="en-US"/>
           </a:p>
@@ -1152,7 +1153,7 @@
           <a:p>
             <a:fld id="{F6612307-B608-4FD9-90D8-D494C0A10B27}" type="datetimeFigureOut">
               <a:rPr lang="en-US" smtClean="0"/>
-              <a:t>10/12/2021</a:t>
+              <a:t>10/15/2021</a:t>
             </a:fld>
             <a:endParaRPr lang="en-US"/>
           </a:p>
@@ -1417,7 +1418,7 @@
           <a:p>
             <a:fld id="{F6612307-B608-4FD9-90D8-D494C0A10B27}" type="datetimeFigureOut">
               <a:rPr lang="en-US" smtClean="0"/>
-              <a:t>10/12/2021</a:t>
+              <a:t>10/15/2021</a:t>
             </a:fld>
             <a:endParaRPr lang="en-US"/>
           </a:p>
@@ -1829,7 +1830,7 @@
           <a:p>
             <a:fld id="{F6612307-B608-4FD9-90D8-D494C0A10B27}" type="datetimeFigureOut">
               <a:rPr lang="en-US" smtClean="0"/>
-              <a:t>10/12/2021</a:t>
+              <a:t>10/15/2021</a:t>
             </a:fld>
             <a:endParaRPr lang="en-US"/>
           </a:p>
@@ -1970,7 +1971,7 @@
           <a:p>
             <a:fld id="{F6612307-B608-4FD9-90D8-D494C0A10B27}" type="datetimeFigureOut">
               <a:rPr lang="en-US" smtClean="0"/>
-              <a:t>10/12/2021</a:t>
+              <a:t>10/15/2021</a:t>
             </a:fld>
             <a:endParaRPr lang="en-US"/>
           </a:p>
@@ -2083,7 +2084,7 @@
           <a:p>
             <a:fld id="{F6612307-B608-4FD9-90D8-D494C0A10B27}" type="datetimeFigureOut">
               <a:rPr lang="en-US" smtClean="0"/>
-              <a:t>10/12/2021</a:t>
+              <a:t>10/15/2021</a:t>
             </a:fld>
             <a:endParaRPr lang="en-US"/>
           </a:p>
@@ -2394,7 +2395,7 @@
           <a:p>
             <a:fld id="{F6612307-B608-4FD9-90D8-D494C0A10B27}" type="datetimeFigureOut">
               <a:rPr lang="en-US" smtClean="0"/>
-              <a:t>10/12/2021</a:t>
+              <a:t>10/15/2021</a:t>
             </a:fld>
             <a:endParaRPr lang="en-US"/>
           </a:p>
@@ -2682,7 +2683,7 @@
           <a:p>
             <a:fld id="{F6612307-B608-4FD9-90D8-D494C0A10B27}" type="datetimeFigureOut">
               <a:rPr lang="en-US" smtClean="0"/>
-              <a:t>10/12/2021</a:t>
+              <a:t>10/15/2021</a:t>
             </a:fld>
             <a:endParaRPr lang="en-US"/>
           </a:p>
@@ -2923,7 +2924,7 @@
           <a:p>
             <a:fld id="{F6612307-B608-4FD9-90D8-D494C0A10B27}" type="datetimeFigureOut">
               <a:rPr lang="en-US" smtClean="0"/>
-              <a:t>10/12/2021</a:t>
+              <a:t>10/15/2021</a:t>
             </a:fld>
             <a:endParaRPr lang="en-US"/>
           </a:p>
@@ -3467,7 +3468,7 @@
         <p:spPr>
           <a:xfrm>
             <a:off x="704848" y="1463674"/>
-            <a:ext cx="4124604" cy="5029201"/>
+            <a:ext cx="5047882" cy="4466609"/>
           </a:xfrm>
         </p:spPr>
         <p:txBody>
@@ -3484,13 +3485,24 @@
           <a:p>
             <a:r>
               <a:rPr lang="en-US" sz="1600" dirty="0"/>
-              <a:t>The module contains the class ``Vis2DFrame`` to build the frame in which the user enters the plotting parameters. A time-interval of interest is to be specified, and the X, Y data corresponding to this time-interval shall be plotted. A single x-variable (belonging to a satellite) is selected (see the class ``Plot2DVisVars`` for list of possible variables). Multiple y-variables may be selected to be plotted on the same figure. </a:t>
-            </a:r>
-          </a:p>
-          <a:p>
+              <a:t>The module contains the class </a:t>
+            </a:r>
+            <a:r>
+              <a:rPr lang="en-US" sz="1600" dirty="0">
+                <a:latin typeface="Courier New" panose="02070309020205020404" pitchFamily="49" charset="0"/>
+                <a:cs typeface="Courier New" panose="02070309020205020404" pitchFamily="49" charset="0"/>
+              </a:rPr>
+              <a:t>Vis2DFrame</a:t>
+            </a:r>
             <a:r>
               <a:rPr lang="en-US" sz="1600" dirty="0"/>
-              <a:t>The module currently </a:t>
+              <a:t> to build the frame in which the user enters the plotting parameters. A time-interval of interest is to be specified, and the X, Y data corresponding to this time-interval shall be plotted. A single x-variable (belonging to a satellite) is selected (see the class ``Plot2DVisVars`` for list of possible variables). Multiple y-variables may be selected to be plotted on the same figure. </a:t>
+            </a:r>
+          </a:p>
+          <a:p>
+            <a:r>
+              <a:rPr lang="en-US" sz="1600" dirty="0"/>
+              <a:t>The </a:t>
             </a:r>
             <a:r>
               <a:rPr lang="en-US" sz="1600" dirty="0">
@@ -3498,15 +3510,338 @@
                   <a:srgbClr val="FFFF00"/>
                 </a:highlight>
               </a:rPr>
-              <a:t>only allows plotting of satellite orbit-propagation </a:t>
+              <a:t>module currently only allows plotting of satellite orbit-propagation </a:t>
             </a:r>
             <a:r>
               <a:rPr lang="en-US" sz="1600" dirty="0"/>
               <a:t>parameters (and hence association of only the satellite (no need of sensor) with the variable is sufficient).</a:t>
             </a:r>
           </a:p>
-        </p:txBody>
-      </p:sp>
+          <a:p>
+            <a:r>
+              <a:rPr lang="en-US" sz="1600" dirty="0"/>
+              <a:t>Data can also be exported to a csv-formatted file.</a:t>
+            </a:r>
+          </a:p>
+        </p:txBody>
+      </p:sp>
+      <p:pic>
+        <p:nvPicPr>
+          <p:cNvPr id="5" name="Picture 4">
+            <a:extLst>
+              <a:ext uri="{FF2B5EF4-FFF2-40B4-BE49-F238E27FC236}">
+                <a16:creationId xmlns:a16="http://schemas.microsoft.com/office/drawing/2014/main" id="{93CE2C81-FDCE-4B68-804F-3690321E56EC}"/>
+              </a:ext>
+            </a:extLst>
+          </p:cNvPr>
+          <p:cNvPicPr>
+            <a:picLocks noChangeAspect="1"/>
+          </p:cNvPicPr>
+          <p:nvPr/>
+        </p:nvPicPr>
+        <p:blipFill>
+          <a:blip r:embed="rId2"/>
+          <a:stretch>
+            <a:fillRect/>
+          </a:stretch>
+        </p:blipFill>
+        <p:spPr>
+          <a:xfrm>
+            <a:off x="6172200" y="1690688"/>
+            <a:ext cx="5483487" cy="4003721"/>
+          </a:xfrm>
+          <a:prstGeom prst="rect">
+            <a:avLst/>
+          </a:prstGeom>
+        </p:spPr>
+      </p:pic>
+      <p:cxnSp>
+        <p:nvCxnSpPr>
+          <p:cNvPr id="8" name="Straight Arrow Connector 7">
+            <a:extLst>
+              <a:ext uri="{FF2B5EF4-FFF2-40B4-BE49-F238E27FC236}">
+                <a16:creationId xmlns:a16="http://schemas.microsoft.com/office/drawing/2014/main" id="{954EDC97-FBC7-4B59-B024-57B7D3334F1E}"/>
+              </a:ext>
+            </a:extLst>
+          </p:cNvPr>
+          <p:cNvCxnSpPr/>
+          <p:nvPr/>
+        </p:nvCxnSpPr>
+        <p:spPr>
+          <a:xfrm flipH="1">
+            <a:off x="8034291" y="1227800"/>
+            <a:ext cx="275208" cy="1391113"/>
+          </a:xfrm>
+          <a:prstGeom prst="straightConnector1">
+            <a:avLst/>
+          </a:prstGeom>
+          <a:ln>
+            <a:tailEnd type="triangle"/>
+          </a:ln>
+        </p:spPr>
+        <p:style>
+          <a:lnRef idx="1">
+            <a:schemeClr val="accent1"/>
+          </a:lnRef>
+          <a:fillRef idx="0">
+            <a:schemeClr val="accent1"/>
+          </a:fillRef>
+          <a:effectRef idx="0">
+            <a:schemeClr val="accent1"/>
+          </a:effectRef>
+          <a:fontRef idx="minor">
+            <a:schemeClr val="tx1"/>
+          </a:fontRef>
+        </p:style>
+      </p:cxnSp>
+      <p:sp>
+        <p:nvSpPr>
+          <p:cNvPr id="9" name="TextBox 8">
+            <a:extLst>
+              <a:ext uri="{FF2B5EF4-FFF2-40B4-BE49-F238E27FC236}">
+                <a16:creationId xmlns:a16="http://schemas.microsoft.com/office/drawing/2014/main" id="{D99CE7BA-2907-4085-A26D-978EACD98162}"/>
+              </a:ext>
+            </a:extLst>
+          </p:cNvPr>
+          <p:cNvSpPr txBox="1"/>
+          <p:nvPr/>
+        </p:nvSpPr>
+        <p:spPr>
+          <a:xfrm>
+            <a:off x="7506783" y="825638"/>
+            <a:ext cx="2498351" cy="523220"/>
+          </a:xfrm>
+          <a:prstGeom prst="rect">
+            <a:avLst/>
+          </a:prstGeom>
+          <a:noFill/>
+        </p:spPr>
+        <p:txBody>
+          <a:bodyPr wrap="square">
+            <a:spAutoFit/>
+          </a:bodyPr>
+          <a:lstStyle/>
+          <a:p>
+            <a:r>
+              <a:rPr lang="en-US" sz="1400" dirty="0">
+                <a:cs typeface="Courier New" panose="02070309020205020404" pitchFamily="49" charset="0"/>
+              </a:rPr>
+              <a:t>Time-interval of the data to be plotted</a:t>
+            </a:r>
+            <a:endParaRPr lang="en-US" sz="1400" dirty="0"/>
+          </a:p>
+        </p:txBody>
+      </p:sp>
+      <p:sp>
+        <p:nvSpPr>
+          <p:cNvPr id="10" name="TextBox 9">
+            <a:extLst>
+              <a:ext uri="{FF2B5EF4-FFF2-40B4-BE49-F238E27FC236}">
+                <a16:creationId xmlns:a16="http://schemas.microsoft.com/office/drawing/2014/main" id="{3ECA9B9B-31EC-4AE3-B0C1-23E868E45259}"/>
+              </a:ext>
+            </a:extLst>
+          </p:cNvPr>
+          <p:cNvSpPr txBox="1"/>
+          <p:nvPr/>
+        </p:nvSpPr>
+        <p:spPr>
+          <a:xfrm>
+            <a:off x="6257607" y="6032362"/>
+            <a:ext cx="3356910" cy="523220"/>
+          </a:xfrm>
+          <a:prstGeom prst="rect">
+            <a:avLst/>
+          </a:prstGeom>
+          <a:noFill/>
+        </p:spPr>
+        <p:txBody>
+          <a:bodyPr wrap="square">
+            <a:spAutoFit/>
+          </a:bodyPr>
+          <a:lstStyle/>
+          <a:p>
+            <a:r>
+              <a:rPr lang="en-US" sz="1400" dirty="0">
+                <a:cs typeface="Courier New" panose="02070309020205020404" pitchFamily="49" charset="0"/>
+              </a:rPr>
+              <a:t>X-variable selection window: Choosing the Satellite and parameter to be plotted.</a:t>
+            </a:r>
+            <a:endParaRPr lang="en-US" sz="1400" dirty="0"/>
+          </a:p>
+        </p:txBody>
+      </p:sp>
+      <p:cxnSp>
+        <p:nvCxnSpPr>
+          <p:cNvPr id="11" name="Straight Arrow Connector 10">
+            <a:extLst>
+              <a:ext uri="{FF2B5EF4-FFF2-40B4-BE49-F238E27FC236}">
+                <a16:creationId xmlns:a16="http://schemas.microsoft.com/office/drawing/2014/main" id="{9968B644-1E45-42A6-B89C-8E59B159318D}"/>
+              </a:ext>
+            </a:extLst>
+          </p:cNvPr>
+          <p:cNvCxnSpPr>
+            <a:cxnSpLocks/>
+            <a:stCxn id="10" idx="0"/>
+          </p:cNvCxnSpPr>
+          <p:nvPr/>
+        </p:nvCxnSpPr>
+        <p:spPr>
+          <a:xfrm flipH="1" flipV="1">
+            <a:off x="7093260" y="5468646"/>
+            <a:ext cx="842802" cy="563716"/>
+          </a:xfrm>
+          <a:prstGeom prst="straightConnector1">
+            <a:avLst/>
+          </a:prstGeom>
+          <a:ln>
+            <a:tailEnd type="triangle"/>
+          </a:ln>
+        </p:spPr>
+        <p:style>
+          <a:lnRef idx="1">
+            <a:schemeClr val="accent1"/>
+          </a:lnRef>
+          <a:fillRef idx="0">
+            <a:schemeClr val="accent1"/>
+          </a:fillRef>
+          <a:effectRef idx="0">
+            <a:schemeClr val="accent1"/>
+          </a:effectRef>
+          <a:fontRef idx="minor">
+            <a:schemeClr val="tx1"/>
+          </a:fontRef>
+        </p:style>
+      </p:cxnSp>
+      <p:cxnSp>
+        <p:nvCxnSpPr>
+          <p:cNvPr id="12" name="Straight Arrow Connector 11">
+            <a:extLst>
+              <a:ext uri="{FF2B5EF4-FFF2-40B4-BE49-F238E27FC236}">
+                <a16:creationId xmlns:a16="http://schemas.microsoft.com/office/drawing/2014/main" id="{C1B6C7E7-41F3-4EB2-AAA9-C5D7B5F1377C}"/>
+              </a:ext>
+            </a:extLst>
+          </p:cNvPr>
+          <p:cNvCxnSpPr>
+            <a:cxnSpLocks/>
+            <a:stCxn id="13" idx="2"/>
+          </p:cNvCxnSpPr>
+          <p:nvPr/>
+        </p:nvCxnSpPr>
+        <p:spPr>
+          <a:xfrm flipH="1">
+            <a:off x="10910287" y="1519773"/>
+            <a:ext cx="189006" cy="1006506"/>
+          </a:xfrm>
+          <a:prstGeom prst="straightConnector1">
+            <a:avLst/>
+          </a:prstGeom>
+          <a:ln>
+            <a:tailEnd type="triangle"/>
+          </a:ln>
+        </p:spPr>
+        <p:style>
+          <a:lnRef idx="1">
+            <a:schemeClr val="accent1"/>
+          </a:lnRef>
+          <a:fillRef idx="0">
+            <a:schemeClr val="accent1"/>
+          </a:fillRef>
+          <a:effectRef idx="0">
+            <a:schemeClr val="accent1"/>
+          </a:effectRef>
+          <a:fontRef idx="minor">
+            <a:schemeClr val="tx1"/>
+          </a:fontRef>
+        </p:style>
+      </p:cxnSp>
+      <p:sp>
+        <p:nvSpPr>
+          <p:cNvPr id="13" name="TextBox 12">
+            <a:extLst>
+              <a:ext uri="{FF2B5EF4-FFF2-40B4-BE49-F238E27FC236}">
+                <a16:creationId xmlns:a16="http://schemas.microsoft.com/office/drawing/2014/main" id="{ED820897-75CE-46E6-BE81-4C9EDF600510}"/>
+              </a:ext>
+            </a:extLst>
+          </p:cNvPr>
+          <p:cNvSpPr txBox="1"/>
+          <p:nvPr/>
+        </p:nvSpPr>
+        <p:spPr>
+          <a:xfrm>
+            <a:off x="10331361" y="350222"/>
+            <a:ext cx="1535864" cy="1169551"/>
+          </a:xfrm>
+          <a:prstGeom prst="rect">
+            <a:avLst/>
+          </a:prstGeom>
+          <a:noFill/>
+        </p:spPr>
+        <p:txBody>
+          <a:bodyPr wrap="square">
+            <a:spAutoFit/>
+          </a:bodyPr>
+          <a:lstStyle/>
+          <a:p>
+            <a:r>
+              <a:rPr lang="en-US" sz="1400" dirty="0">
+                <a:cs typeface="Courier New" panose="02070309020205020404" pitchFamily="49" charset="0"/>
+              </a:rPr>
+              <a:t>X-variable is time (of a satellite),</a:t>
+            </a:r>
+          </a:p>
+          <a:p>
+            <a:r>
+              <a:rPr lang="en-US" sz="1400" dirty="0">
+                <a:cs typeface="Courier New" panose="02070309020205020404" pitchFamily="49" charset="0"/>
+              </a:rPr>
+              <a:t>Y-variable is the altitude of the same satellite.</a:t>
+            </a:r>
+            <a:endParaRPr lang="en-US" sz="1400" dirty="0"/>
+          </a:p>
+        </p:txBody>
+      </p:sp>
+      <p:cxnSp>
+        <p:nvCxnSpPr>
+          <p:cNvPr id="15" name="Straight Arrow Connector 14">
+            <a:extLst>
+              <a:ext uri="{FF2B5EF4-FFF2-40B4-BE49-F238E27FC236}">
+                <a16:creationId xmlns:a16="http://schemas.microsoft.com/office/drawing/2014/main" id="{1B04B67F-0527-496B-95F5-17101CDFC32F}"/>
+              </a:ext>
+            </a:extLst>
+          </p:cNvPr>
+          <p:cNvCxnSpPr>
+            <a:cxnSpLocks/>
+            <a:stCxn id="13" idx="2"/>
+          </p:cNvCxnSpPr>
+          <p:nvPr/>
+        </p:nvCxnSpPr>
+        <p:spPr>
+          <a:xfrm>
+            <a:off x="11099293" y="1519773"/>
+            <a:ext cx="24057" cy="1609429"/>
+          </a:xfrm>
+          <a:prstGeom prst="straightConnector1">
+            <a:avLst/>
+          </a:prstGeom>
+          <a:ln>
+            <a:tailEnd type="triangle"/>
+          </a:ln>
+        </p:spPr>
+        <p:style>
+          <a:lnRef idx="1">
+            <a:schemeClr val="accent1"/>
+          </a:lnRef>
+          <a:fillRef idx="0">
+            <a:schemeClr val="accent1"/>
+          </a:fillRef>
+          <a:effectRef idx="0">
+            <a:schemeClr val="accent1"/>
+          </a:effectRef>
+          <a:fontRef idx="minor">
+            <a:schemeClr val="tx1"/>
+          </a:fontRef>
+        </p:style>
+      </p:cxnSp>
     </p:spTree>
     <p:extLst>
       <p:ext uri="{BB962C8B-B14F-4D97-AF65-F5344CB8AC3E}">
@@ -3542,6 +3877,645 @@
           <p:cNvPr id="2" name="Title 1">
             <a:extLst>
               <a:ext uri="{FF2B5EF4-FFF2-40B4-BE49-F238E27FC236}">
+                <a16:creationId xmlns:a16="http://schemas.microsoft.com/office/drawing/2014/main" id="{3D8E300D-58E2-4C43-896B-A7A2A383662C}"/>
+              </a:ext>
+            </a:extLst>
+          </p:cNvPr>
+          <p:cNvSpPr>
+            <a:spLocks noGrp="1"/>
+          </p:cNvSpPr>
+          <p:nvPr>
+            <p:ph type="title"/>
+          </p:nvPr>
+        </p:nvSpPr>
+        <p:spPr/>
+        <p:txBody>
+          <a:bodyPr/>
+          <a:lstStyle/>
+          <a:p>
+            <a:r>
+              <a:rPr lang="en-US" dirty="0"/>
+              <a:t>visualize/vismapframe.py</a:t>
+            </a:r>
+          </a:p>
+        </p:txBody>
+      </p:sp>
+      <p:sp>
+        <p:nvSpPr>
+          <p:cNvPr id="4" name="Content Placeholder 2">
+            <a:extLst>
+              <a:ext uri="{FF2B5EF4-FFF2-40B4-BE49-F238E27FC236}">
+                <a16:creationId xmlns:a16="http://schemas.microsoft.com/office/drawing/2014/main" id="{CC9ADCE1-0715-4E91-865E-AAB06DA0C93D}"/>
+              </a:ext>
+            </a:extLst>
+          </p:cNvPr>
+          <p:cNvSpPr txBox="1">
+            <a:spLocks/>
+          </p:cNvSpPr>
+          <p:nvPr/>
+        </p:nvSpPr>
+        <p:spPr>
+          <a:xfrm>
+            <a:off x="704848" y="1463674"/>
+            <a:ext cx="5047882" cy="4466609"/>
+          </a:xfrm>
+          <a:prstGeom prst="rect">
+            <a:avLst/>
+          </a:prstGeom>
+        </p:spPr>
+        <p:txBody>
+          <a:bodyPr vert="horz" lIns="91440" tIns="45720" rIns="91440" bIns="45720" rtlCol="0">
+            <a:noAutofit/>
+          </a:bodyPr>
+          <a:lstStyle>
+            <a:lvl1pPr marL="228600" indent="-228600" algn="l" defTabSz="914400" rtl="0" eaLnBrk="1" latinLnBrk="0" hangingPunct="1">
+              <a:lnSpc>
+                <a:spcPct val="90000"/>
+              </a:lnSpc>
+              <a:spcBef>
+                <a:spcPts val="1000"/>
+              </a:spcBef>
+              <a:buFont typeface="Arial" panose="020B0604020202020204" pitchFamily="34" charset="0"/>
+              <a:buChar char="•"/>
+              <a:defRPr sz="2800" kern="1200">
+                <a:solidFill>
+                  <a:schemeClr val="tx1"/>
+                </a:solidFill>
+                <a:latin typeface="+mn-lt"/>
+                <a:ea typeface="+mn-ea"/>
+                <a:cs typeface="+mn-cs"/>
+              </a:defRPr>
+            </a:lvl1pPr>
+            <a:lvl2pPr marL="685800" indent="-228600" algn="l" defTabSz="914400" rtl="0" eaLnBrk="1" latinLnBrk="0" hangingPunct="1">
+              <a:lnSpc>
+                <a:spcPct val="90000"/>
+              </a:lnSpc>
+              <a:spcBef>
+                <a:spcPts val="500"/>
+              </a:spcBef>
+              <a:buFont typeface="Arial" panose="020B0604020202020204" pitchFamily="34" charset="0"/>
+              <a:buChar char="•"/>
+              <a:defRPr sz="2400" kern="1200">
+                <a:solidFill>
+                  <a:schemeClr val="tx1"/>
+                </a:solidFill>
+                <a:latin typeface="+mn-lt"/>
+                <a:ea typeface="+mn-ea"/>
+                <a:cs typeface="+mn-cs"/>
+              </a:defRPr>
+            </a:lvl2pPr>
+            <a:lvl3pPr marL="1143000" indent="-228600" algn="l" defTabSz="914400" rtl="0" eaLnBrk="1" latinLnBrk="0" hangingPunct="1">
+              <a:lnSpc>
+                <a:spcPct val="90000"/>
+              </a:lnSpc>
+              <a:spcBef>
+                <a:spcPts val="500"/>
+              </a:spcBef>
+              <a:buFont typeface="Arial" panose="020B0604020202020204" pitchFamily="34" charset="0"/>
+              <a:buChar char="•"/>
+              <a:defRPr sz="2000" kern="1200">
+                <a:solidFill>
+                  <a:schemeClr val="tx1"/>
+                </a:solidFill>
+                <a:latin typeface="+mn-lt"/>
+                <a:ea typeface="+mn-ea"/>
+                <a:cs typeface="+mn-cs"/>
+              </a:defRPr>
+            </a:lvl3pPr>
+            <a:lvl4pPr marL="1600200" indent="-228600" algn="l" defTabSz="914400" rtl="0" eaLnBrk="1" latinLnBrk="0" hangingPunct="1">
+              <a:lnSpc>
+                <a:spcPct val="90000"/>
+              </a:lnSpc>
+              <a:spcBef>
+                <a:spcPts val="500"/>
+              </a:spcBef>
+              <a:buFont typeface="Arial" panose="020B0604020202020204" pitchFamily="34" charset="0"/>
+              <a:buChar char="•"/>
+              <a:defRPr sz="1800" kern="1200">
+                <a:solidFill>
+                  <a:schemeClr val="tx1"/>
+                </a:solidFill>
+                <a:latin typeface="+mn-lt"/>
+                <a:ea typeface="+mn-ea"/>
+                <a:cs typeface="+mn-cs"/>
+              </a:defRPr>
+            </a:lvl4pPr>
+            <a:lvl5pPr marL="2057400" indent="-228600" algn="l" defTabSz="914400" rtl="0" eaLnBrk="1" latinLnBrk="0" hangingPunct="1">
+              <a:lnSpc>
+                <a:spcPct val="90000"/>
+              </a:lnSpc>
+              <a:spcBef>
+                <a:spcPts val="500"/>
+              </a:spcBef>
+              <a:buFont typeface="Arial" panose="020B0604020202020204" pitchFamily="34" charset="0"/>
+              <a:buChar char="•"/>
+              <a:defRPr sz="1800" kern="1200">
+                <a:solidFill>
+                  <a:schemeClr val="tx1"/>
+                </a:solidFill>
+                <a:latin typeface="+mn-lt"/>
+                <a:ea typeface="+mn-ea"/>
+                <a:cs typeface="+mn-cs"/>
+              </a:defRPr>
+            </a:lvl5pPr>
+            <a:lvl6pPr marL="2514600" indent="-228600" algn="l" defTabSz="914400" rtl="0" eaLnBrk="1" latinLnBrk="0" hangingPunct="1">
+              <a:lnSpc>
+                <a:spcPct val="90000"/>
+              </a:lnSpc>
+              <a:spcBef>
+                <a:spcPts val="500"/>
+              </a:spcBef>
+              <a:buFont typeface="Arial" panose="020B0604020202020204" pitchFamily="34" charset="0"/>
+              <a:buChar char="•"/>
+              <a:defRPr sz="1800" kern="1200">
+                <a:solidFill>
+                  <a:schemeClr val="tx1"/>
+                </a:solidFill>
+                <a:latin typeface="+mn-lt"/>
+                <a:ea typeface="+mn-ea"/>
+                <a:cs typeface="+mn-cs"/>
+              </a:defRPr>
+            </a:lvl6pPr>
+            <a:lvl7pPr marL="2971800" indent="-228600" algn="l" defTabSz="914400" rtl="0" eaLnBrk="1" latinLnBrk="0" hangingPunct="1">
+              <a:lnSpc>
+                <a:spcPct val="90000"/>
+              </a:lnSpc>
+              <a:spcBef>
+                <a:spcPts val="500"/>
+              </a:spcBef>
+              <a:buFont typeface="Arial" panose="020B0604020202020204" pitchFamily="34" charset="0"/>
+              <a:buChar char="•"/>
+              <a:defRPr sz="1800" kern="1200">
+                <a:solidFill>
+                  <a:schemeClr val="tx1"/>
+                </a:solidFill>
+                <a:latin typeface="+mn-lt"/>
+                <a:ea typeface="+mn-ea"/>
+                <a:cs typeface="+mn-cs"/>
+              </a:defRPr>
+            </a:lvl7pPr>
+            <a:lvl8pPr marL="3429000" indent="-228600" algn="l" defTabSz="914400" rtl="0" eaLnBrk="1" latinLnBrk="0" hangingPunct="1">
+              <a:lnSpc>
+                <a:spcPct val="90000"/>
+              </a:lnSpc>
+              <a:spcBef>
+                <a:spcPts val="500"/>
+              </a:spcBef>
+              <a:buFont typeface="Arial" panose="020B0604020202020204" pitchFamily="34" charset="0"/>
+              <a:buChar char="•"/>
+              <a:defRPr sz="1800" kern="1200">
+                <a:solidFill>
+                  <a:schemeClr val="tx1"/>
+                </a:solidFill>
+                <a:latin typeface="+mn-lt"/>
+                <a:ea typeface="+mn-ea"/>
+                <a:cs typeface="+mn-cs"/>
+              </a:defRPr>
+            </a:lvl8pPr>
+            <a:lvl9pPr marL="3886200" indent="-228600" algn="l" defTabSz="914400" rtl="0" eaLnBrk="1" latinLnBrk="0" hangingPunct="1">
+              <a:lnSpc>
+                <a:spcPct val="90000"/>
+              </a:lnSpc>
+              <a:spcBef>
+                <a:spcPts val="500"/>
+              </a:spcBef>
+              <a:buFont typeface="Arial" panose="020B0604020202020204" pitchFamily="34" charset="0"/>
+              <a:buChar char="•"/>
+              <a:defRPr sz="1800" kern="1200">
+                <a:solidFill>
+                  <a:schemeClr val="tx1"/>
+                </a:solidFill>
+                <a:latin typeface="+mn-lt"/>
+                <a:ea typeface="+mn-ea"/>
+                <a:cs typeface="+mn-cs"/>
+              </a:defRPr>
+            </a:lvl9pPr>
+          </a:lstStyle>
+          <a:p>
+            <a:r>
+              <a:rPr lang="en-US" sz="1600" dirty="0"/>
+              <a:t>Module to handle visualization with plots on a map background.</a:t>
+            </a:r>
+          </a:p>
+          <a:p>
+            <a:r>
+              <a:rPr lang="en-US" sz="1600" dirty="0"/>
+              <a:t>CartoPy is used to create the background maps. Different projections can be specified.</a:t>
+            </a:r>
+          </a:p>
+          <a:p>
+            <a:r>
+              <a:rPr lang="en-US" sz="1600" dirty="0"/>
+              <a:t>A time-interval of interest is to be specified and one or many variables (corresponding to the different satellites in the mission) can be plotted on the map.</a:t>
+            </a:r>
+          </a:p>
+          <a:p>
+            <a:r>
+              <a:rPr lang="en-US" sz="1600" dirty="0"/>
+              <a:t>The codebase is similar to the </a:t>
+            </a:r>
+            <a:r>
+              <a:rPr lang="en-US" sz="1600" dirty="0">
+                <a:latin typeface="Courier New" panose="02070309020205020404" pitchFamily="49" charset="0"/>
+                <a:cs typeface="Courier New" panose="02070309020205020404" pitchFamily="49" charset="0"/>
+              </a:rPr>
+              <a:t>visualize/vis2dframe.py </a:t>
+            </a:r>
+            <a:r>
+              <a:rPr lang="en-US" sz="1600" dirty="0"/>
+              <a:t>module.</a:t>
+            </a:r>
+          </a:p>
+        </p:txBody>
+      </p:sp>
+      <p:pic>
+        <p:nvPicPr>
+          <p:cNvPr id="5" name="Picture 4">
+            <a:extLst>
+              <a:ext uri="{FF2B5EF4-FFF2-40B4-BE49-F238E27FC236}">
+                <a16:creationId xmlns:a16="http://schemas.microsoft.com/office/drawing/2014/main" id="{5D27002D-06D3-4956-A8AC-2203DD49CBCB}"/>
+              </a:ext>
+            </a:extLst>
+          </p:cNvPr>
+          <p:cNvPicPr>
+            <a:picLocks noChangeAspect="1"/>
+          </p:cNvPicPr>
+          <p:nvPr/>
+        </p:nvPicPr>
+        <p:blipFill>
+          <a:blip r:embed="rId2"/>
+          <a:stretch>
+            <a:fillRect/>
+          </a:stretch>
+        </p:blipFill>
+        <p:spPr>
+          <a:xfrm>
+            <a:off x="6096000" y="1392854"/>
+            <a:ext cx="5660997" cy="5105168"/>
+          </a:xfrm>
+          <a:prstGeom prst="rect">
+            <a:avLst/>
+          </a:prstGeom>
+        </p:spPr>
+      </p:pic>
+      <p:sp>
+        <p:nvSpPr>
+          <p:cNvPr id="6" name="TextBox 5">
+            <a:extLst>
+              <a:ext uri="{FF2B5EF4-FFF2-40B4-BE49-F238E27FC236}">
+                <a16:creationId xmlns:a16="http://schemas.microsoft.com/office/drawing/2014/main" id="{00926083-93D0-4D4F-AD69-2EE21784F504}"/>
+              </a:ext>
+            </a:extLst>
+          </p:cNvPr>
+          <p:cNvSpPr txBox="1"/>
+          <p:nvPr/>
+        </p:nvSpPr>
+        <p:spPr>
+          <a:xfrm>
+            <a:off x="8228449" y="874017"/>
+            <a:ext cx="2498351" cy="307777"/>
+          </a:xfrm>
+          <a:prstGeom prst="rect">
+            <a:avLst/>
+          </a:prstGeom>
+          <a:noFill/>
+        </p:spPr>
+        <p:txBody>
+          <a:bodyPr wrap="square">
+            <a:spAutoFit/>
+          </a:bodyPr>
+          <a:lstStyle/>
+          <a:p>
+            <a:r>
+              <a:rPr lang="en-US" sz="1400" dirty="0">
+                <a:cs typeface="Courier New" panose="02070309020205020404" pitchFamily="49" charset="0"/>
+              </a:rPr>
+              <a:t>Choose the map projection</a:t>
+            </a:r>
+            <a:endParaRPr lang="en-US" sz="1400" dirty="0"/>
+          </a:p>
+        </p:txBody>
+      </p:sp>
+      <p:cxnSp>
+        <p:nvCxnSpPr>
+          <p:cNvPr id="7" name="Straight Arrow Connector 6">
+            <a:extLst>
+              <a:ext uri="{FF2B5EF4-FFF2-40B4-BE49-F238E27FC236}">
+                <a16:creationId xmlns:a16="http://schemas.microsoft.com/office/drawing/2014/main" id="{9D1AE3CA-9F1D-48F5-9440-6DE8D3D5502E}"/>
+              </a:ext>
+            </a:extLst>
+          </p:cNvPr>
+          <p:cNvCxnSpPr>
+            <a:cxnSpLocks/>
+          </p:cNvCxnSpPr>
+          <p:nvPr/>
+        </p:nvCxnSpPr>
+        <p:spPr>
+          <a:xfrm flipH="1">
+            <a:off x="8767411" y="1195963"/>
+            <a:ext cx="159088" cy="987944"/>
+          </a:xfrm>
+          <a:prstGeom prst="straightConnector1">
+            <a:avLst/>
+          </a:prstGeom>
+          <a:ln>
+            <a:tailEnd type="triangle"/>
+          </a:ln>
+        </p:spPr>
+        <p:style>
+          <a:lnRef idx="1">
+            <a:schemeClr val="accent1"/>
+          </a:lnRef>
+          <a:fillRef idx="0">
+            <a:schemeClr val="accent1"/>
+          </a:fillRef>
+          <a:effectRef idx="0">
+            <a:schemeClr val="accent1"/>
+          </a:effectRef>
+          <a:fontRef idx="minor">
+            <a:schemeClr val="tx1"/>
+          </a:fontRef>
+        </p:style>
+      </p:cxnSp>
+      <p:sp>
+        <p:nvSpPr>
+          <p:cNvPr id="9" name="TextBox 8">
+            <a:extLst>
+              <a:ext uri="{FF2B5EF4-FFF2-40B4-BE49-F238E27FC236}">
+                <a16:creationId xmlns:a16="http://schemas.microsoft.com/office/drawing/2014/main" id="{F9693FB8-27F1-4C29-9AC6-99FD2B8A7FE6}"/>
+              </a:ext>
+            </a:extLst>
+          </p:cNvPr>
+          <p:cNvSpPr txBox="1"/>
+          <p:nvPr/>
+        </p:nvSpPr>
+        <p:spPr>
+          <a:xfrm>
+            <a:off x="6707736" y="566240"/>
+            <a:ext cx="1708296" cy="307777"/>
+          </a:xfrm>
+          <a:prstGeom prst="rect">
+            <a:avLst/>
+          </a:prstGeom>
+          <a:noFill/>
+        </p:spPr>
+        <p:txBody>
+          <a:bodyPr wrap="square">
+            <a:spAutoFit/>
+          </a:bodyPr>
+          <a:lstStyle/>
+          <a:p>
+            <a:r>
+              <a:rPr lang="en-US" sz="1400" dirty="0">
+                <a:cs typeface="Courier New" panose="02070309020205020404" pitchFamily="49" charset="0"/>
+              </a:rPr>
+              <a:t>Set the time-interval</a:t>
+            </a:r>
+            <a:endParaRPr lang="en-US" sz="1400" dirty="0"/>
+          </a:p>
+        </p:txBody>
+      </p:sp>
+      <p:cxnSp>
+        <p:nvCxnSpPr>
+          <p:cNvPr id="10" name="Straight Arrow Connector 9">
+            <a:extLst>
+              <a:ext uri="{FF2B5EF4-FFF2-40B4-BE49-F238E27FC236}">
+                <a16:creationId xmlns:a16="http://schemas.microsoft.com/office/drawing/2014/main" id="{8E6F7921-A737-42D6-82E9-DFC5D104CFE9}"/>
+              </a:ext>
+            </a:extLst>
+          </p:cNvPr>
+          <p:cNvCxnSpPr>
+            <a:cxnSpLocks/>
+          </p:cNvCxnSpPr>
+          <p:nvPr/>
+        </p:nvCxnSpPr>
+        <p:spPr>
+          <a:xfrm>
+            <a:off x="7405785" y="888186"/>
+            <a:ext cx="195664" cy="1321339"/>
+          </a:xfrm>
+          <a:prstGeom prst="straightConnector1">
+            <a:avLst/>
+          </a:prstGeom>
+          <a:ln>
+            <a:tailEnd type="triangle"/>
+          </a:ln>
+        </p:spPr>
+        <p:style>
+          <a:lnRef idx="1">
+            <a:schemeClr val="accent1"/>
+          </a:lnRef>
+          <a:fillRef idx="0">
+            <a:schemeClr val="accent1"/>
+          </a:fillRef>
+          <a:effectRef idx="0">
+            <a:schemeClr val="accent1"/>
+          </a:effectRef>
+          <a:fontRef idx="minor">
+            <a:schemeClr val="tx1"/>
+          </a:fontRef>
+        </p:style>
+      </p:cxnSp>
+      <p:cxnSp>
+        <p:nvCxnSpPr>
+          <p:cNvPr id="12" name="Straight Arrow Connector 11">
+            <a:extLst>
+              <a:ext uri="{FF2B5EF4-FFF2-40B4-BE49-F238E27FC236}">
+                <a16:creationId xmlns:a16="http://schemas.microsoft.com/office/drawing/2014/main" id="{577DDDAF-7BA1-43A3-9AA4-B182BF876F38}"/>
+              </a:ext>
+            </a:extLst>
+          </p:cNvPr>
+          <p:cNvCxnSpPr>
+            <a:cxnSpLocks/>
+            <a:stCxn id="6" idx="3"/>
+          </p:cNvCxnSpPr>
+          <p:nvPr/>
+        </p:nvCxnSpPr>
+        <p:spPr>
+          <a:xfrm>
+            <a:off x="10726800" y="1027906"/>
+            <a:ext cx="0" cy="1333394"/>
+          </a:xfrm>
+          <a:prstGeom prst="straightConnector1">
+            <a:avLst/>
+          </a:prstGeom>
+          <a:ln>
+            <a:tailEnd type="triangle"/>
+          </a:ln>
+        </p:spPr>
+        <p:style>
+          <a:lnRef idx="1">
+            <a:schemeClr val="accent1"/>
+          </a:lnRef>
+          <a:fillRef idx="0">
+            <a:schemeClr val="accent1"/>
+          </a:fillRef>
+          <a:effectRef idx="0">
+            <a:schemeClr val="accent1"/>
+          </a:effectRef>
+          <a:fontRef idx="minor">
+            <a:schemeClr val="tx1"/>
+          </a:fontRef>
+        </p:style>
+      </p:cxnSp>
+      <p:sp>
+        <p:nvSpPr>
+          <p:cNvPr id="14" name="TextBox 13">
+            <a:extLst>
+              <a:ext uri="{FF2B5EF4-FFF2-40B4-BE49-F238E27FC236}">
+                <a16:creationId xmlns:a16="http://schemas.microsoft.com/office/drawing/2014/main" id="{2191F145-7AF3-453C-A460-1D8ACBD2BD3C}"/>
+              </a:ext>
+            </a:extLst>
+          </p:cNvPr>
+          <p:cNvSpPr txBox="1"/>
+          <p:nvPr/>
+        </p:nvSpPr>
+        <p:spPr>
+          <a:xfrm>
+            <a:off x="10372108" y="65573"/>
+            <a:ext cx="1815838" cy="954107"/>
+          </a:xfrm>
+          <a:prstGeom prst="rect">
+            <a:avLst/>
+          </a:prstGeom>
+          <a:noFill/>
+        </p:spPr>
+        <p:txBody>
+          <a:bodyPr wrap="square">
+            <a:spAutoFit/>
+          </a:bodyPr>
+          <a:lstStyle/>
+          <a:p>
+            <a:r>
+              <a:rPr lang="en-US" sz="1400" dirty="0">
+                <a:cs typeface="Courier New" panose="02070309020205020404" pitchFamily="49" charset="0"/>
+              </a:rPr>
+              <a:t>Select the variables. Here two satellites with the ‘time’ variable is selected.</a:t>
+            </a:r>
+            <a:endParaRPr lang="en-US" sz="1400" dirty="0"/>
+          </a:p>
+        </p:txBody>
+      </p:sp>
+      <p:cxnSp>
+        <p:nvCxnSpPr>
+          <p:cNvPr id="15" name="Straight Arrow Connector 14">
+            <a:extLst>
+              <a:ext uri="{FF2B5EF4-FFF2-40B4-BE49-F238E27FC236}">
+                <a16:creationId xmlns:a16="http://schemas.microsoft.com/office/drawing/2014/main" id="{E5F86BE0-F8F5-47ED-995F-2CA62542336D}"/>
+              </a:ext>
+            </a:extLst>
+          </p:cNvPr>
+          <p:cNvCxnSpPr>
+            <a:cxnSpLocks/>
+          </p:cNvCxnSpPr>
+          <p:nvPr/>
+        </p:nvCxnSpPr>
+        <p:spPr>
+          <a:xfrm>
+            <a:off x="5370990" y="5193902"/>
+            <a:ext cx="997943" cy="0"/>
+          </a:xfrm>
+          <a:prstGeom prst="straightConnector1">
+            <a:avLst/>
+          </a:prstGeom>
+          <a:ln>
+            <a:tailEnd type="triangle"/>
+          </a:ln>
+        </p:spPr>
+        <p:style>
+          <a:lnRef idx="1">
+            <a:schemeClr val="accent1"/>
+          </a:lnRef>
+          <a:fillRef idx="0">
+            <a:schemeClr val="accent1"/>
+          </a:fillRef>
+          <a:effectRef idx="0">
+            <a:schemeClr val="accent1"/>
+          </a:effectRef>
+          <a:fontRef idx="minor">
+            <a:schemeClr val="tx1"/>
+          </a:fontRef>
+        </p:style>
+      </p:cxnSp>
+      <p:sp>
+        <p:nvSpPr>
+          <p:cNvPr id="17" name="TextBox 16">
+            <a:extLst>
+              <a:ext uri="{FF2B5EF4-FFF2-40B4-BE49-F238E27FC236}">
+                <a16:creationId xmlns:a16="http://schemas.microsoft.com/office/drawing/2014/main" id="{52C4E63C-4490-400E-9DF8-830D5E2DF7DA}"/>
+              </a:ext>
+            </a:extLst>
+          </p:cNvPr>
+          <p:cNvSpPr txBox="1"/>
+          <p:nvPr/>
+        </p:nvSpPr>
+        <p:spPr>
+          <a:xfrm>
+            <a:off x="3383389" y="4545288"/>
+            <a:ext cx="2433306" cy="1384995"/>
+          </a:xfrm>
+          <a:prstGeom prst="rect">
+            <a:avLst/>
+          </a:prstGeom>
+          <a:noFill/>
+        </p:spPr>
+        <p:txBody>
+          <a:bodyPr wrap="square">
+            <a:spAutoFit/>
+          </a:bodyPr>
+          <a:lstStyle/>
+          <a:p>
+            <a:r>
+              <a:rPr lang="en-US" sz="1400">
+                <a:cs typeface="Courier New" panose="02070309020205020404" pitchFamily="49" charset="0"/>
+              </a:rPr>
+              <a:t>Map Plot</a:t>
+            </a:r>
+            <a:r>
+              <a:rPr lang="en-US" sz="1400" dirty="0">
+                <a:cs typeface="Courier New" panose="02070309020205020404" pitchFamily="49" charset="0"/>
+              </a:rPr>
+              <a:t>. This is essentially the ground-track of the two satellites, color-coded to reflect the time, i.e., the time at which the satellites are the respective ground-locations.</a:t>
+            </a:r>
+            <a:endParaRPr lang="en-US" sz="1400" dirty="0"/>
+          </a:p>
+        </p:txBody>
+      </p:sp>
+    </p:spTree>
+    <p:extLst>
+      <p:ext uri="{BB962C8B-B14F-4D97-AF65-F5344CB8AC3E}">
+        <p14:creationId xmlns:p14="http://schemas.microsoft.com/office/powerpoint/2010/main" val="1682512525"/>
+      </p:ext>
+    </p:extLst>
+  </p:cSld>
+  <p:clrMapOvr>
+    <a:masterClrMapping/>
+  </p:clrMapOvr>
+</p:sld>
+</file>
+
+<file path=ppt/slides/slide12.xml><?xml version="1.0" encoding="utf-8"?>
+<p:sld xmlns:a="http://schemas.openxmlformats.org/drawingml/2006/main" xmlns:r="http://schemas.openxmlformats.org/officeDocument/2006/relationships" xmlns:p="http://schemas.openxmlformats.org/presentationml/2006/main">
+  <p:cSld>
+    <p:spTree>
+      <p:nvGrpSpPr>
+        <p:cNvPr id="1" name=""/>
+        <p:cNvGrpSpPr/>
+        <p:nvPr/>
+      </p:nvGrpSpPr>
+      <p:grpSpPr>
+        <a:xfrm>
+          <a:off x="0" y="0"/>
+          <a:ext cx="0" cy="0"/>
+          <a:chOff x="0" y="0"/>
+          <a:chExt cx="0" cy="0"/>
+        </a:xfrm>
+      </p:grpSpPr>
+      <p:sp>
+        <p:nvSpPr>
+          <p:cNvPr id="2" name="Title 1">
+            <a:extLst>
+              <a:ext uri="{FF2B5EF4-FFF2-40B4-BE49-F238E27FC236}">
                 <a16:creationId xmlns:a16="http://schemas.microsoft.com/office/drawing/2014/main" id="{DF4BB113-B8B2-4A70-AFE7-29FF8386057F}"/>
               </a:ext>
             </a:extLst>
@@ -3713,7 +4687,7 @@
 </p:sld>
 </file>
 
-<file path=ppt/slides/slide12.xml><?xml version="1.0" encoding="utf-8"?>
+<file path=ppt/slides/slide13.xml><?xml version="1.0" encoding="utf-8"?>
 <p:sld xmlns:a="http://schemas.openxmlformats.org/drawingml/2006/main" xmlns:r="http://schemas.openxmlformats.org/officeDocument/2006/relationships" xmlns:p="http://schemas.openxmlformats.org/presentationml/2006/main">
   <p:cSld>
     <p:spTree>
@@ -4269,7 +5243,7 @@
 </p:sld>
 </file>
 
-<file path=ppt/slides/slide13.xml><?xml version="1.0" encoding="utf-8"?>
+<file path=ppt/slides/slide14.xml><?xml version="1.0" encoding="utf-8"?>
 <p:sld xmlns:a="http://schemas.openxmlformats.org/drawingml/2006/main" xmlns:r="http://schemas.openxmlformats.org/officeDocument/2006/relationships" xmlns:p="http://schemas.openxmlformats.org/presentationml/2006/main">
   <p:cSld>
     <p:spTree>
@@ -5003,7 +5977,7 @@
 </p:sld>
 </file>
 
-<file path=ppt/slides/slide14.xml><?xml version="1.0" encoding="utf-8"?>
+<file path=ppt/slides/slide15.xml><?xml version="1.0" encoding="utf-8"?>
 <p:sld xmlns:a="http://schemas.openxmlformats.org/drawingml/2006/main" xmlns:r="http://schemas.openxmlformats.org/officeDocument/2006/relationships" xmlns:p="http://schemas.openxmlformats.org/presentationml/2006/main">
   <p:cSld>
     <p:spTree>
@@ -5752,7 +6726,7 @@
 </p:sld>
 </file>
 
-<file path=ppt/slides/slide15.xml><?xml version="1.0" encoding="utf-8"?>
+<file path=ppt/slides/slide16.xml><?xml version="1.0" encoding="utf-8"?>
 <p:sld xmlns:a="http://schemas.openxmlformats.org/drawingml/2006/main" xmlns:r="http://schemas.openxmlformats.org/officeDocument/2006/relationships" xmlns:p="http://schemas.openxmlformats.org/presentationml/2006/main">
   <p:cSld>
     <p:spTree>
@@ -9210,26 +10184,264 @@
       </p:sp>
       <p:sp>
         <p:nvSpPr>
-          <p:cNvPr id="3" name="Content Placeholder 2">
-            <a:extLst>
-              <a:ext uri="{FF2B5EF4-FFF2-40B4-BE49-F238E27FC236}">
-                <a16:creationId xmlns:a16="http://schemas.microsoft.com/office/drawing/2014/main" id="{FDFFC907-9913-4BDC-825A-56F711ED4F06}"/>
-              </a:ext>
-            </a:extLst>
-          </p:cNvPr>
-          <p:cNvSpPr>
-            <a:spLocks noGrp="1"/>
+          <p:cNvPr id="4" name="Content Placeholder 2">
+            <a:extLst>
+              <a:ext uri="{FF2B5EF4-FFF2-40B4-BE49-F238E27FC236}">
+                <a16:creationId xmlns:a16="http://schemas.microsoft.com/office/drawing/2014/main" id="{CC9ADCE1-0715-4E91-865E-AAB06DA0C93D}"/>
+              </a:ext>
+            </a:extLst>
+          </p:cNvPr>
+          <p:cNvSpPr txBox="1">
+            <a:spLocks/>
           </p:cNvSpPr>
-          <p:nvPr>
-            <p:ph idx="1"/>
-          </p:nvPr>
-        </p:nvSpPr>
-        <p:spPr/>
-        <p:txBody>
-          <a:bodyPr/>
-          <a:lstStyle/>
-          <a:p>
-            <a:endParaRPr lang="en-US"/>
+          <p:nvPr/>
+        </p:nvSpPr>
+        <p:spPr>
+          <a:xfrm>
+            <a:off x="704848" y="1463674"/>
+            <a:ext cx="5047882" cy="4466609"/>
+          </a:xfrm>
+          <a:prstGeom prst="rect">
+            <a:avLst/>
+          </a:prstGeom>
+        </p:spPr>
+        <p:txBody>
+          <a:bodyPr vert="horz" lIns="91440" tIns="45720" rIns="91440" bIns="45720" rtlCol="0">
+            <a:noAutofit/>
+          </a:bodyPr>
+          <a:lstStyle>
+            <a:lvl1pPr marL="228600" indent="-228600" algn="l" defTabSz="914400" rtl="0" eaLnBrk="1" latinLnBrk="0" hangingPunct="1">
+              <a:lnSpc>
+                <a:spcPct val="90000"/>
+              </a:lnSpc>
+              <a:spcBef>
+                <a:spcPts val="1000"/>
+              </a:spcBef>
+              <a:buFont typeface="Arial" panose="020B0604020202020204" pitchFamily="34" charset="0"/>
+              <a:buChar char="•"/>
+              <a:defRPr sz="2800" kern="1200">
+                <a:solidFill>
+                  <a:schemeClr val="tx1"/>
+                </a:solidFill>
+                <a:latin typeface="+mn-lt"/>
+                <a:ea typeface="+mn-ea"/>
+                <a:cs typeface="+mn-cs"/>
+              </a:defRPr>
+            </a:lvl1pPr>
+            <a:lvl2pPr marL="685800" indent="-228600" algn="l" defTabSz="914400" rtl="0" eaLnBrk="1" latinLnBrk="0" hangingPunct="1">
+              <a:lnSpc>
+                <a:spcPct val="90000"/>
+              </a:lnSpc>
+              <a:spcBef>
+                <a:spcPts val="500"/>
+              </a:spcBef>
+              <a:buFont typeface="Arial" panose="020B0604020202020204" pitchFamily="34" charset="0"/>
+              <a:buChar char="•"/>
+              <a:defRPr sz="2400" kern="1200">
+                <a:solidFill>
+                  <a:schemeClr val="tx1"/>
+                </a:solidFill>
+                <a:latin typeface="+mn-lt"/>
+                <a:ea typeface="+mn-ea"/>
+                <a:cs typeface="+mn-cs"/>
+              </a:defRPr>
+            </a:lvl2pPr>
+            <a:lvl3pPr marL="1143000" indent="-228600" algn="l" defTabSz="914400" rtl="0" eaLnBrk="1" latinLnBrk="0" hangingPunct="1">
+              <a:lnSpc>
+                <a:spcPct val="90000"/>
+              </a:lnSpc>
+              <a:spcBef>
+                <a:spcPts val="500"/>
+              </a:spcBef>
+              <a:buFont typeface="Arial" panose="020B0604020202020204" pitchFamily="34" charset="0"/>
+              <a:buChar char="•"/>
+              <a:defRPr sz="2000" kern="1200">
+                <a:solidFill>
+                  <a:schemeClr val="tx1"/>
+                </a:solidFill>
+                <a:latin typeface="+mn-lt"/>
+                <a:ea typeface="+mn-ea"/>
+                <a:cs typeface="+mn-cs"/>
+              </a:defRPr>
+            </a:lvl3pPr>
+            <a:lvl4pPr marL="1600200" indent="-228600" algn="l" defTabSz="914400" rtl="0" eaLnBrk="1" latinLnBrk="0" hangingPunct="1">
+              <a:lnSpc>
+                <a:spcPct val="90000"/>
+              </a:lnSpc>
+              <a:spcBef>
+                <a:spcPts val="500"/>
+              </a:spcBef>
+              <a:buFont typeface="Arial" panose="020B0604020202020204" pitchFamily="34" charset="0"/>
+              <a:buChar char="•"/>
+              <a:defRPr sz="1800" kern="1200">
+                <a:solidFill>
+                  <a:schemeClr val="tx1"/>
+                </a:solidFill>
+                <a:latin typeface="+mn-lt"/>
+                <a:ea typeface="+mn-ea"/>
+                <a:cs typeface="+mn-cs"/>
+              </a:defRPr>
+            </a:lvl4pPr>
+            <a:lvl5pPr marL="2057400" indent="-228600" algn="l" defTabSz="914400" rtl="0" eaLnBrk="1" latinLnBrk="0" hangingPunct="1">
+              <a:lnSpc>
+                <a:spcPct val="90000"/>
+              </a:lnSpc>
+              <a:spcBef>
+                <a:spcPts val="500"/>
+              </a:spcBef>
+              <a:buFont typeface="Arial" panose="020B0604020202020204" pitchFamily="34" charset="0"/>
+              <a:buChar char="•"/>
+              <a:defRPr sz="1800" kern="1200">
+                <a:solidFill>
+                  <a:schemeClr val="tx1"/>
+                </a:solidFill>
+                <a:latin typeface="+mn-lt"/>
+                <a:ea typeface="+mn-ea"/>
+                <a:cs typeface="+mn-cs"/>
+              </a:defRPr>
+            </a:lvl5pPr>
+            <a:lvl6pPr marL="2514600" indent="-228600" algn="l" defTabSz="914400" rtl="0" eaLnBrk="1" latinLnBrk="0" hangingPunct="1">
+              <a:lnSpc>
+                <a:spcPct val="90000"/>
+              </a:lnSpc>
+              <a:spcBef>
+                <a:spcPts val="500"/>
+              </a:spcBef>
+              <a:buFont typeface="Arial" panose="020B0604020202020204" pitchFamily="34" charset="0"/>
+              <a:buChar char="•"/>
+              <a:defRPr sz="1800" kern="1200">
+                <a:solidFill>
+                  <a:schemeClr val="tx1"/>
+                </a:solidFill>
+                <a:latin typeface="+mn-lt"/>
+                <a:ea typeface="+mn-ea"/>
+                <a:cs typeface="+mn-cs"/>
+              </a:defRPr>
+            </a:lvl6pPr>
+            <a:lvl7pPr marL="2971800" indent="-228600" algn="l" defTabSz="914400" rtl="0" eaLnBrk="1" latinLnBrk="0" hangingPunct="1">
+              <a:lnSpc>
+                <a:spcPct val="90000"/>
+              </a:lnSpc>
+              <a:spcBef>
+                <a:spcPts val="500"/>
+              </a:spcBef>
+              <a:buFont typeface="Arial" panose="020B0604020202020204" pitchFamily="34" charset="0"/>
+              <a:buChar char="•"/>
+              <a:defRPr sz="1800" kern="1200">
+                <a:solidFill>
+                  <a:schemeClr val="tx1"/>
+                </a:solidFill>
+                <a:latin typeface="+mn-lt"/>
+                <a:ea typeface="+mn-ea"/>
+                <a:cs typeface="+mn-cs"/>
+              </a:defRPr>
+            </a:lvl7pPr>
+            <a:lvl8pPr marL="3429000" indent="-228600" algn="l" defTabSz="914400" rtl="0" eaLnBrk="1" latinLnBrk="0" hangingPunct="1">
+              <a:lnSpc>
+                <a:spcPct val="90000"/>
+              </a:lnSpc>
+              <a:spcBef>
+                <a:spcPts val="500"/>
+              </a:spcBef>
+              <a:buFont typeface="Arial" panose="020B0604020202020204" pitchFamily="34" charset="0"/>
+              <a:buChar char="•"/>
+              <a:defRPr sz="1800" kern="1200">
+                <a:solidFill>
+                  <a:schemeClr val="tx1"/>
+                </a:solidFill>
+                <a:latin typeface="+mn-lt"/>
+                <a:ea typeface="+mn-ea"/>
+                <a:cs typeface="+mn-cs"/>
+              </a:defRPr>
+            </a:lvl8pPr>
+            <a:lvl9pPr marL="3886200" indent="-228600" algn="l" defTabSz="914400" rtl="0" eaLnBrk="1" latinLnBrk="0" hangingPunct="1">
+              <a:lnSpc>
+                <a:spcPct val="90000"/>
+              </a:lnSpc>
+              <a:spcBef>
+                <a:spcPts val="500"/>
+              </a:spcBef>
+              <a:buFont typeface="Arial" panose="020B0604020202020204" pitchFamily="34" charset="0"/>
+              <a:buChar char="•"/>
+              <a:defRPr sz="1800" kern="1200">
+                <a:solidFill>
+                  <a:schemeClr val="tx1"/>
+                </a:solidFill>
+                <a:latin typeface="+mn-lt"/>
+                <a:ea typeface="+mn-ea"/>
+                <a:cs typeface="+mn-cs"/>
+              </a:defRPr>
+            </a:lvl9pPr>
+          </a:lstStyle>
+          <a:p>
+            <a:r>
+              <a:rPr lang="en-US" sz="1600" dirty="0"/>
+              <a:t>This module creates tabs for the following visualization modules:</a:t>
+            </a:r>
+          </a:p>
+          <a:p>
+            <a:pPr lvl="1"/>
+            <a:r>
+              <a:rPr lang="en-US" sz="1200" dirty="0">
+                <a:latin typeface="Courier New" panose="02070309020205020404" pitchFamily="49" charset="0"/>
+                <a:cs typeface="Courier New" panose="02070309020205020404" pitchFamily="49" charset="0"/>
+              </a:rPr>
+              <a:t>Vis2DFrame</a:t>
+            </a:r>
+            <a:r>
+              <a:rPr lang="en-US" sz="1200" dirty="0"/>
+              <a:t> (X-Y plots)</a:t>
+            </a:r>
+          </a:p>
+          <a:p>
+            <a:pPr lvl="1"/>
+            <a:r>
+              <a:rPr lang="en-US" sz="1200" dirty="0" err="1">
+                <a:latin typeface="Courier New" panose="02070309020205020404" pitchFamily="49" charset="0"/>
+                <a:cs typeface="Courier New" panose="02070309020205020404" pitchFamily="49" charset="0"/>
+              </a:rPr>
+              <a:t>VisMapFrame</a:t>
+            </a:r>
+            <a:r>
+              <a:rPr lang="en-US" sz="1200" dirty="0"/>
+              <a:t> (Plots on a map with configurable projections)</a:t>
+            </a:r>
+          </a:p>
+          <a:p>
+            <a:pPr lvl="1"/>
+            <a:r>
+              <a:rPr lang="en-US" sz="1200" dirty="0" err="1">
+                <a:latin typeface="Courier New" panose="02070309020205020404" pitchFamily="49" charset="0"/>
+                <a:cs typeface="Courier New" panose="02070309020205020404" pitchFamily="49" charset="0"/>
+              </a:rPr>
+              <a:t>VisGlobeFrame</a:t>
+            </a:r>
+            <a:r>
+              <a:rPr lang="en-US" sz="1200" dirty="0"/>
+              <a:t> (</a:t>
+            </a:r>
+            <a:r>
+              <a:rPr lang="en-US" sz="1200" dirty="0" err="1"/>
+              <a:t>CesiumJS</a:t>
+            </a:r>
+            <a:r>
+              <a:rPr lang="en-US" sz="1200" dirty="0"/>
+              <a:t> powered animated view)</a:t>
+            </a:r>
+          </a:p>
+          <a:p>
+            <a:pPr lvl="1"/>
+            <a:r>
+              <a:rPr lang="en-US" sz="1200" dirty="0" err="1">
+                <a:latin typeface="Courier New" panose="02070309020205020404" pitchFamily="49" charset="0"/>
+                <a:cs typeface="Courier New" panose="02070309020205020404" pitchFamily="49" charset="0"/>
+              </a:rPr>
+              <a:t>InsightsFrame</a:t>
+            </a:r>
+            <a:r>
+              <a:rPr lang="en-US" sz="1200" dirty="0"/>
+              <a:t> (textual information, under construction)</a:t>
+            </a:r>
           </a:p>
         </p:txBody>
       </p:sp>

</xml_diff>

<commit_message>
Revised cesiumJS powered visualization
</commit_message>
<xml_diff>
--- a/docs/codebase_description.pptx
+++ b/docs/codebase_description.pptx
@@ -16,11 +16,15 @@
     <p:sldId id="269" r:id="rId10"/>
     <p:sldId id="270" r:id="rId11"/>
     <p:sldId id="271" r:id="rId12"/>
-    <p:sldId id="263" r:id="rId13"/>
-    <p:sldId id="264" r:id="rId14"/>
-    <p:sldId id="265" r:id="rId15"/>
-    <p:sldId id="266" r:id="rId16"/>
-    <p:sldId id="267" r:id="rId17"/>
+    <p:sldId id="272" r:id="rId13"/>
+    <p:sldId id="274" r:id="rId14"/>
+    <p:sldId id="273" r:id="rId15"/>
+    <p:sldId id="275" r:id="rId16"/>
+    <p:sldId id="263" r:id="rId17"/>
+    <p:sldId id="264" r:id="rId18"/>
+    <p:sldId id="265" r:id="rId19"/>
+    <p:sldId id="266" r:id="rId20"/>
+    <p:sldId id="267" r:id="rId21"/>
   </p:sldIdLst>
   <p:sldSz cx="12192000" cy="6858000"/>
   <p:notesSz cx="6858000" cy="9144000"/>
@@ -274,7 +278,7 @@
           <a:p>
             <a:fld id="{F6612307-B608-4FD9-90D8-D494C0A10B27}" type="datetimeFigureOut">
               <a:rPr lang="en-US" smtClean="0"/>
-              <a:t>10/15/2021</a:t>
+              <a:t>10/21/2021</a:t>
             </a:fld>
             <a:endParaRPr lang="en-US"/>
           </a:p>
@@ -472,7 +476,7 @@
           <a:p>
             <a:fld id="{F6612307-B608-4FD9-90D8-D494C0A10B27}" type="datetimeFigureOut">
               <a:rPr lang="en-US" smtClean="0"/>
-              <a:t>10/15/2021</a:t>
+              <a:t>10/21/2021</a:t>
             </a:fld>
             <a:endParaRPr lang="en-US"/>
           </a:p>
@@ -680,7 +684,7 @@
           <a:p>
             <a:fld id="{F6612307-B608-4FD9-90D8-D494C0A10B27}" type="datetimeFigureOut">
               <a:rPr lang="en-US" smtClean="0"/>
-              <a:t>10/15/2021</a:t>
+              <a:t>10/21/2021</a:t>
             </a:fld>
             <a:endParaRPr lang="en-US"/>
           </a:p>
@@ -878,7 +882,7 @@
           <a:p>
             <a:fld id="{F6612307-B608-4FD9-90D8-D494C0A10B27}" type="datetimeFigureOut">
               <a:rPr lang="en-US" smtClean="0"/>
-              <a:t>10/15/2021</a:t>
+              <a:t>10/21/2021</a:t>
             </a:fld>
             <a:endParaRPr lang="en-US"/>
           </a:p>
@@ -1153,7 +1157,7 @@
           <a:p>
             <a:fld id="{F6612307-B608-4FD9-90D8-D494C0A10B27}" type="datetimeFigureOut">
               <a:rPr lang="en-US" smtClean="0"/>
-              <a:t>10/15/2021</a:t>
+              <a:t>10/21/2021</a:t>
             </a:fld>
             <a:endParaRPr lang="en-US"/>
           </a:p>
@@ -1418,7 +1422,7 @@
           <a:p>
             <a:fld id="{F6612307-B608-4FD9-90D8-D494C0A10B27}" type="datetimeFigureOut">
               <a:rPr lang="en-US" smtClean="0"/>
-              <a:t>10/15/2021</a:t>
+              <a:t>10/21/2021</a:t>
             </a:fld>
             <a:endParaRPr lang="en-US"/>
           </a:p>
@@ -1830,7 +1834,7 @@
           <a:p>
             <a:fld id="{F6612307-B608-4FD9-90D8-D494C0A10B27}" type="datetimeFigureOut">
               <a:rPr lang="en-US" smtClean="0"/>
-              <a:t>10/15/2021</a:t>
+              <a:t>10/21/2021</a:t>
             </a:fld>
             <a:endParaRPr lang="en-US"/>
           </a:p>
@@ -1971,7 +1975,7 @@
           <a:p>
             <a:fld id="{F6612307-B608-4FD9-90D8-D494C0A10B27}" type="datetimeFigureOut">
               <a:rPr lang="en-US" smtClean="0"/>
-              <a:t>10/15/2021</a:t>
+              <a:t>10/21/2021</a:t>
             </a:fld>
             <a:endParaRPr lang="en-US"/>
           </a:p>
@@ -2084,7 +2088,7 @@
           <a:p>
             <a:fld id="{F6612307-B608-4FD9-90D8-D494C0A10B27}" type="datetimeFigureOut">
               <a:rPr lang="en-US" smtClean="0"/>
-              <a:t>10/15/2021</a:t>
+              <a:t>10/21/2021</a:t>
             </a:fld>
             <a:endParaRPr lang="en-US"/>
           </a:p>
@@ -2395,7 +2399,7 @@
           <a:p>
             <a:fld id="{F6612307-B608-4FD9-90D8-D494C0A10B27}" type="datetimeFigureOut">
               <a:rPr lang="en-US" smtClean="0"/>
-              <a:t>10/15/2021</a:t>
+              <a:t>10/21/2021</a:t>
             </a:fld>
             <a:endParaRPr lang="en-US"/>
           </a:p>
@@ -2683,7 +2687,7 @@
           <a:p>
             <a:fld id="{F6612307-B608-4FD9-90D8-D494C0A10B27}" type="datetimeFigureOut">
               <a:rPr lang="en-US" smtClean="0"/>
-              <a:t>10/15/2021</a:t>
+              <a:t>10/21/2021</a:t>
             </a:fld>
             <a:endParaRPr lang="en-US"/>
           </a:p>
@@ -2924,7 +2928,7 @@
           <a:p>
             <a:fld id="{F6612307-B608-4FD9-90D8-D494C0A10B27}" type="datetimeFigureOut">
               <a:rPr lang="en-US" smtClean="0"/>
-              <a:t>10/15/2021</a:t>
+              <a:t>10/21/2021</a:t>
             </a:fld>
             <a:endParaRPr lang="en-US"/>
           </a:p>
@@ -4516,6 +4520,1199 @@
           <p:cNvPr id="2" name="Title 1">
             <a:extLst>
               <a:ext uri="{FF2B5EF4-FFF2-40B4-BE49-F238E27FC236}">
+                <a16:creationId xmlns:a16="http://schemas.microsoft.com/office/drawing/2014/main" id="{88D7371C-A156-46E9-9AD1-574487377BB6}"/>
+              </a:ext>
+            </a:extLst>
+          </p:cNvPr>
+          <p:cNvSpPr>
+            <a:spLocks noGrp="1"/>
+          </p:cNvSpPr>
+          <p:nvPr>
+            <p:ph type="title"/>
+          </p:nvPr>
+        </p:nvSpPr>
+        <p:spPr/>
+        <p:txBody>
+          <a:bodyPr/>
+          <a:lstStyle/>
+          <a:p>
+            <a:r>
+              <a:rPr lang="en-US" dirty="0"/>
+              <a:t>Cesium App</a:t>
+            </a:r>
+          </a:p>
+        </p:txBody>
+      </p:sp>
+      <p:sp>
+        <p:nvSpPr>
+          <p:cNvPr id="11" name="TextBox 10">
+            <a:extLst>
+              <a:ext uri="{FF2B5EF4-FFF2-40B4-BE49-F238E27FC236}">
+                <a16:creationId xmlns:a16="http://schemas.microsoft.com/office/drawing/2014/main" id="{4CCC0CD8-1F14-493E-8315-E1D7BA825152}"/>
+              </a:ext>
+            </a:extLst>
+          </p:cNvPr>
+          <p:cNvSpPr txBox="1"/>
+          <p:nvPr/>
+        </p:nvSpPr>
+        <p:spPr>
+          <a:xfrm>
+            <a:off x="685800" y="1465529"/>
+            <a:ext cx="11370076" cy="4770537"/>
+          </a:xfrm>
+          <a:prstGeom prst="rect">
+            <a:avLst/>
+          </a:prstGeom>
+          <a:noFill/>
+        </p:spPr>
+        <p:txBody>
+          <a:bodyPr wrap="square">
+            <a:spAutoFit/>
+          </a:bodyPr>
+          <a:lstStyle/>
+          <a:p>
+            <a:r>
+              <a:rPr lang="en-US" sz="1600" dirty="0"/>
+              <a:t>The Cesium JavaScript app is based on the showcased example of Cesium features in the </a:t>
+            </a:r>
+            <a:r>
+              <a:rPr lang="en-US" sz="1600" b="1" dirty="0"/>
+              <a:t>cesium-workshop</a:t>
+            </a:r>
+            <a:r>
+              <a:rPr lang="en-US" sz="1600" dirty="0"/>
+              <a:t> repository. It is contained in the </a:t>
+            </a:r>
+            <a:r>
+              <a:rPr lang="en-US" sz="1600" dirty="0">
+                <a:latin typeface="Courier New" panose="02070309020205020404" pitchFamily="49" charset="0"/>
+                <a:cs typeface="Courier New" panose="02070309020205020404" pitchFamily="49" charset="0"/>
+              </a:rPr>
+              <a:t>.\</a:t>
+            </a:r>
+            <a:r>
+              <a:rPr lang="en-US" sz="1600" dirty="0" err="1">
+                <a:latin typeface="Courier New" panose="02070309020205020404" pitchFamily="49" charset="0"/>
+                <a:cs typeface="Courier New" panose="02070309020205020404" pitchFamily="49" charset="0"/>
+              </a:rPr>
+              <a:t>cesium_app</a:t>
+            </a:r>
+            <a:r>
+              <a:rPr lang="en-US" sz="1600" dirty="0">
+                <a:latin typeface="Courier New" panose="02070309020205020404" pitchFamily="49" charset="0"/>
+                <a:cs typeface="Courier New" panose="02070309020205020404" pitchFamily="49" charset="0"/>
+              </a:rPr>
+              <a:t>\ </a:t>
+            </a:r>
+            <a:r>
+              <a:rPr lang="en-US" sz="1600" dirty="0"/>
+              <a:t>folder. </a:t>
+            </a:r>
+          </a:p>
+          <a:p>
+            <a:endParaRPr lang="en-US" sz="1600" dirty="0"/>
+          </a:p>
+          <a:p>
+            <a:r>
+              <a:rPr lang="en-US" sz="1600" dirty="0"/>
+              <a:t>The original </a:t>
+            </a:r>
+            <a:r>
+              <a:rPr lang="en-US" sz="1600" dirty="0">
+                <a:latin typeface="Courier New" panose="02070309020205020404" pitchFamily="49" charset="0"/>
+                <a:cs typeface="Courier New" panose="02070309020205020404" pitchFamily="49" charset="0"/>
+              </a:rPr>
+              <a:t>index.html</a:t>
+            </a:r>
+            <a:r>
+              <a:rPr lang="en-US" sz="1600" dirty="0"/>
+              <a:t> file has been modified, while the original cesium-workshop </a:t>
+            </a:r>
+            <a:r>
+              <a:rPr lang="en-US" sz="1600" dirty="0">
+                <a:latin typeface="Courier New" panose="02070309020205020404" pitchFamily="49" charset="0"/>
+                <a:cs typeface="Courier New" panose="02070309020205020404" pitchFamily="49" charset="0"/>
+              </a:rPr>
+              <a:t>index.html</a:t>
+            </a:r>
+            <a:r>
+              <a:rPr lang="en-US" sz="1600" dirty="0"/>
+              <a:t> file has been retained under the name </a:t>
+            </a:r>
+          </a:p>
+          <a:p>
+            <a:r>
+              <a:rPr lang="en-US" sz="1600" dirty="0">
+                <a:latin typeface="Courier New" panose="02070309020205020404" pitchFamily="49" charset="0"/>
+                <a:cs typeface="Courier New" panose="02070309020205020404" pitchFamily="49" charset="0"/>
+              </a:rPr>
+              <a:t>workshop_index.html</a:t>
+            </a:r>
+            <a:r>
+              <a:rPr lang="en-US" sz="1600" dirty="0"/>
+              <a:t>.</a:t>
+            </a:r>
+          </a:p>
+          <a:p>
+            <a:endParaRPr lang="en-US" sz="1600" dirty="0"/>
+          </a:p>
+          <a:p>
+            <a:r>
+              <a:rPr lang="en-US" sz="1600" dirty="0"/>
+              <a:t>A new </a:t>
+            </a:r>
+            <a:r>
+              <a:rPr lang="en-US" sz="1600" dirty="0" err="1"/>
+              <a:t>javascript</a:t>
+            </a:r>
+            <a:r>
+              <a:rPr lang="en-US" sz="1600" dirty="0"/>
+              <a:t> source file by the name </a:t>
+            </a:r>
+            <a:r>
+              <a:rPr lang="en-US" sz="1600" dirty="0">
+                <a:latin typeface="Courier New" panose="02070309020205020404" pitchFamily="49" charset="0"/>
+                <a:cs typeface="Courier New" panose="02070309020205020404" pitchFamily="49" charset="0"/>
+              </a:rPr>
+              <a:t>eosimApp.js</a:t>
+            </a:r>
+            <a:r>
+              <a:rPr lang="en-US" sz="1600" dirty="0"/>
+              <a:t> has been added (based on the available </a:t>
+            </a:r>
+            <a:r>
+              <a:rPr lang="en-US" sz="1600" dirty="0">
+                <a:latin typeface="Courier New" panose="02070309020205020404" pitchFamily="49" charset="0"/>
+                <a:cs typeface="Courier New" panose="02070309020205020404" pitchFamily="49" charset="0"/>
+              </a:rPr>
+              <a:t>App.js</a:t>
+            </a:r>
+            <a:r>
+              <a:rPr lang="en-US" sz="1600" dirty="0"/>
+              <a:t> source file). This source file is the one being executed. (Refer to </a:t>
+            </a:r>
+            <a:r>
+              <a:rPr lang="en-US" sz="1600" dirty="0">
+                <a:latin typeface="Courier New" panose="02070309020205020404" pitchFamily="49" charset="0"/>
+                <a:cs typeface="Courier New" panose="02070309020205020404" pitchFamily="49" charset="0"/>
+              </a:rPr>
+              <a:t>&lt;script </a:t>
+            </a:r>
+            <a:r>
+              <a:rPr lang="en-US" sz="1600" dirty="0" err="1">
+                <a:latin typeface="Courier New" panose="02070309020205020404" pitchFamily="49" charset="0"/>
+                <a:cs typeface="Courier New" panose="02070309020205020404" pitchFamily="49" charset="0"/>
+              </a:rPr>
+              <a:t>src</a:t>
+            </a:r>
+            <a:r>
+              <a:rPr lang="en-US" sz="1600" dirty="0">
+                <a:latin typeface="Courier New" panose="02070309020205020404" pitchFamily="49" charset="0"/>
+                <a:cs typeface="Courier New" panose="02070309020205020404" pitchFamily="49" charset="0"/>
+              </a:rPr>
+              <a:t>="Source/eosimApp.js"&gt;&lt;/script&gt; </a:t>
+            </a:r>
+            <a:r>
+              <a:rPr lang="en-US" sz="1600" dirty="0"/>
+              <a:t>in the </a:t>
+            </a:r>
+            <a:r>
+              <a:rPr lang="en-US" sz="1600" dirty="0">
+                <a:latin typeface="Courier New" panose="02070309020205020404" pitchFamily="49" charset="0"/>
+                <a:cs typeface="Courier New" panose="02070309020205020404" pitchFamily="49" charset="0"/>
+              </a:rPr>
+              <a:t>index.html</a:t>
+            </a:r>
+            <a:r>
+              <a:rPr lang="en-US" sz="1600" dirty="0"/>
+              <a:t> file.)</a:t>
+            </a:r>
+          </a:p>
+          <a:p>
+            <a:endParaRPr lang="en-US" sz="1600" dirty="0"/>
+          </a:p>
+          <a:p>
+            <a:r>
+              <a:rPr lang="en-US" sz="1600" dirty="0"/>
+              <a:t>The interface with this app is through CZML files. A new CZML file is produced based on the mission processed in </a:t>
+            </a:r>
+            <a:r>
+              <a:rPr lang="en-US" sz="1600" dirty="0" err="1"/>
+              <a:t>EOSim</a:t>
+            </a:r>
+            <a:r>
+              <a:rPr lang="en-US" sz="1600" dirty="0"/>
+              <a:t>. This file is saved in the</a:t>
+            </a:r>
+          </a:p>
+          <a:p>
+            <a:r>
+              <a:rPr lang="en-US" sz="1600" dirty="0"/>
+              <a:t>location </a:t>
+            </a:r>
+            <a:r>
+              <a:rPr lang="en-US" sz="1600" dirty="0">
+                <a:latin typeface="Courier New" panose="02070309020205020404" pitchFamily="49" charset="0"/>
+                <a:cs typeface="Courier New" panose="02070309020205020404" pitchFamily="49" charset="0"/>
+              </a:rPr>
+              <a:t>/</a:t>
+            </a:r>
+            <a:r>
+              <a:rPr lang="en-US" sz="1600" dirty="0" err="1">
+                <a:latin typeface="Courier New" panose="02070309020205020404" pitchFamily="49" charset="0"/>
+                <a:cs typeface="Courier New" panose="02070309020205020404" pitchFamily="49" charset="0"/>
+              </a:rPr>
+              <a:t>cesium_app</a:t>
+            </a:r>
+            <a:r>
+              <a:rPr lang="en-US" sz="1600" dirty="0">
+                <a:latin typeface="Courier New" panose="02070309020205020404" pitchFamily="49" charset="0"/>
+                <a:cs typeface="Courier New" panose="02070309020205020404" pitchFamily="49" charset="0"/>
+              </a:rPr>
+              <a:t>/Source/</a:t>
+            </a:r>
+            <a:r>
+              <a:rPr lang="en-US" sz="1600" dirty="0" err="1">
+                <a:latin typeface="Courier New" panose="02070309020205020404" pitchFamily="49" charset="0"/>
+                <a:cs typeface="Courier New" panose="02070309020205020404" pitchFamily="49" charset="0"/>
+              </a:rPr>
+              <a:t>SampleData</a:t>
+            </a:r>
+            <a:r>
+              <a:rPr lang="en-US" sz="1600" dirty="0">
+                <a:latin typeface="Courier New" panose="02070309020205020404" pitchFamily="49" charset="0"/>
+                <a:cs typeface="Courier New" panose="02070309020205020404" pitchFamily="49" charset="0"/>
+              </a:rPr>
+              <a:t>/. </a:t>
+            </a:r>
+          </a:p>
+          <a:p>
+            <a:endParaRPr lang="en-US" sz="1600" dirty="0"/>
+          </a:p>
+          <a:p>
+            <a:r>
+              <a:rPr lang="en-US" sz="1600" dirty="0"/>
+              <a:t>The </a:t>
+            </a:r>
+            <a:r>
+              <a:rPr lang="en-US" sz="1600" dirty="0" err="1">
+                <a:latin typeface="Courier New" panose="02070309020205020404" pitchFamily="49" charset="0"/>
+                <a:cs typeface="Courier New" panose="02070309020205020404" pitchFamily="49" charset="0"/>
+              </a:rPr>
+              <a:t>simple.czml</a:t>
+            </a:r>
+            <a:r>
+              <a:rPr lang="en-US" sz="1600" dirty="0"/>
+              <a:t> file in </a:t>
+            </a:r>
+            <a:r>
+              <a:rPr lang="en-US" sz="1600" dirty="0" err="1">
+                <a:latin typeface="Courier New" panose="02070309020205020404" pitchFamily="49" charset="0"/>
+                <a:cs typeface="Courier New" panose="02070309020205020404" pitchFamily="49" charset="0"/>
+              </a:rPr>
+              <a:t>cesium_app</a:t>
+            </a:r>
+            <a:r>
+              <a:rPr lang="en-US" sz="1600" dirty="0">
+                <a:latin typeface="Courier New" panose="02070309020205020404" pitchFamily="49" charset="0"/>
+                <a:cs typeface="Courier New" panose="02070309020205020404" pitchFamily="49" charset="0"/>
+              </a:rPr>
+              <a:t>/Source/</a:t>
+            </a:r>
+            <a:r>
+              <a:rPr lang="en-US" sz="1600" dirty="0" err="1">
+                <a:latin typeface="Courier New" panose="02070309020205020404" pitchFamily="49" charset="0"/>
+                <a:cs typeface="Courier New" panose="02070309020205020404" pitchFamily="49" charset="0"/>
+              </a:rPr>
+              <a:t>SampleData</a:t>
+            </a:r>
+            <a:r>
+              <a:rPr lang="en-US" sz="1600" dirty="0">
+                <a:latin typeface="Courier New" panose="02070309020205020404" pitchFamily="49" charset="0"/>
+                <a:cs typeface="Courier New" panose="02070309020205020404" pitchFamily="49" charset="0"/>
+              </a:rPr>
+              <a:t>/ </a:t>
+            </a:r>
+            <a:r>
+              <a:rPr lang="en-US" sz="1600" dirty="0"/>
+              <a:t>is a new addition which was not there in the cesium-workshop repo. </a:t>
+            </a:r>
+          </a:p>
+          <a:p>
+            <a:endParaRPr lang="en-US" sz="1600" dirty="0"/>
+          </a:p>
+          <a:p>
+            <a:r>
+              <a:rPr lang="en-US" sz="1600" b="1" i="1" dirty="0"/>
+              <a:t>Note: </a:t>
+            </a:r>
+            <a:r>
+              <a:rPr lang="en-US" sz="1600" dirty="0"/>
+              <a:t>The cesium-app needs to be updated each time a new version is released by updating the </a:t>
+            </a:r>
+            <a:r>
+              <a:rPr lang="en-US" sz="1600" dirty="0">
+                <a:latin typeface="Courier New" panose="02070309020205020404" pitchFamily="49" charset="0"/>
+                <a:cs typeface="Courier New" panose="02070309020205020404" pitchFamily="49" charset="0"/>
+              </a:rPr>
+              <a:t>&lt;script </a:t>
+            </a:r>
+            <a:r>
+              <a:rPr lang="en-US" sz="1600" dirty="0" err="1">
+                <a:latin typeface="Courier New" panose="02070309020205020404" pitchFamily="49" charset="0"/>
+                <a:cs typeface="Courier New" panose="02070309020205020404" pitchFamily="49" charset="0"/>
+              </a:rPr>
+              <a:t>src</a:t>
+            </a:r>
+            <a:r>
+              <a:rPr lang="en-US" sz="1600" dirty="0">
+                <a:latin typeface="Courier New" panose="02070309020205020404" pitchFamily="49" charset="0"/>
+                <a:cs typeface="Courier New" panose="02070309020205020404" pitchFamily="49" charset="0"/>
+              </a:rPr>
+              <a:t>=&gt;</a:t>
+            </a:r>
+            <a:r>
+              <a:rPr lang="en-US" sz="1600" dirty="0"/>
+              <a:t> and the </a:t>
+            </a:r>
+            <a:r>
+              <a:rPr lang="en-US" sz="1600" dirty="0">
+                <a:latin typeface="Courier New" panose="02070309020205020404" pitchFamily="49" charset="0"/>
+                <a:cs typeface="Courier New" panose="02070309020205020404" pitchFamily="49" charset="0"/>
+              </a:rPr>
+              <a:t>&lt;link </a:t>
+            </a:r>
+            <a:r>
+              <a:rPr lang="en-US" sz="1600" dirty="0" err="1">
+                <a:latin typeface="Courier New" panose="02070309020205020404" pitchFamily="49" charset="0"/>
+                <a:cs typeface="Courier New" panose="02070309020205020404" pitchFamily="49" charset="0"/>
+              </a:rPr>
+              <a:t>href</a:t>
+            </a:r>
+            <a:r>
+              <a:rPr lang="en-US" sz="1600" dirty="0">
+                <a:latin typeface="Courier New" panose="02070309020205020404" pitchFamily="49" charset="0"/>
+                <a:cs typeface="Courier New" panose="02070309020205020404" pitchFamily="49" charset="0"/>
+              </a:rPr>
+              <a:t>=&gt;</a:t>
+            </a:r>
+            <a:r>
+              <a:rPr lang="en-US" sz="1600" dirty="0"/>
+              <a:t> tags in the </a:t>
+            </a:r>
+            <a:r>
+              <a:rPr lang="en-US" sz="1600" dirty="0" err="1">
+                <a:latin typeface="Courier New" panose="02070309020205020404" pitchFamily="49" charset="0"/>
+                <a:cs typeface="Courier New" panose="02070309020205020404" pitchFamily="49" charset="0"/>
+              </a:rPr>
+              <a:t>cesium_app</a:t>
+            </a:r>
+            <a:r>
+              <a:rPr lang="en-US" sz="1600" dirty="0">
+                <a:latin typeface="Courier New" panose="02070309020205020404" pitchFamily="49" charset="0"/>
+                <a:cs typeface="Courier New" panose="02070309020205020404" pitchFamily="49" charset="0"/>
+              </a:rPr>
+              <a:t>/index.html</a:t>
+            </a:r>
+            <a:r>
+              <a:rPr lang="en-US" sz="1600" dirty="0"/>
+              <a:t> file. </a:t>
+            </a:r>
+          </a:p>
+        </p:txBody>
+      </p:sp>
+    </p:spTree>
+    <p:extLst>
+      <p:ext uri="{BB962C8B-B14F-4D97-AF65-F5344CB8AC3E}">
+        <p14:creationId xmlns:p14="http://schemas.microsoft.com/office/powerpoint/2010/main" val="1589873302"/>
+      </p:ext>
+    </p:extLst>
+  </p:cSld>
+  <p:clrMapOvr>
+    <a:masterClrMapping/>
+  </p:clrMapOvr>
+</p:sld>
+</file>
+
+<file path=ppt/slides/slide13.xml><?xml version="1.0" encoding="utf-8"?>
+<p:sld xmlns:a="http://schemas.openxmlformats.org/drawingml/2006/main" xmlns:r="http://schemas.openxmlformats.org/officeDocument/2006/relationships" xmlns:p="http://schemas.openxmlformats.org/presentationml/2006/main">
+  <p:cSld>
+    <p:spTree>
+      <p:nvGrpSpPr>
+        <p:cNvPr id="1" name=""/>
+        <p:cNvGrpSpPr/>
+        <p:nvPr/>
+      </p:nvGrpSpPr>
+      <p:grpSpPr>
+        <a:xfrm>
+          <a:off x="0" y="0"/>
+          <a:ext cx="0" cy="0"/>
+          <a:chOff x="0" y="0"/>
+          <a:chExt cx="0" cy="0"/>
+        </a:xfrm>
+      </p:grpSpPr>
+      <p:sp>
+        <p:nvSpPr>
+          <p:cNvPr id="2" name="Title 1">
+            <a:extLst>
+              <a:ext uri="{FF2B5EF4-FFF2-40B4-BE49-F238E27FC236}">
+                <a16:creationId xmlns:a16="http://schemas.microsoft.com/office/drawing/2014/main" id="{CEE5DF50-8653-497F-9CAB-9DB134A5C6CF}"/>
+              </a:ext>
+            </a:extLst>
+          </p:cNvPr>
+          <p:cNvSpPr>
+            <a:spLocks noGrp="1"/>
+          </p:cNvSpPr>
+          <p:nvPr>
+            <p:ph type="title"/>
+          </p:nvPr>
+        </p:nvSpPr>
+        <p:spPr/>
+        <p:txBody>
+          <a:bodyPr/>
+          <a:lstStyle/>
+          <a:p>
+            <a:r>
+              <a:rPr lang="en-US" dirty="0"/>
+              <a:t>Cesium App</a:t>
+            </a:r>
+          </a:p>
+        </p:txBody>
+      </p:sp>
+      <p:pic>
+        <p:nvPicPr>
+          <p:cNvPr id="5" name="Picture 4">
+            <a:extLst>
+              <a:ext uri="{FF2B5EF4-FFF2-40B4-BE49-F238E27FC236}">
+                <a16:creationId xmlns:a16="http://schemas.microsoft.com/office/drawing/2014/main" id="{601A9BCE-FF78-43C6-AFEE-8FF7856A7D69}"/>
+              </a:ext>
+            </a:extLst>
+          </p:cNvPr>
+          <p:cNvPicPr>
+            <a:picLocks noChangeAspect="1"/>
+          </p:cNvPicPr>
+          <p:nvPr/>
+        </p:nvPicPr>
+        <p:blipFill>
+          <a:blip r:embed="rId2"/>
+          <a:stretch>
+            <a:fillRect/>
+          </a:stretch>
+        </p:blipFill>
+        <p:spPr>
+          <a:xfrm>
+            <a:off x="3934922" y="1615508"/>
+            <a:ext cx="8072497" cy="3440274"/>
+          </a:xfrm>
+          <a:prstGeom prst="rect">
+            <a:avLst/>
+          </a:prstGeom>
+        </p:spPr>
+      </p:pic>
+      <p:sp>
+        <p:nvSpPr>
+          <p:cNvPr id="6" name="TextBox 5">
+            <a:extLst>
+              <a:ext uri="{FF2B5EF4-FFF2-40B4-BE49-F238E27FC236}">
+                <a16:creationId xmlns:a16="http://schemas.microsoft.com/office/drawing/2014/main" id="{5BAEBB7C-63CB-4D0E-BA44-86AD308F8641}"/>
+              </a:ext>
+            </a:extLst>
+          </p:cNvPr>
+          <p:cNvSpPr txBox="1"/>
+          <p:nvPr/>
+        </p:nvSpPr>
+        <p:spPr>
+          <a:xfrm>
+            <a:off x="763480" y="1690688"/>
+            <a:ext cx="3312480" cy="1200329"/>
+          </a:xfrm>
+          <a:prstGeom prst="rect">
+            <a:avLst/>
+          </a:prstGeom>
+          <a:noFill/>
+        </p:spPr>
+        <p:txBody>
+          <a:bodyPr wrap="square" rtlCol="0">
+            <a:spAutoFit/>
+          </a:bodyPr>
+          <a:lstStyle/>
+          <a:p>
+            <a:r>
+              <a:rPr lang="en-US" b="1" dirty="0"/>
+              <a:t>TODO</a:t>
+            </a:r>
+          </a:p>
+          <a:p>
+            <a:pPr marL="285750" indent="-285750">
+              <a:buFont typeface="Arial" panose="020B0604020202020204" pitchFamily="34" charset="0"/>
+              <a:buChar char="•"/>
+            </a:pPr>
+            <a:r>
+              <a:rPr lang="en-US" dirty="0"/>
+              <a:t>Add enter widget for user to enter their token key. Current setup uses the default key.</a:t>
+            </a:r>
+          </a:p>
+        </p:txBody>
+      </p:sp>
+      <p:cxnSp>
+        <p:nvCxnSpPr>
+          <p:cNvPr id="7" name="Straight Arrow Connector 6">
+            <a:extLst>
+              <a:ext uri="{FF2B5EF4-FFF2-40B4-BE49-F238E27FC236}">
+                <a16:creationId xmlns:a16="http://schemas.microsoft.com/office/drawing/2014/main" id="{751E57CD-B606-4F5E-8C2D-DA41BBB3FE7B}"/>
+              </a:ext>
+            </a:extLst>
+          </p:cNvPr>
+          <p:cNvCxnSpPr>
+            <a:cxnSpLocks/>
+          </p:cNvCxnSpPr>
+          <p:nvPr/>
+        </p:nvCxnSpPr>
+        <p:spPr>
+          <a:xfrm flipV="1">
+            <a:off x="8726749" y="4838330"/>
+            <a:ext cx="754602" cy="1052776"/>
+          </a:xfrm>
+          <a:prstGeom prst="straightConnector1">
+            <a:avLst/>
+          </a:prstGeom>
+          <a:ln>
+            <a:tailEnd type="triangle"/>
+          </a:ln>
+        </p:spPr>
+        <p:style>
+          <a:lnRef idx="1">
+            <a:schemeClr val="accent1"/>
+          </a:lnRef>
+          <a:fillRef idx="0">
+            <a:schemeClr val="accent1"/>
+          </a:fillRef>
+          <a:effectRef idx="0">
+            <a:schemeClr val="accent1"/>
+          </a:effectRef>
+          <a:fontRef idx="minor">
+            <a:schemeClr val="tx1"/>
+          </a:fontRef>
+        </p:style>
+      </p:cxnSp>
+      <p:sp>
+        <p:nvSpPr>
+          <p:cNvPr id="8" name="TextBox 7">
+            <a:extLst>
+              <a:ext uri="{FF2B5EF4-FFF2-40B4-BE49-F238E27FC236}">
+                <a16:creationId xmlns:a16="http://schemas.microsoft.com/office/drawing/2014/main" id="{3856E143-2DF0-4817-BECA-AD1C7F0FB44C}"/>
+              </a:ext>
+            </a:extLst>
+          </p:cNvPr>
+          <p:cNvSpPr txBox="1"/>
+          <p:nvPr/>
+        </p:nvSpPr>
+        <p:spPr>
+          <a:xfrm>
+            <a:off x="7888307" y="5810663"/>
+            <a:ext cx="1676883" cy="307777"/>
+          </a:xfrm>
+          <a:prstGeom prst="rect">
+            <a:avLst/>
+          </a:prstGeom>
+          <a:noFill/>
+        </p:spPr>
+        <p:txBody>
+          <a:bodyPr wrap="square">
+            <a:spAutoFit/>
+          </a:bodyPr>
+          <a:lstStyle/>
+          <a:p>
+            <a:r>
+              <a:rPr lang="en-US" sz="1400" dirty="0">
+                <a:cs typeface="Courier New" panose="02070309020205020404" pitchFamily="49" charset="0"/>
+              </a:rPr>
+              <a:t>Cesium plot</a:t>
+            </a:r>
+            <a:endParaRPr lang="en-US" sz="1400" dirty="0"/>
+          </a:p>
+        </p:txBody>
+      </p:sp>
+    </p:spTree>
+    <p:extLst>
+      <p:ext uri="{BB962C8B-B14F-4D97-AF65-F5344CB8AC3E}">
+        <p14:creationId xmlns:p14="http://schemas.microsoft.com/office/powerpoint/2010/main" val="323878993"/>
+      </p:ext>
+    </p:extLst>
+  </p:cSld>
+  <p:clrMapOvr>
+    <a:masterClrMapping/>
+  </p:clrMapOvr>
+</p:sld>
+</file>
+
+<file path=ppt/slides/slide14.xml><?xml version="1.0" encoding="utf-8"?>
+<p:sld xmlns:a="http://schemas.openxmlformats.org/drawingml/2006/main" xmlns:r="http://schemas.openxmlformats.org/officeDocument/2006/relationships" xmlns:p="http://schemas.openxmlformats.org/presentationml/2006/main">
+  <p:cSld>
+    <p:spTree>
+      <p:nvGrpSpPr>
+        <p:cNvPr id="1" name=""/>
+        <p:cNvGrpSpPr/>
+        <p:nvPr/>
+      </p:nvGrpSpPr>
+      <p:grpSpPr>
+        <a:xfrm>
+          <a:off x="0" y="0"/>
+          <a:ext cx="0" cy="0"/>
+          <a:chOff x="0" y="0"/>
+          <a:chExt cx="0" cy="0"/>
+        </a:xfrm>
+      </p:grpSpPr>
+      <p:sp>
+        <p:nvSpPr>
+          <p:cNvPr id="2" name="Title 1">
+            <a:extLst>
+              <a:ext uri="{FF2B5EF4-FFF2-40B4-BE49-F238E27FC236}">
+                <a16:creationId xmlns:a16="http://schemas.microsoft.com/office/drawing/2014/main" id="{6797761F-E118-4A36-93CE-BB04458655F0}"/>
+              </a:ext>
+            </a:extLst>
+          </p:cNvPr>
+          <p:cNvSpPr>
+            <a:spLocks noGrp="1"/>
+          </p:cNvSpPr>
+          <p:nvPr>
+            <p:ph type="title"/>
+          </p:nvPr>
+        </p:nvSpPr>
+        <p:spPr/>
+        <p:txBody>
+          <a:bodyPr/>
+          <a:lstStyle/>
+          <a:p>
+            <a:r>
+              <a:rPr lang="en-US" dirty="0"/>
+              <a:t>Cesium App</a:t>
+            </a:r>
+          </a:p>
+        </p:txBody>
+      </p:sp>
+      <p:sp>
+        <p:nvSpPr>
+          <p:cNvPr id="4" name="TextBox 3">
+            <a:extLst>
+              <a:ext uri="{FF2B5EF4-FFF2-40B4-BE49-F238E27FC236}">
+                <a16:creationId xmlns:a16="http://schemas.microsoft.com/office/drawing/2014/main" id="{75BEE10F-0680-4D26-961C-48530D4C4543}"/>
+              </a:ext>
+            </a:extLst>
+          </p:cNvPr>
+          <p:cNvSpPr txBox="1"/>
+          <p:nvPr/>
+        </p:nvSpPr>
+        <p:spPr>
+          <a:xfrm>
+            <a:off x="518604" y="1535989"/>
+            <a:ext cx="10083263" cy="3693319"/>
+          </a:xfrm>
+          <a:prstGeom prst="rect">
+            <a:avLst/>
+          </a:prstGeom>
+          <a:noFill/>
+        </p:spPr>
+        <p:txBody>
+          <a:bodyPr wrap="square">
+            <a:spAutoFit/>
+          </a:bodyPr>
+          <a:lstStyle/>
+          <a:p>
+            <a:r>
+              <a:rPr lang="en-US" dirty="0"/>
+              <a:t>Following resources are useful in working with the </a:t>
+            </a:r>
+            <a:r>
+              <a:rPr lang="en-US" dirty="0" err="1"/>
+              <a:t>CesiumJS</a:t>
+            </a:r>
+            <a:r>
+              <a:rPr lang="en-US" dirty="0"/>
+              <a:t> platform.</a:t>
+            </a:r>
+          </a:p>
+          <a:p>
+            <a:pPr marL="285750" indent="-285750">
+              <a:buFont typeface="Arial" panose="020B0604020202020204" pitchFamily="34" charset="0"/>
+              <a:buChar char="•"/>
+            </a:pPr>
+            <a:r>
+              <a:rPr lang="en-US" dirty="0">
+                <a:hlinkClick r:id="rId2"/>
+              </a:rPr>
+              <a:t>https://github.com/CesiumGS</a:t>
+            </a:r>
+            <a:endParaRPr lang="en-US" dirty="0"/>
+          </a:p>
+          <a:p>
+            <a:pPr marL="285750" indent="-285750">
+              <a:buFont typeface="Arial" panose="020B0604020202020204" pitchFamily="34" charset="0"/>
+              <a:buChar char="•"/>
+            </a:pPr>
+            <a:r>
+              <a:rPr lang="en-US">
+                <a:hlinkClick r:id="rId3"/>
+              </a:rPr>
+              <a:t>https://github.com/CesiumGS/cesium/wiki</a:t>
+            </a:r>
+            <a:endParaRPr lang="en-US" dirty="0"/>
+          </a:p>
+          <a:p>
+            <a:pPr marL="285750" indent="-285750">
+              <a:buFont typeface="Arial" panose="020B0604020202020204" pitchFamily="34" charset="0"/>
+              <a:buChar char="•"/>
+            </a:pPr>
+            <a:r>
+              <a:rPr lang="en-US" dirty="0">
+                <a:hlinkClick r:id="rId4"/>
+              </a:rPr>
+              <a:t>https://github.com/CesiumGS/cesium-workshop</a:t>
+            </a:r>
+            <a:endParaRPr lang="en-US" dirty="0"/>
+          </a:p>
+          <a:p>
+            <a:pPr marL="285750" indent="-285750">
+              <a:buFont typeface="Arial" panose="020B0604020202020204" pitchFamily="34" charset="0"/>
+              <a:buChar char="•"/>
+            </a:pPr>
+            <a:r>
+              <a:rPr lang="en-US" dirty="0">
+                <a:hlinkClick r:id="rId5"/>
+              </a:rPr>
+              <a:t>https://sandcastle.cesium.com/</a:t>
+            </a:r>
+            <a:endParaRPr lang="en-US" dirty="0"/>
+          </a:p>
+          <a:p>
+            <a:pPr marL="285750" indent="-285750">
+              <a:buFont typeface="Arial" panose="020B0604020202020204" pitchFamily="34" charset="0"/>
+              <a:buChar char="•"/>
+            </a:pPr>
+            <a:r>
+              <a:rPr lang="en-US" dirty="0">
+                <a:hlinkClick r:id="rId6"/>
+              </a:rPr>
+              <a:t>https://sandcastle.cesium.com/?src=CZML.html</a:t>
+            </a:r>
+            <a:endParaRPr lang="en-US" dirty="0"/>
+          </a:p>
+          <a:p>
+            <a:pPr marL="285750" indent="-285750">
+              <a:buFont typeface="Arial" panose="020B0604020202020204" pitchFamily="34" charset="0"/>
+              <a:buChar char="•"/>
+            </a:pPr>
+            <a:r>
+              <a:rPr lang="en-US" dirty="0">
+                <a:hlinkClick r:id="rId7"/>
+              </a:rPr>
+              <a:t>https://github.com/AnalyticalGraphicsInc/czml-writer/wiki/CZML-Structure</a:t>
+            </a:r>
+            <a:endParaRPr lang="en-US" dirty="0"/>
+          </a:p>
+          <a:p>
+            <a:pPr marL="285750" indent="-285750">
+              <a:buFont typeface="Arial" panose="020B0604020202020204" pitchFamily="34" charset="0"/>
+              <a:buChar char="•"/>
+            </a:pPr>
+            <a:r>
+              <a:rPr lang="en-US" dirty="0">
+                <a:hlinkClick r:id="rId8"/>
+              </a:rPr>
+              <a:t>https://github.com/AnalyticalGraphicsInc/czml-writer/wiki/Packet</a:t>
+            </a:r>
+            <a:endParaRPr lang="en-US" dirty="0"/>
+          </a:p>
+          <a:p>
+            <a:pPr marL="285750" indent="-285750">
+              <a:buFont typeface="Arial" panose="020B0604020202020204" pitchFamily="34" charset="0"/>
+              <a:buChar char="•"/>
+            </a:pPr>
+            <a:r>
+              <a:rPr lang="en-US" dirty="0">
+                <a:hlinkClick r:id="rId9"/>
+              </a:rPr>
+              <a:t>https://github.com/CesiumGS/cesium/tree/main/Apps/SampleData</a:t>
+            </a:r>
+            <a:endParaRPr lang="en-US" dirty="0"/>
+          </a:p>
+          <a:p>
+            <a:pPr marL="285750" indent="-285750">
+              <a:buFont typeface="Arial" panose="020B0604020202020204" pitchFamily="34" charset="0"/>
+              <a:buChar char="•"/>
+            </a:pPr>
+            <a:r>
+              <a:rPr lang="en-US" dirty="0">
+                <a:hlinkClick r:id="rId10"/>
+              </a:rPr>
+              <a:t>https://help.agi.com/AGIComponents/html/Cesium.htm</a:t>
+            </a:r>
+            <a:endParaRPr lang="en-US" dirty="0"/>
+          </a:p>
+          <a:p>
+            <a:pPr marL="285750" indent="-285750">
+              <a:buFont typeface="Arial" panose="020B0604020202020204" pitchFamily="34" charset="0"/>
+              <a:buChar char="•"/>
+            </a:pPr>
+            <a:r>
+              <a:rPr lang="en-US" dirty="0">
+                <a:hlinkClick r:id="rId11"/>
+              </a:rPr>
+              <a:t>https://github.com/AnalyticalGraphicsInc/czml-writer</a:t>
+            </a:r>
+            <a:endParaRPr lang="en-US" dirty="0"/>
+          </a:p>
+          <a:p>
+            <a:pPr marL="285750" indent="-285750">
+              <a:buFont typeface="Arial" panose="020B0604020202020204" pitchFamily="34" charset="0"/>
+              <a:buChar char="•"/>
+            </a:pPr>
+            <a:r>
+              <a:rPr lang="en-US" dirty="0">
+                <a:hlinkClick r:id="rId12"/>
+              </a:rPr>
+              <a:t>https://stackoverflow.com/questions/59035298/realtime-interaction-with-cesiumjs</a:t>
+            </a:r>
+            <a:endParaRPr lang="en-US" dirty="0"/>
+          </a:p>
+          <a:p>
+            <a:pPr marL="285750" indent="-285750">
+              <a:buFont typeface="Arial" panose="020B0604020202020204" pitchFamily="34" charset="0"/>
+              <a:buChar char="•"/>
+            </a:pPr>
+            <a:endParaRPr lang="en-US" dirty="0"/>
+          </a:p>
+        </p:txBody>
+      </p:sp>
+    </p:spTree>
+    <p:extLst>
+      <p:ext uri="{BB962C8B-B14F-4D97-AF65-F5344CB8AC3E}">
+        <p14:creationId xmlns:p14="http://schemas.microsoft.com/office/powerpoint/2010/main" val="2996798095"/>
+      </p:ext>
+    </p:extLst>
+  </p:cSld>
+  <p:clrMapOvr>
+    <a:masterClrMapping/>
+  </p:clrMapOvr>
+</p:sld>
+</file>
+
+<file path=ppt/slides/slide15.xml><?xml version="1.0" encoding="utf-8"?>
+<p:sld xmlns:a="http://schemas.openxmlformats.org/drawingml/2006/main" xmlns:r="http://schemas.openxmlformats.org/officeDocument/2006/relationships" xmlns:p="http://schemas.openxmlformats.org/presentationml/2006/main">
+  <p:cSld>
+    <p:spTree>
+      <p:nvGrpSpPr>
+        <p:cNvPr id="1" name=""/>
+        <p:cNvGrpSpPr/>
+        <p:nvPr/>
+      </p:nvGrpSpPr>
+      <p:grpSpPr>
+        <a:xfrm>
+          <a:off x="0" y="0"/>
+          <a:ext cx="0" cy="0"/>
+          <a:chOff x="0" y="0"/>
+          <a:chExt cx="0" cy="0"/>
+        </a:xfrm>
+      </p:grpSpPr>
+      <p:sp>
+        <p:nvSpPr>
+          <p:cNvPr id="2" name="Title 1">
+            <a:extLst>
+              <a:ext uri="{FF2B5EF4-FFF2-40B4-BE49-F238E27FC236}">
+                <a16:creationId xmlns:a16="http://schemas.microsoft.com/office/drawing/2014/main" id="{6797761F-E118-4A36-93CE-BB04458655F0}"/>
+              </a:ext>
+            </a:extLst>
+          </p:cNvPr>
+          <p:cNvSpPr>
+            <a:spLocks noGrp="1"/>
+          </p:cNvSpPr>
+          <p:nvPr>
+            <p:ph type="title"/>
+          </p:nvPr>
+        </p:nvSpPr>
+        <p:spPr/>
+        <p:txBody>
+          <a:bodyPr/>
+          <a:lstStyle/>
+          <a:p>
+            <a:r>
+              <a:rPr lang="en-US" dirty="0"/>
+              <a:t>Cesium App, visglobeframe.py</a:t>
+            </a:r>
+          </a:p>
+        </p:txBody>
+      </p:sp>
+      <p:sp>
+        <p:nvSpPr>
+          <p:cNvPr id="4" name="TextBox 3">
+            <a:extLst>
+              <a:ext uri="{FF2B5EF4-FFF2-40B4-BE49-F238E27FC236}">
+                <a16:creationId xmlns:a16="http://schemas.microsoft.com/office/drawing/2014/main" id="{75BEE10F-0680-4D26-961C-48530D4C4543}"/>
+              </a:ext>
+            </a:extLst>
+          </p:cNvPr>
+          <p:cNvSpPr txBox="1"/>
+          <p:nvPr/>
+        </p:nvSpPr>
+        <p:spPr>
+          <a:xfrm>
+            <a:off x="518604" y="1535989"/>
+            <a:ext cx="10083263" cy="4524315"/>
+          </a:xfrm>
+          <a:prstGeom prst="rect">
+            <a:avLst/>
+          </a:prstGeom>
+          <a:noFill/>
+        </p:spPr>
+        <p:txBody>
+          <a:bodyPr wrap="square">
+            <a:spAutoFit/>
+          </a:bodyPr>
+          <a:lstStyle/>
+          <a:p>
+            <a:r>
+              <a:rPr lang="en-US" i="1" dirty="0"/>
+              <a:t>Code structure</a:t>
+            </a:r>
+          </a:p>
+          <a:p>
+            <a:endParaRPr lang="en-US" dirty="0"/>
+          </a:p>
+          <a:p>
+            <a:pPr marL="285750" indent="-285750">
+              <a:buFont typeface="Arial" panose="020B0604020202020204" pitchFamily="34" charset="0"/>
+              <a:buChar char="•"/>
+            </a:pPr>
+            <a:r>
+              <a:rPr lang="en-US" dirty="0"/>
+              <a:t>The interaction to the app is through CZML files. CZML files corresponding to the simulated mission is prepared by the </a:t>
+            </a:r>
+            <a:r>
+              <a:rPr lang="en-US" dirty="0" err="1">
+                <a:latin typeface="Courier New" panose="02070309020205020404" pitchFamily="49" charset="0"/>
+                <a:cs typeface="Courier New" panose="02070309020205020404" pitchFamily="49" charset="0"/>
+              </a:rPr>
+              <a:t>visglobeframe</a:t>
+            </a:r>
+            <a:r>
+              <a:rPr lang="en-US" dirty="0"/>
+              <a:t> module.</a:t>
+            </a:r>
+          </a:p>
+          <a:p>
+            <a:pPr marL="285750" indent="-285750">
+              <a:buFont typeface="Arial" panose="020B0604020202020204" pitchFamily="34" charset="0"/>
+              <a:buChar char="•"/>
+            </a:pPr>
+            <a:r>
+              <a:rPr lang="en-US" dirty="0"/>
+              <a:t>CZML packet templates corresponding to different plotting functions are available in the directory </a:t>
+            </a:r>
+            <a:r>
+              <a:rPr lang="en-US" dirty="0" err="1">
+                <a:latin typeface="Courier New" panose="02070309020205020404" pitchFamily="49" charset="0"/>
+                <a:cs typeface="Courier New" panose="02070309020205020404" pitchFamily="49" charset="0"/>
+              </a:rPr>
+              <a:t>eosim</a:t>
+            </a:r>
+            <a:r>
+              <a:rPr lang="en-US" dirty="0">
+                <a:latin typeface="Courier New" panose="02070309020205020404" pitchFamily="49" charset="0"/>
+                <a:cs typeface="Courier New" panose="02070309020205020404" pitchFamily="49" charset="0"/>
+              </a:rPr>
+              <a:t>/</a:t>
+            </a:r>
+            <a:r>
+              <a:rPr lang="en-US" dirty="0" err="1">
+                <a:latin typeface="Courier New" panose="02070309020205020404" pitchFamily="49" charset="0"/>
+                <a:cs typeface="Courier New" panose="02070309020205020404" pitchFamily="49" charset="0"/>
+              </a:rPr>
+              <a:t>gui</a:t>
+            </a:r>
+            <a:r>
+              <a:rPr lang="en-US" dirty="0">
+                <a:latin typeface="Courier New" panose="02070309020205020404" pitchFamily="49" charset="0"/>
+                <a:cs typeface="Courier New" panose="02070309020205020404" pitchFamily="49" charset="0"/>
+              </a:rPr>
+              <a:t>/visualize/</a:t>
+            </a:r>
+            <a:r>
+              <a:rPr lang="en-US" dirty="0" err="1">
+                <a:latin typeface="Courier New" panose="02070309020205020404" pitchFamily="49" charset="0"/>
+                <a:cs typeface="Courier New" panose="02070309020205020404" pitchFamily="49" charset="0"/>
+              </a:rPr>
+              <a:t>czml_templates</a:t>
+            </a:r>
+            <a:r>
+              <a:rPr lang="en-US" dirty="0">
+                <a:latin typeface="Courier New" panose="02070309020205020404" pitchFamily="49" charset="0"/>
+                <a:cs typeface="Courier New" panose="02070309020205020404" pitchFamily="49" charset="0"/>
+              </a:rPr>
+              <a:t>/</a:t>
+            </a:r>
+          </a:p>
+          <a:p>
+            <a:pPr marL="285750" indent="-285750">
+              <a:buFont typeface="Arial" panose="020B0604020202020204" pitchFamily="34" charset="0"/>
+              <a:buChar char="•"/>
+            </a:pPr>
+            <a:r>
+              <a:rPr lang="en-US" dirty="0"/>
+              <a:t>A copy of the template is made and filled with the actual plot-values. For example, to configure the mission clock, the </a:t>
+            </a:r>
+            <a:r>
+              <a:rPr lang="en-US" dirty="0" err="1">
+                <a:latin typeface="Courier New" panose="02070309020205020404" pitchFamily="49" charset="0"/>
+                <a:cs typeface="Courier New" panose="02070309020205020404" pitchFamily="49" charset="0"/>
+              </a:rPr>
+              <a:t>clock_template.json</a:t>
+            </a:r>
+            <a:r>
+              <a:rPr lang="en-US" dirty="0">
+                <a:latin typeface="Courier New" panose="02070309020205020404" pitchFamily="49" charset="0"/>
+                <a:cs typeface="Courier New" panose="02070309020205020404" pitchFamily="49" charset="0"/>
+              </a:rPr>
+              <a:t> </a:t>
+            </a:r>
+            <a:r>
+              <a:rPr lang="en-US" dirty="0"/>
+              <a:t>is copied to a python-</a:t>
+            </a:r>
+            <a:r>
+              <a:rPr lang="en-US" dirty="0" err="1"/>
+              <a:t>dict</a:t>
+            </a:r>
+            <a:r>
+              <a:rPr lang="en-US" dirty="0"/>
+              <a:t> and the </a:t>
+            </a:r>
+            <a:r>
+              <a:rPr lang="en-US" dirty="0" err="1">
+                <a:latin typeface="Courier New" panose="02070309020205020404" pitchFamily="49" charset="0"/>
+                <a:cs typeface="Courier New" panose="02070309020205020404" pitchFamily="49" charset="0"/>
+              </a:rPr>
+              <a:t>currentTime</a:t>
+            </a:r>
+            <a:r>
+              <a:rPr lang="en-US" dirty="0"/>
+              <a:t>, </a:t>
+            </a:r>
+            <a:r>
+              <a:rPr lang="en-US" dirty="0">
+                <a:latin typeface="Courier New" panose="02070309020205020404" pitchFamily="49" charset="0"/>
+                <a:cs typeface="Courier New" panose="02070309020205020404" pitchFamily="49" charset="0"/>
+              </a:rPr>
+              <a:t>interval</a:t>
+            </a:r>
+            <a:r>
+              <a:rPr lang="en-US" dirty="0"/>
+              <a:t> key-values are replaced with the mission specific values. </a:t>
+            </a:r>
+          </a:p>
+          <a:p>
+            <a:pPr marL="285750" indent="-285750">
+              <a:buFont typeface="Arial" panose="020B0604020202020204" pitchFamily="34" charset="0"/>
+              <a:buChar char="•"/>
+            </a:pPr>
+            <a:r>
+              <a:rPr lang="en-US" dirty="0"/>
+              <a:t>The </a:t>
+            </a:r>
+            <a:r>
+              <a:rPr lang="en-US" dirty="0" err="1">
+                <a:latin typeface="Courier New" panose="02070309020205020404" pitchFamily="49" charset="0"/>
+                <a:cs typeface="Courier New" panose="02070309020205020404" pitchFamily="49" charset="0"/>
+              </a:rPr>
+              <a:t>VisGlobeFrame.build_czmlpkts_for_mission_background</a:t>
+            </a:r>
+            <a:r>
+              <a:rPr lang="en-US" dirty="0">
+                <a:latin typeface="Courier New" panose="02070309020205020404" pitchFamily="49" charset="0"/>
+                <a:cs typeface="Courier New" panose="02070309020205020404" pitchFamily="49" charset="0"/>
+              </a:rPr>
+              <a:t> </a:t>
+            </a:r>
+            <a:r>
+              <a:rPr lang="en-US" dirty="0"/>
+              <a:t>function builds the CZML packets corresponding to the mission epoch, duration, satellite-orbits, ground-station and coverage-grid information.</a:t>
+            </a:r>
+          </a:p>
+          <a:p>
+            <a:pPr marL="285750" indent="-285750">
+              <a:buFont typeface="Arial" panose="020B0604020202020204" pitchFamily="34" charset="0"/>
+              <a:buChar char="•"/>
+            </a:pPr>
+            <a:r>
+              <a:rPr lang="en-US" dirty="0"/>
+              <a:t>The </a:t>
+            </a:r>
+            <a:r>
+              <a:rPr lang="en-US" dirty="0">
+                <a:latin typeface="Courier New" panose="02070309020205020404" pitchFamily="49" charset="0"/>
+                <a:cs typeface="Courier New" panose="02070309020205020404" pitchFamily="49" charset="0"/>
+              </a:rPr>
+              <a:t>VisGlobeFrame.build_czmlpkts_for_ground_stn_contact_opportunities </a:t>
+            </a:r>
+            <a:r>
+              <a:rPr lang="en-US" dirty="0"/>
+              <a:t>and the </a:t>
+            </a:r>
+            <a:r>
+              <a:rPr lang="en-US" dirty="0" err="1">
+                <a:latin typeface="Courier New" panose="02070309020205020404" pitchFamily="49" charset="0"/>
+                <a:cs typeface="Courier New" panose="02070309020205020404" pitchFamily="49" charset="0"/>
+              </a:rPr>
+              <a:t>VisGlobeFrame.build_czmlpkts_for_intersat_contact_opportunities</a:t>
+            </a:r>
+            <a:r>
+              <a:rPr lang="en-US" dirty="0">
+                <a:latin typeface="Courier New" panose="02070309020205020404" pitchFamily="49" charset="0"/>
+                <a:cs typeface="Courier New" panose="02070309020205020404" pitchFamily="49" charset="0"/>
+              </a:rPr>
+              <a:t> </a:t>
+            </a:r>
+            <a:r>
+              <a:rPr lang="en-US" dirty="0"/>
+              <a:t>functions build the CZML packets corresponding to ground-station contact opportunities and intersatellite contact opportunities.</a:t>
+            </a:r>
+          </a:p>
+        </p:txBody>
+      </p:sp>
+    </p:spTree>
+    <p:extLst>
+      <p:ext uri="{BB962C8B-B14F-4D97-AF65-F5344CB8AC3E}">
+        <p14:creationId xmlns:p14="http://schemas.microsoft.com/office/powerpoint/2010/main" val="1687507057"/>
+      </p:ext>
+    </p:extLst>
+  </p:cSld>
+  <p:clrMapOvr>
+    <a:masterClrMapping/>
+  </p:clrMapOvr>
+</p:sld>
+</file>
+
+<file path=ppt/slides/slide16.xml><?xml version="1.0" encoding="utf-8"?>
+<p:sld xmlns:a="http://schemas.openxmlformats.org/drawingml/2006/main" xmlns:r="http://schemas.openxmlformats.org/officeDocument/2006/relationships" xmlns:p="http://schemas.openxmlformats.org/presentationml/2006/main">
+  <p:cSld>
+    <p:spTree>
+      <p:nvGrpSpPr>
+        <p:cNvPr id="1" name=""/>
+        <p:cNvGrpSpPr/>
+        <p:nvPr/>
+      </p:nvGrpSpPr>
+      <p:grpSpPr>
+        <a:xfrm>
+          <a:off x="0" y="0"/>
+          <a:ext cx="0" cy="0"/>
+          <a:chOff x="0" y="0"/>
+          <a:chExt cx="0" cy="0"/>
+        </a:xfrm>
+      </p:grpSpPr>
+      <p:sp>
+        <p:nvSpPr>
+          <p:cNvPr id="2" name="Title 1">
+            <a:extLst>
+              <a:ext uri="{FF2B5EF4-FFF2-40B4-BE49-F238E27FC236}">
                 <a16:creationId xmlns:a16="http://schemas.microsoft.com/office/drawing/2014/main" id="{DF4BB113-B8B2-4A70-AFE7-29FF8386057F}"/>
               </a:ext>
             </a:extLst>
@@ -4687,7 +5884,7 @@
 </p:sld>
 </file>
 
-<file path=ppt/slides/slide13.xml><?xml version="1.0" encoding="utf-8"?>
+<file path=ppt/slides/slide17.xml><?xml version="1.0" encoding="utf-8"?>
 <p:sld xmlns:a="http://schemas.openxmlformats.org/drawingml/2006/main" xmlns:r="http://schemas.openxmlformats.org/officeDocument/2006/relationships" xmlns:p="http://schemas.openxmlformats.org/presentationml/2006/main">
   <p:cSld>
     <p:spTree>
@@ -5243,7 +6440,7 @@
 </p:sld>
 </file>
 
-<file path=ppt/slides/slide14.xml><?xml version="1.0" encoding="utf-8"?>
+<file path=ppt/slides/slide18.xml><?xml version="1.0" encoding="utf-8"?>
 <p:sld xmlns:a="http://schemas.openxmlformats.org/drawingml/2006/main" xmlns:r="http://schemas.openxmlformats.org/officeDocument/2006/relationships" xmlns:p="http://schemas.openxmlformats.org/presentationml/2006/main">
   <p:cSld>
     <p:spTree>
@@ -5977,7 +7174,7 @@
 </p:sld>
 </file>
 
-<file path=ppt/slides/slide15.xml><?xml version="1.0" encoding="utf-8"?>
+<file path=ppt/slides/slide19.xml><?xml version="1.0" encoding="utf-8"?>
 <p:sld xmlns:a="http://schemas.openxmlformats.org/drawingml/2006/main" xmlns:r="http://schemas.openxmlformats.org/officeDocument/2006/relationships" xmlns:p="http://schemas.openxmlformats.org/presentationml/2006/main">
   <p:cSld>
     <p:spTree>
@@ -6717,138 +7914,6 @@
     <p:extLst>
       <p:ext uri="{BB962C8B-B14F-4D97-AF65-F5344CB8AC3E}">
         <p14:creationId xmlns:p14="http://schemas.microsoft.com/office/powerpoint/2010/main" val="2004027451"/>
-      </p:ext>
-    </p:extLst>
-  </p:cSld>
-  <p:clrMapOvr>
-    <a:masterClrMapping/>
-  </p:clrMapOvr>
-</p:sld>
-</file>
-
-<file path=ppt/slides/slide16.xml><?xml version="1.0" encoding="utf-8"?>
-<p:sld xmlns:a="http://schemas.openxmlformats.org/drawingml/2006/main" xmlns:r="http://schemas.openxmlformats.org/officeDocument/2006/relationships" xmlns:p="http://schemas.openxmlformats.org/presentationml/2006/main">
-  <p:cSld>
-    <p:spTree>
-      <p:nvGrpSpPr>
-        <p:cNvPr id="1" name=""/>
-        <p:cNvGrpSpPr/>
-        <p:nvPr/>
-      </p:nvGrpSpPr>
-      <p:grpSpPr>
-        <a:xfrm>
-          <a:off x="0" y="0"/>
-          <a:ext cx="0" cy="0"/>
-          <a:chOff x="0" y="0"/>
-          <a:chExt cx="0" cy="0"/>
-        </a:xfrm>
-      </p:grpSpPr>
-      <p:sp>
-        <p:nvSpPr>
-          <p:cNvPr id="2" name="Title 1">
-            <a:extLst>
-              <a:ext uri="{FF2B5EF4-FFF2-40B4-BE49-F238E27FC236}">
-                <a16:creationId xmlns:a16="http://schemas.microsoft.com/office/drawing/2014/main" id="{EFF3126B-80BE-4BB5-9D53-6570BBEAB642}"/>
-              </a:ext>
-            </a:extLst>
-          </p:cNvPr>
-          <p:cNvSpPr>
-            <a:spLocks noGrp="1"/>
-          </p:cNvSpPr>
-          <p:nvPr>
-            <p:ph type="title"/>
-          </p:nvPr>
-        </p:nvSpPr>
-        <p:spPr/>
-        <p:txBody>
-          <a:bodyPr/>
-          <a:lstStyle/>
-          <a:p>
-            <a:r>
-              <a:rPr lang="en-US" dirty="0"/>
-              <a:t>General notes on coding style</a:t>
-            </a:r>
-          </a:p>
-        </p:txBody>
-      </p:sp>
-      <p:sp>
-        <p:nvSpPr>
-          <p:cNvPr id="4" name="Content Placeholder 2">
-            <a:extLst>
-              <a:ext uri="{FF2B5EF4-FFF2-40B4-BE49-F238E27FC236}">
-                <a16:creationId xmlns:a16="http://schemas.microsoft.com/office/drawing/2014/main" id="{B02985F4-C396-499F-94AD-B40C7CCEA073}"/>
-              </a:ext>
-            </a:extLst>
-          </p:cNvPr>
-          <p:cNvSpPr>
-            <a:spLocks noGrp="1"/>
-          </p:cNvSpPr>
-          <p:nvPr>
-            <p:ph idx="1"/>
-          </p:nvPr>
-        </p:nvSpPr>
-        <p:spPr>
-          <a:xfrm>
-            <a:off x="838201" y="1825624"/>
-            <a:ext cx="5461000" cy="3366136"/>
-          </a:xfrm>
-        </p:spPr>
-        <p:txBody>
-          <a:bodyPr>
-            <a:normAutofit/>
-          </a:bodyPr>
-          <a:lstStyle/>
-          <a:p>
-            <a:r>
-              <a:rPr lang="en-US" sz="1800"/>
-              <a:t>Frames </a:t>
-            </a:r>
-            <a:r>
-              <a:rPr lang="en-US" sz="1800" dirty="0"/>
-              <a:t>may be defined as classes. They materialize at the point in the program when an object of that class is instantiated.</a:t>
-            </a:r>
-          </a:p>
-          <a:p>
-            <a:r>
-              <a:rPr lang="en-US" sz="1800" dirty="0"/>
-              <a:t>Example: </a:t>
-            </a:r>
-            <a:r>
-              <a:rPr lang="en-US" sz="1800" dirty="0" err="1"/>
-              <a:t>WelcomeFrame</a:t>
-            </a:r>
-            <a:r>
-              <a:rPr lang="en-US" sz="1800" dirty="0"/>
-              <a:t>, </a:t>
-            </a:r>
-            <a:r>
-              <a:rPr lang="en-US" sz="1800" dirty="0" err="1"/>
-              <a:t>ConfigureFrame</a:t>
-            </a:r>
-            <a:r>
-              <a:rPr lang="en-US" sz="1800" dirty="0"/>
-              <a:t>, </a:t>
-            </a:r>
-            <a:r>
-              <a:rPr lang="en-US" sz="1800" dirty="0" err="1"/>
-              <a:t>etc</a:t>
-            </a:r>
-            <a:endParaRPr lang="en-US" sz="1800" dirty="0"/>
-          </a:p>
-          <a:p>
-            <a:pPr marL="0" indent="0">
-              <a:buNone/>
-            </a:pPr>
-            <a:endParaRPr lang="en-US" sz="1800" dirty="0">
-              <a:cs typeface="Courier New" panose="02070309020205020404" pitchFamily="49" charset="0"/>
-            </a:endParaRPr>
-          </a:p>
-        </p:txBody>
-      </p:sp>
-    </p:spTree>
-    <p:extLst>
-      <p:ext uri="{BB962C8B-B14F-4D97-AF65-F5344CB8AC3E}">
-        <p14:creationId xmlns:p14="http://schemas.microsoft.com/office/powerpoint/2010/main" val="3362265858"/>
       </p:ext>
     </p:extLst>
   </p:cSld>
@@ -7509,6 +8574,138 @@
     <p:extLst>
       <p:ext uri="{BB962C8B-B14F-4D97-AF65-F5344CB8AC3E}">
         <p14:creationId xmlns:p14="http://schemas.microsoft.com/office/powerpoint/2010/main" val="3756484870"/>
+      </p:ext>
+    </p:extLst>
+  </p:cSld>
+  <p:clrMapOvr>
+    <a:masterClrMapping/>
+  </p:clrMapOvr>
+</p:sld>
+</file>
+
+<file path=ppt/slides/slide20.xml><?xml version="1.0" encoding="utf-8"?>
+<p:sld xmlns:a="http://schemas.openxmlformats.org/drawingml/2006/main" xmlns:r="http://schemas.openxmlformats.org/officeDocument/2006/relationships" xmlns:p="http://schemas.openxmlformats.org/presentationml/2006/main">
+  <p:cSld>
+    <p:spTree>
+      <p:nvGrpSpPr>
+        <p:cNvPr id="1" name=""/>
+        <p:cNvGrpSpPr/>
+        <p:nvPr/>
+      </p:nvGrpSpPr>
+      <p:grpSpPr>
+        <a:xfrm>
+          <a:off x="0" y="0"/>
+          <a:ext cx="0" cy="0"/>
+          <a:chOff x="0" y="0"/>
+          <a:chExt cx="0" cy="0"/>
+        </a:xfrm>
+      </p:grpSpPr>
+      <p:sp>
+        <p:nvSpPr>
+          <p:cNvPr id="2" name="Title 1">
+            <a:extLst>
+              <a:ext uri="{FF2B5EF4-FFF2-40B4-BE49-F238E27FC236}">
+                <a16:creationId xmlns:a16="http://schemas.microsoft.com/office/drawing/2014/main" id="{EFF3126B-80BE-4BB5-9D53-6570BBEAB642}"/>
+              </a:ext>
+            </a:extLst>
+          </p:cNvPr>
+          <p:cNvSpPr>
+            <a:spLocks noGrp="1"/>
+          </p:cNvSpPr>
+          <p:nvPr>
+            <p:ph type="title"/>
+          </p:nvPr>
+        </p:nvSpPr>
+        <p:spPr/>
+        <p:txBody>
+          <a:bodyPr/>
+          <a:lstStyle/>
+          <a:p>
+            <a:r>
+              <a:rPr lang="en-US" dirty="0"/>
+              <a:t>General notes on coding style</a:t>
+            </a:r>
+          </a:p>
+        </p:txBody>
+      </p:sp>
+      <p:sp>
+        <p:nvSpPr>
+          <p:cNvPr id="4" name="Content Placeholder 2">
+            <a:extLst>
+              <a:ext uri="{FF2B5EF4-FFF2-40B4-BE49-F238E27FC236}">
+                <a16:creationId xmlns:a16="http://schemas.microsoft.com/office/drawing/2014/main" id="{B02985F4-C396-499F-94AD-B40C7CCEA073}"/>
+              </a:ext>
+            </a:extLst>
+          </p:cNvPr>
+          <p:cNvSpPr>
+            <a:spLocks noGrp="1"/>
+          </p:cNvSpPr>
+          <p:nvPr>
+            <p:ph idx="1"/>
+          </p:nvPr>
+        </p:nvSpPr>
+        <p:spPr>
+          <a:xfrm>
+            <a:off x="838201" y="1825624"/>
+            <a:ext cx="5461000" cy="3366136"/>
+          </a:xfrm>
+        </p:spPr>
+        <p:txBody>
+          <a:bodyPr>
+            <a:normAutofit/>
+          </a:bodyPr>
+          <a:lstStyle/>
+          <a:p>
+            <a:r>
+              <a:rPr lang="en-US" sz="1800"/>
+              <a:t>Frames </a:t>
+            </a:r>
+            <a:r>
+              <a:rPr lang="en-US" sz="1800" dirty="0"/>
+              <a:t>may be defined as classes. They materialize at the point in the program when an object of that class is instantiated.</a:t>
+            </a:r>
+          </a:p>
+          <a:p>
+            <a:r>
+              <a:rPr lang="en-US" sz="1800" dirty="0"/>
+              <a:t>Example: </a:t>
+            </a:r>
+            <a:r>
+              <a:rPr lang="en-US" sz="1800" dirty="0" err="1"/>
+              <a:t>WelcomeFrame</a:t>
+            </a:r>
+            <a:r>
+              <a:rPr lang="en-US" sz="1800" dirty="0"/>
+              <a:t>, </a:t>
+            </a:r>
+            <a:r>
+              <a:rPr lang="en-US" sz="1800" dirty="0" err="1"/>
+              <a:t>ConfigureFrame</a:t>
+            </a:r>
+            <a:r>
+              <a:rPr lang="en-US" sz="1800" dirty="0"/>
+              <a:t>, </a:t>
+            </a:r>
+            <a:r>
+              <a:rPr lang="en-US" sz="1800" dirty="0" err="1"/>
+              <a:t>etc</a:t>
+            </a:r>
+            <a:endParaRPr lang="en-US" sz="1800" dirty="0"/>
+          </a:p>
+          <a:p>
+            <a:pPr marL="0" indent="0">
+              <a:buNone/>
+            </a:pPr>
+            <a:endParaRPr lang="en-US" sz="1800" dirty="0">
+              <a:cs typeface="Courier New" panose="02070309020205020404" pitchFamily="49" charset="0"/>
+            </a:endParaRPr>
+          </a:p>
+        </p:txBody>
+      </p:sp>
+    </p:spTree>
+    <p:extLst>
+      <p:ext uri="{BB962C8B-B14F-4D97-AF65-F5344CB8AC3E}">
+        <p14:creationId xmlns:p14="http://schemas.microsoft.com/office/powerpoint/2010/main" val="3362265858"/>
       </p:ext>
     </p:extLst>
   </p:cSld>

</xml_diff>